<commit_message>
Atualizado board com sequência e classe
</commit_message>
<xml_diff>
--- a/DocumentacaoProjeto/Board_Projeto_Recicla.pptx
+++ b/DocumentacaoProjeto/Board_Projeto_Recicla.pptx
@@ -199,7 +199,7 @@
           </a:lstStyle>
           <a:p>
             <a:r>
-              <a:rPr lang="pt-BR" smtClean="0"/>
+              <a:rPr lang="pt-BR"/>
               <a:t>Clique para editar o título mestre</a:t>
             </a:r>
             <a:endParaRPr lang="en-US" dirty="0"/>
@@ -264,7 +264,7 @@
           </a:lstStyle>
           <a:p>
             <a:r>
-              <a:rPr lang="pt-BR" smtClean="0"/>
+              <a:rPr lang="pt-BR"/>
               <a:t>Clique para editar o estilo do subtítulo mestre</a:t>
             </a:r>
             <a:endParaRPr lang="en-US" dirty="0"/>
@@ -382,7 +382,7 @@
           <a:lstStyle/>
           <a:p>
             <a:r>
-              <a:rPr lang="pt-BR" smtClean="0"/>
+              <a:rPr lang="pt-BR"/>
               <a:t>Clique para editar o título mestre</a:t>
             </a:r>
             <a:endParaRPr lang="en-US" dirty="0"/>
@@ -406,35 +406,35 @@
           <a:p>
             <a:pPr lvl="0"/>
             <a:r>
-              <a:rPr lang="pt-BR" smtClean="0"/>
+              <a:rPr lang="pt-BR"/>
               <a:t>Clique para editar o texto mestre</a:t>
             </a:r>
           </a:p>
           <a:p>
             <a:pPr lvl="1"/>
             <a:r>
-              <a:rPr lang="pt-BR" smtClean="0"/>
+              <a:rPr lang="pt-BR"/>
               <a:t>Segundo nível</a:t>
             </a:r>
           </a:p>
           <a:p>
             <a:pPr lvl="2"/>
             <a:r>
-              <a:rPr lang="pt-BR" smtClean="0"/>
+              <a:rPr lang="pt-BR"/>
               <a:t>Terceiro nível</a:t>
             </a:r>
           </a:p>
           <a:p>
             <a:pPr lvl="3"/>
             <a:r>
-              <a:rPr lang="pt-BR" smtClean="0"/>
+              <a:rPr lang="pt-BR"/>
               <a:t>Quarto nível</a:t>
             </a:r>
           </a:p>
           <a:p>
             <a:pPr lvl="4"/>
             <a:r>
-              <a:rPr lang="pt-BR" smtClean="0"/>
+              <a:rPr lang="pt-BR"/>
               <a:t>Quinto nível</a:t>
             </a:r>
             <a:endParaRPr lang="en-US" dirty="0"/>
@@ -557,7 +557,7 @@
           <a:lstStyle/>
           <a:p>
             <a:r>
-              <a:rPr lang="pt-BR" smtClean="0"/>
+              <a:rPr lang="pt-BR"/>
               <a:t>Clique para editar o título mestre</a:t>
             </a:r>
             <a:endParaRPr lang="en-US" dirty="0"/>
@@ -586,35 +586,35 @@
           <a:p>
             <a:pPr lvl="0"/>
             <a:r>
-              <a:rPr lang="pt-BR" smtClean="0"/>
+              <a:rPr lang="pt-BR"/>
               <a:t>Clique para editar o texto mestre</a:t>
             </a:r>
           </a:p>
           <a:p>
             <a:pPr lvl="1"/>
             <a:r>
-              <a:rPr lang="pt-BR" smtClean="0"/>
+              <a:rPr lang="pt-BR"/>
               <a:t>Segundo nível</a:t>
             </a:r>
           </a:p>
           <a:p>
             <a:pPr lvl="2"/>
             <a:r>
-              <a:rPr lang="pt-BR" smtClean="0"/>
+              <a:rPr lang="pt-BR"/>
               <a:t>Terceiro nível</a:t>
             </a:r>
           </a:p>
           <a:p>
             <a:pPr lvl="3"/>
             <a:r>
-              <a:rPr lang="pt-BR" smtClean="0"/>
+              <a:rPr lang="pt-BR"/>
               <a:t>Quarto nível</a:t>
             </a:r>
           </a:p>
           <a:p>
             <a:pPr lvl="4"/>
             <a:r>
-              <a:rPr lang="pt-BR" smtClean="0"/>
+              <a:rPr lang="pt-BR"/>
               <a:t>Quinto nível</a:t>
             </a:r>
             <a:endParaRPr lang="en-US" dirty="0"/>
@@ -732,7 +732,7 @@
           <a:lstStyle/>
           <a:p>
             <a:r>
-              <a:rPr lang="pt-BR" smtClean="0"/>
+              <a:rPr lang="pt-BR"/>
               <a:t>Clique para editar o título mestre</a:t>
             </a:r>
             <a:endParaRPr lang="en-US" dirty="0"/>
@@ -756,35 +756,35 @@
           <a:p>
             <a:pPr lvl="0"/>
             <a:r>
-              <a:rPr lang="pt-BR" smtClean="0"/>
+              <a:rPr lang="pt-BR"/>
               <a:t>Clique para editar o texto mestre</a:t>
             </a:r>
           </a:p>
           <a:p>
             <a:pPr lvl="1"/>
             <a:r>
-              <a:rPr lang="pt-BR" smtClean="0"/>
+              <a:rPr lang="pt-BR"/>
               <a:t>Segundo nível</a:t>
             </a:r>
           </a:p>
           <a:p>
             <a:pPr lvl="2"/>
             <a:r>
-              <a:rPr lang="pt-BR" smtClean="0"/>
+              <a:rPr lang="pt-BR"/>
               <a:t>Terceiro nível</a:t>
             </a:r>
           </a:p>
           <a:p>
             <a:pPr lvl="3"/>
             <a:r>
-              <a:rPr lang="pt-BR" smtClean="0"/>
+              <a:rPr lang="pt-BR"/>
               <a:t>Quarto nível</a:t>
             </a:r>
           </a:p>
           <a:p>
             <a:pPr lvl="4"/>
             <a:r>
-              <a:rPr lang="pt-BR" smtClean="0"/>
+              <a:rPr lang="pt-BR"/>
               <a:t>Quinto nível</a:t>
             </a:r>
             <a:endParaRPr lang="en-US" dirty="0"/>
@@ -911,7 +911,7 @@
           </a:lstStyle>
           <a:p>
             <a:r>
-              <a:rPr lang="pt-BR" smtClean="0"/>
+              <a:rPr lang="pt-BR"/>
               <a:t>Clique para editar o título mestre</a:t>
             </a:r>
             <a:endParaRPr lang="en-US" dirty="0"/>
@@ -1031,7 +1031,7 @@
           <a:p>
             <a:pPr lvl="0"/>
             <a:r>
-              <a:rPr lang="pt-BR" smtClean="0"/>
+              <a:rPr lang="pt-BR"/>
               <a:t>Clique para editar o texto mestre</a:t>
             </a:r>
           </a:p>
@@ -1148,7 +1148,7 @@
           <a:lstStyle/>
           <a:p>
             <a:r>
-              <a:rPr lang="pt-BR" smtClean="0"/>
+              <a:rPr lang="pt-BR"/>
               <a:t>Clique para editar o título mestre</a:t>
             </a:r>
             <a:endParaRPr lang="en-US" dirty="0"/>
@@ -1177,35 +1177,35 @@
           <a:p>
             <a:pPr lvl="0"/>
             <a:r>
-              <a:rPr lang="pt-BR" smtClean="0"/>
+              <a:rPr lang="pt-BR"/>
               <a:t>Clique para editar o texto mestre</a:t>
             </a:r>
           </a:p>
           <a:p>
             <a:pPr lvl="1"/>
             <a:r>
-              <a:rPr lang="pt-BR" smtClean="0"/>
+              <a:rPr lang="pt-BR"/>
               <a:t>Segundo nível</a:t>
             </a:r>
           </a:p>
           <a:p>
             <a:pPr lvl="2"/>
             <a:r>
-              <a:rPr lang="pt-BR" smtClean="0"/>
+              <a:rPr lang="pt-BR"/>
               <a:t>Terceiro nível</a:t>
             </a:r>
           </a:p>
           <a:p>
             <a:pPr lvl="3"/>
             <a:r>
-              <a:rPr lang="pt-BR" smtClean="0"/>
+              <a:rPr lang="pt-BR"/>
               <a:t>Quarto nível</a:t>
             </a:r>
           </a:p>
           <a:p>
             <a:pPr lvl="4"/>
             <a:r>
-              <a:rPr lang="pt-BR" smtClean="0"/>
+              <a:rPr lang="pt-BR"/>
               <a:t>Quinto nível</a:t>
             </a:r>
             <a:endParaRPr lang="en-US" dirty="0"/>
@@ -1234,35 +1234,35 @@
           <a:p>
             <a:pPr lvl="0"/>
             <a:r>
-              <a:rPr lang="pt-BR" smtClean="0"/>
+              <a:rPr lang="pt-BR"/>
               <a:t>Clique para editar o texto mestre</a:t>
             </a:r>
           </a:p>
           <a:p>
             <a:pPr lvl="1"/>
             <a:r>
-              <a:rPr lang="pt-BR" smtClean="0"/>
+              <a:rPr lang="pt-BR"/>
               <a:t>Segundo nível</a:t>
             </a:r>
           </a:p>
           <a:p>
             <a:pPr lvl="2"/>
             <a:r>
-              <a:rPr lang="pt-BR" smtClean="0"/>
+              <a:rPr lang="pt-BR"/>
               <a:t>Terceiro nível</a:t>
             </a:r>
           </a:p>
           <a:p>
             <a:pPr lvl="3"/>
             <a:r>
-              <a:rPr lang="pt-BR" smtClean="0"/>
+              <a:rPr lang="pt-BR"/>
               <a:t>Quarto nível</a:t>
             </a:r>
           </a:p>
           <a:p>
             <a:pPr lvl="4"/>
             <a:r>
-              <a:rPr lang="pt-BR" smtClean="0"/>
+              <a:rPr lang="pt-BR"/>
               <a:t>Quinto nível</a:t>
             </a:r>
             <a:endParaRPr lang="en-US" dirty="0"/>
@@ -1385,7 +1385,7 @@
           <a:lstStyle/>
           <a:p>
             <a:r>
-              <a:rPr lang="pt-BR" smtClean="0"/>
+              <a:rPr lang="pt-BR"/>
               <a:t>Clique para editar o título mestre</a:t>
             </a:r>
             <a:endParaRPr lang="en-US" dirty="0"/>
@@ -1451,7 +1451,7 @@
           <a:p>
             <a:pPr lvl="0"/>
             <a:r>
-              <a:rPr lang="pt-BR" smtClean="0"/>
+              <a:rPr lang="pt-BR"/>
               <a:t>Clique para editar o texto mestre</a:t>
             </a:r>
           </a:p>
@@ -1479,35 +1479,35 @@
           <a:p>
             <a:pPr lvl="0"/>
             <a:r>
-              <a:rPr lang="pt-BR" smtClean="0"/>
+              <a:rPr lang="pt-BR"/>
               <a:t>Clique para editar o texto mestre</a:t>
             </a:r>
           </a:p>
           <a:p>
             <a:pPr lvl="1"/>
             <a:r>
-              <a:rPr lang="pt-BR" smtClean="0"/>
+              <a:rPr lang="pt-BR"/>
               <a:t>Segundo nível</a:t>
             </a:r>
           </a:p>
           <a:p>
             <a:pPr lvl="2"/>
             <a:r>
-              <a:rPr lang="pt-BR" smtClean="0"/>
+              <a:rPr lang="pt-BR"/>
               <a:t>Terceiro nível</a:t>
             </a:r>
           </a:p>
           <a:p>
             <a:pPr lvl="3"/>
             <a:r>
-              <a:rPr lang="pt-BR" smtClean="0"/>
+              <a:rPr lang="pt-BR"/>
               <a:t>Quarto nível</a:t>
             </a:r>
           </a:p>
           <a:p>
             <a:pPr lvl="4"/>
             <a:r>
-              <a:rPr lang="pt-BR" smtClean="0"/>
+              <a:rPr lang="pt-BR"/>
               <a:t>Quinto nível</a:t>
             </a:r>
             <a:endParaRPr lang="en-US" dirty="0"/>
@@ -1573,7 +1573,7 @@
           <a:p>
             <a:pPr lvl="0"/>
             <a:r>
-              <a:rPr lang="pt-BR" smtClean="0"/>
+              <a:rPr lang="pt-BR"/>
               <a:t>Clique para editar o texto mestre</a:t>
             </a:r>
           </a:p>
@@ -1601,35 +1601,35 @@
           <a:p>
             <a:pPr lvl="0"/>
             <a:r>
-              <a:rPr lang="pt-BR" smtClean="0"/>
+              <a:rPr lang="pt-BR"/>
               <a:t>Clique para editar o texto mestre</a:t>
             </a:r>
           </a:p>
           <a:p>
             <a:pPr lvl="1"/>
             <a:r>
-              <a:rPr lang="pt-BR" smtClean="0"/>
+              <a:rPr lang="pt-BR"/>
               <a:t>Segundo nível</a:t>
             </a:r>
           </a:p>
           <a:p>
             <a:pPr lvl="2"/>
             <a:r>
-              <a:rPr lang="pt-BR" smtClean="0"/>
+              <a:rPr lang="pt-BR"/>
               <a:t>Terceiro nível</a:t>
             </a:r>
           </a:p>
           <a:p>
             <a:pPr lvl="3"/>
             <a:r>
-              <a:rPr lang="pt-BR" smtClean="0"/>
+              <a:rPr lang="pt-BR"/>
               <a:t>Quarto nível</a:t>
             </a:r>
           </a:p>
           <a:p>
             <a:pPr lvl="4"/>
             <a:r>
-              <a:rPr lang="pt-BR" smtClean="0"/>
+              <a:rPr lang="pt-BR"/>
               <a:t>Quinto nível</a:t>
             </a:r>
             <a:endParaRPr lang="en-US" dirty="0"/>
@@ -1747,7 +1747,7 @@
           <a:lstStyle/>
           <a:p>
             <a:r>
-              <a:rPr lang="pt-BR" smtClean="0"/>
+              <a:rPr lang="pt-BR"/>
               <a:t>Clique para editar o título mestre</a:t>
             </a:r>
             <a:endParaRPr lang="en-US" dirty="0"/>
@@ -1969,7 +1969,7 @@
           </a:lstStyle>
           <a:p>
             <a:r>
-              <a:rPr lang="pt-BR" smtClean="0"/>
+              <a:rPr lang="pt-BR"/>
               <a:t>Clique para editar o título mestre</a:t>
             </a:r>
             <a:endParaRPr lang="en-US" dirty="0"/>
@@ -2026,35 +2026,35 @@
           <a:p>
             <a:pPr lvl="0"/>
             <a:r>
-              <a:rPr lang="pt-BR" smtClean="0"/>
+              <a:rPr lang="pt-BR"/>
               <a:t>Clique para editar o texto mestre</a:t>
             </a:r>
           </a:p>
           <a:p>
             <a:pPr lvl="1"/>
             <a:r>
-              <a:rPr lang="pt-BR" smtClean="0"/>
+              <a:rPr lang="pt-BR"/>
               <a:t>Segundo nível</a:t>
             </a:r>
           </a:p>
           <a:p>
             <a:pPr lvl="2"/>
             <a:r>
-              <a:rPr lang="pt-BR" smtClean="0"/>
+              <a:rPr lang="pt-BR"/>
               <a:t>Terceiro nível</a:t>
             </a:r>
           </a:p>
           <a:p>
             <a:pPr lvl="3"/>
             <a:r>
-              <a:rPr lang="pt-BR" smtClean="0"/>
+              <a:rPr lang="pt-BR"/>
               <a:t>Quarto nível</a:t>
             </a:r>
           </a:p>
           <a:p>
             <a:pPr lvl="4"/>
             <a:r>
-              <a:rPr lang="pt-BR" smtClean="0"/>
+              <a:rPr lang="pt-BR"/>
               <a:t>Quinto nível</a:t>
             </a:r>
             <a:endParaRPr lang="en-US" dirty="0"/>
@@ -2120,7 +2120,7 @@
           <a:p>
             <a:pPr lvl="0"/>
             <a:r>
-              <a:rPr lang="pt-BR" smtClean="0"/>
+              <a:rPr lang="pt-BR"/>
               <a:t>Clique para editar o texto mestre</a:t>
             </a:r>
           </a:p>
@@ -2246,7 +2246,7 @@
           </a:lstStyle>
           <a:p>
             <a:r>
-              <a:rPr lang="pt-BR" smtClean="0"/>
+              <a:rPr lang="pt-BR"/>
               <a:t>Clique para editar o título mestre</a:t>
             </a:r>
             <a:endParaRPr lang="en-US" dirty="0"/>
@@ -2311,7 +2311,7 @@
           </a:lstStyle>
           <a:p>
             <a:r>
-              <a:rPr lang="pt-BR" smtClean="0"/>
+              <a:rPr lang="pt-BR"/>
               <a:t>Clique no ícone para adicionar uma imagem</a:t>
             </a:r>
             <a:endParaRPr lang="en-US" dirty="0"/>
@@ -2377,7 +2377,7 @@
           <a:p>
             <a:pPr lvl="0"/>
             <a:r>
-              <a:rPr lang="pt-BR" smtClean="0"/>
+              <a:rPr lang="pt-BR"/>
               <a:t>Clique para editar o texto mestre</a:t>
             </a:r>
           </a:p>
@@ -2509,7 +2509,7 @@
           <a:lstStyle/>
           <a:p>
             <a:r>
-              <a:rPr lang="pt-BR" smtClean="0"/>
+              <a:rPr lang="pt-BR"/>
               <a:t>Clique para editar o título mestre</a:t>
             </a:r>
             <a:endParaRPr lang="en-US" dirty="0"/>
@@ -2543,35 +2543,35 @@
           <a:p>
             <a:pPr lvl="0"/>
             <a:r>
-              <a:rPr lang="pt-BR" smtClean="0"/>
+              <a:rPr lang="pt-BR"/>
               <a:t>Clique para editar o texto mestre</a:t>
             </a:r>
           </a:p>
           <a:p>
             <a:pPr lvl="1"/>
             <a:r>
-              <a:rPr lang="pt-BR" smtClean="0"/>
+              <a:rPr lang="pt-BR"/>
               <a:t>Segundo nível</a:t>
             </a:r>
           </a:p>
           <a:p>
             <a:pPr lvl="2"/>
             <a:r>
-              <a:rPr lang="pt-BR" smtClean="0"/>
+              <a:rPr lang="pt-BR"/>
               <a:t>Terceiro nível</a:t>
             </a:r>
           </a:p>
           <a:p>
             <a:pPr lvl="3"/>
             <a:r>
-              <a:rPr lang="pt-BR" smtClean="0"/>
+              <a:rPr lang="pt-BR"/>
               <a:t>Quarto nível</a:t>
             </a:r>
           </a:p>
           <a:p>
             <a:pPr lvl="4"/>
             <a:r>
-              <a:rPr lang="pt-BR" smtClean="0"/>
+              <a:rPr lang="pt-BR"/>
               <a:t>Quinto nível</a:t>
             </a:r>
             <a:endParaRPr lang="en-US" dirty="0"/>
@@ -3107,11 +3107,7 @@
             </a:r>
             <a:r>
               <a:rPr lang="pt-BR" sz="1400" dirty="0"/>
-              <a:t>Aluno e </a:t>
-            </a:r>
-            <a:r>
-              <a:rPr lang="pt-BR" sz="1400" dirty="0"/>
-              <a:t>Professor</a:t>
+              <a:t>Aluno e Professor</a:t>
             </a:r>
           </a:p>
           <a:p>
@@ -3160,11 +3156,7 @@
             </a:pPr>
             <a:r>
               <a:rPr lang="pt-BR" sz="1400" dirty="0"/>
-              <a:t>Caso </a:t>
-            </a:r>
-            <a:r>
-              <a:rPr lang="pt-BR" sz="1400" dirty="0"/>
-              <a:t>de uso finalizado.</a:t>
+              <a:t>Caso de uso finalizado.</a:t>
             </a:r>
           </a:p>
           <a:p>
@@ -3204,9 +3196,6 @@
               </a:rPr>
               <a:t>ESCOLHER PERFIL</a:t>
             </a:r>
-            <a:endParaRPr lang="pt-BR" sz="2400" b="1" dirty="0">
-              <a:latin typeface="Bahnschrift SemiBold" panose="020B0502040204020203" pitchFamily="34" charset="0"/>
-            </a:endParaRPr>
           </a:p>
         </p:txBody>
       </p:sp>
@@ -3238,9 +3227,6 @@
               </a:rPr>
               <a:t>TELA INICIAL</a:t>
             </a:r>
-            <a:endParaRPr lang="pt-BR" sz="1200" b="1" dirty="0">
-              <a:latin typeface="Bahnschrift SemiBold" panose="020B0502040204020203" pitchFamily="34" charset="0"/>
-            </a:endParaRPr>
           </a:p>
         </p:txBody>
       </p:sp>
@@ -3411,17 +3397,8 @@
               <a:rPr lang="pt-BR" sz="1200" b="1" dirty="0">
                 <a:latin typeface="Bahnschrift SemiBold" panose="020B0502040204020203" pitchFamily="34" charset="0"/>
               </a:rPr>
-              <a:t>DIAGRAMA DE </a:t>
-            </a:r>
-            <a:r>
-              <a:rPr lang="pt-BR" sz="1200" b="1" dirty="0" smtClean="0">
-                <a:latin typeface="Bahnschrift SemiBold" panose="020B0502040204020203" pitchFamily="34" charset="0"/>
-              </a:rPr>
-              <a:t>CLASSE</a:t>
-            </a:r>
-            <a:endParaRPr lang="pt-BR" sz="1200" b="1" dirty="0">
-              <a:latin typeface="Bahnschrift SemiBold" panose="020B0502040204020203" pitchFamily="34" charset="0"/>
-            </a:endParaRPr>
+              <a:t>DIAGRAMA DE CLASSE</a:t>
+            </a:r>
           </a:p>
         </p:txBody>
       </p:sp>
@@ -3482,9 +3459,6 @@
               </a:rPr>
               <a:t>DIAGRAMA DE SEQUENCIA</a:t>
             </a:r>
-            <a:endParaRPr lang="pt-BR" sz="1200" b="1" dirty="0">
-              <a:latin typeface="Bahnschrift SemiBold" panose="020B0502040204020203" pitchFamily="34" charset="0"/>
-            </a:endParaRPr>
           </a:p>
         </p:txBody>
       </p:sp>
@@ -3511,14 +3485,11 @@
           <a:lstStyle/>
           <a:p>
             <a:r>
-              <a:rPr lang="pt-BR" sz="1200" b="1" dirty="0" smtClean="0">
+              <a:rPr lang="pt-BR" sz="1200" b="1" dirty="0">
                 <a:latin typeface="Bahnschrift SemiBold" panose="020B0502040204020203" pitchFamily="34" charset="0"/>
               </a:rPr>
               <a:t>DIAGRAMA DE ROBUSTEZ</a:t>
             </a:r>
-            <a:endParaRPr lang="pt-BR" sz="1200" b="1" dirty="0">
-              <a:latin typeface="Bahnschrift SemiBold" panose="020B0502040204020203" pitchFamily="34" charset="0"/>
-            </a:endParaRPr>
           </a:p>
         </p:txBody>
       </p:sp>
@@ -3532,13 +3503,6 @@
   <p:clrMapOvr>
     <a:masterClrMapping/>
   </p:clrMapOvr>
-  <p:timing>
-    <p:tnLst>
-      <p:par>
-        <p:cTn id="1" dur="indefinite" restart="never" nodeType="tmRoot"/>
-      </p:par>
-    </p:tnLst>
-  </p:timing>
 </p:sld>
 </file>
 
@@ -3655,7 +3619,7 @@
               <a:t>Atores: </a:t>
             </a:r>
             <a:r>
-              <a:rPr lang="pt-BR" sz="1400" dirty="0" smtClean="0"/>
+              <a:rPr lang="pt-BR" sz="1400" dirty="0"/>
               <a:t>Professor</a:t>
             </a:r>
           </a:p>
@@ -3728,14 +3692,11 @@
           <a:lstStyle/>
           <a:p>
             <a:r>
-              <a:rPr lang="pt-BR" sz="2400" b="1" dirty="0" smtClean="0">
+              <a:rPr lang="pt-BR" sz="2400" b="1" dirty="0">
                 <a:latin typeface="Bahnschrift SemiBold" panose="020B0502040204020203" pitchFamily="34" charset="0"/>
               </a:rPr>
               <a:t>ADICIONAR JOGO APAGUE A LUZ NA RODADA</a:t>
             </a:r>
-            <a:endParaRPr lang="pt-BR" sz="2400" b="1" dirty="0">
-              <a:latin typeface="Bahnschrift SemiBold" panose="020B0502040204020203" pitchFamily="34" charset="0"/>
-            </a:endParaRPr>
           </a:p>
         </p:txBody>
       </p:sp>
@@ -3814,9 +3775,6 @@
               </a:rPr>
               <a:t>DIAGRAMA DE SEQUÊNCIA</a:t>
             </a:r>
-            <a:endParaRPr lang="pt-BR" sz="1200" b="1" dirty="0">
-              <a:latin typeface="Bahnschrift SemiBold" panose="020B0502040204020203" pitchFamily="34" charset="0"/>
-            </a:endParaRPr>
           </a:p>
         </p:txBody>
       </p:sp>
@@ -3848,9 +3806,6 @@
               </a:rPr>
               <a:t>DIAGRAMA DE CLASSE</a:t>
             </a:r>
-            <a:endParaRPr lang="pt-BR" sz="1200" b="1" dirty="0">
-              <a:latin typeface="Bahnschrift SemiBold" panose="020B0502040204020203" pitchFamily="34" charset="0"/>
-            </a:endParaRPr>
           </a:p>
         </p:txBody>
       </p:sp>
@@ -3914,14 +3869,11 @@
           <a:lstStyle/>
           <a:p>
             <a:r>
-              <a:rPr lang="pt-BR" sz="1200" b="1" dirty="0" smtClean="0">
+              <a:rPr lang="pt-BR" sz="1200" b="1" dirty="0">
                 <a:latin typeface="Bahnschrift SemiBold" panose="020B0502040204020203" pitchFamily="34" charset="0"/>
               </a:rPr>
               <a:t>NOVA RODADA</a:t>
             </a:r>
-            <a:endParaRPr lang="pt-BR" sz="1200" b="1" dirty="0">
-              <a:latin typeface="Bahnschrift SemiBold" panose="020B0502040204020203" pitchFamily="34" charset="0"/>
-            </a:endParaRPr>
           </a:p>
         </p:txBody>
       </p:sp>
@@ -3951,17 +3903,8 @@
               <a:rPr lang="pt-BR" sz="1200" b="1" dirty="0">
                 <a:latin typeface="Bahnschrift SemiBold" panose="020B0502040204020203" pitchFamily="34" charset="0"/>
               </a:rPr>
-              <a:t>DIAGRAMA </a:t>
-            </a:r>
-            <a:r>
-              <a:rPr lang="pt-BR" sz="1200" b="1" dirty="0" smtClean="0">
-                <a:latin typeface="Bahnschrift SemiBold" panose="020B0502040204020203" pitchFamily="34" charset="0"/>
-              </a:rPr>
-              <a:t>DE ROBUSTEZ</a:t>
-            </a:r>
-            <a:endParaRPr lang="pt-BR" sz="1200" b="1" dirty="0">
-              <a:latin typeface="Bahnschrift SemiBold" panose="020B0502040204020203" pitchFamily="34" charset="0"/>
-            </a:endParaRPr>
+              <a:t>DIAGRAMA DE ROBUSTEZ</a:t>
+            </a:r>
           </a:p>
         </p:txBody>
       </p:sp>
@@ -3994,6 +3937,78 @@
           </a:prstGeom>
         </p:spPr>
       </p:pic>
+      <p:pic>
+        <p:nvPicPr>
+          <p:cNvPr id="7" name="Imagem 6">
+            <a:extLst>
+              <a:ext uri="{FF2B5EF4-FFF2-40B4-BE49-F238E27FC236}">
+                <a16:creationId xmlns:a16="http://schemas.microsoft.com/office/drawing/2014/main" id="{0BA01D9B-E878-415A-835E-220D5752AB74}"/>
+              </a:ext>
+            </a:extLst>
+          </p:cNvPr>
+          <p:cNvPicPr>
+            <a:picLocks noChangeAspect="1"/>
+          </p:cNvPicPr>
+          <p:nvPr/>
+        </p:nvPicPr>
+        <p:blipFill>
+          <a:blip r:embed="rId4">
+            <a:extLst>
+              <a:ext uri="{28A0092B-C50C-407E-A947-70E740481C1C}">
+                <a14:useLocalDpi xmlns:a14="http://schemas.microsoft.com/office/drawing/2010/main" val="0"/>
+              </a:ext>
+            </a:extLst>
+          </a:blip>
+          <a:stretch>
+            <a:fillRect/>
+          </a:stretch>
+        </p:blipFill>
+        <p:spPr>
+          <a:xfrm>
+            <a:off x="8192191" y="764953"/>
+            <a:ext cx="6139999" cy="4897380"/>
+          </a:xfrm>
+          <a:prstGeom prst="rect">
+            <a:avLst/>
+          </a:prstGeom>
+        </p:spPr>
+      </p:pic>
+      <p:pic>
+        <p:nvPicPr>
+          <p:cNvPr id="9" name="Imagem 8">
+            <a:extLst>
+              <a:ext uri="{FF2B5EF4-FFF2-40B4-BE49-F238E27FC236}">
+                <a16:creationId xmlns:a16="http://schemas.microsoft.com/office/drawing/2014/main" id="{5DB8552A-19F9-4A5F-8C36-78BC33897A3E}"/>
+              </a:ext>
+            </a:extLst>
+          </p:cNvPr>
+          <p:cNvPicPr>
+            <a:picLocks noChangeAspect="1"/>
+          </p:cNvPicPr>
+          <p:nvPr/>
+        </p:nvPicPr>
+        <p:blipFill>
+          <a:blip r:embed="rId5">
+            <a:extLst>
+              <a:ext uri="{28A0092B-C50C-407E-A947-70E740481C1C}">
+                <a14:useLocalDpi xmlns:a14="http://schemas.microsoft.com/office/drawing/2010/main" val="0"/>
+              </a:ext>
+            </a:extLst>
+          </a:blip>
+          <a:stretch>
+            <a:fillRect/>
+          </a:stretch>
+        </p:blipFill>
+        <p:spPr>
+          <a:xfrm>
+            <a:off x="14560910" y="725708"/>
+            <a:ext cx="5171973" cy="2914499"/>
+          </a:xfrm>
+          <a:prstGeom prst="rect">
+            <a:avLst/>
+          </a:prstGeom>
+        </p:spPr>
+      </p:pic>
     </p:spTree>
     <p:extLst>
       <p:ext uri="{BB962C8B-B14F-4D97-AF65-F5344CB8AC3E}">
@@ -4004,13 +4019,6 @@
   <p:clrMapOvr>
     <a:masterClrMapping/>
   </p:clrMapOvr>
-  <p:timing>
-    <p:tnLst>
-      <p:par>
-        <p:cTn id="1" dur="indefinite" restart="never" nodeType="tmRoot"/>
-      </p:par>
-    </p:tnLst>
-  </p:timing>
 </p:sld>
 </file>
 
@@ -4127,7 +4135,7 @@
               <a:t>Atores: </a:t>
             </a:r>
             <a:r>
-              <a:rPr lang="pt-BR" sz="1400" dirty="0" smtClean="0"/>
+              <a:rPr lang="pt-BR" sz="1400" dirty="0"/>
               <a:t>Professor</a:t>
             </a:r>
           </a:p>
@@ -4169,11 +4177,7 @@
             </a:pPr>
             <a:r>
               <a:rPr lang="pt-BR" sz="1400" dirty="0"/>
-              <a:t>Caso de uso </a:t>
-            </a:r>
-            <a:r>
-              <a:rPr lang="pt-BR" sz="1400" dirty="0" smtClean="0"/>
-              <a:t>finalizado</a:t>
+              <a:t>Caso de uso finalizado</a:t>
             </a:r>
           </a:p>
           <a:p>
@@ -4236,14 +4240,11 @@
           <a:lstStyle/>
           <a:p>
             <a:r>
-              <a:rPr lang="pt-BR" sz="2400" b="1" dirty="0" smtClean="0">
+              <a:rPr lang="pt-BR" sz="2400" b="1" dirty="0">
                 <a:latin typeface="Bahnschrift SemiBold" panose="020B0502040204020203" pitchFamily="34" charset="0"/>
               </a:rPr>
               <a:t>EXCLUIR JOGO DA RODADA</a:t>
             </a:r>
-            <a:endParaRPr lang="pt-BR" sz="2400" b="1" dirty="0">
-              <a:latin typeface="Bahnschrift SemiBold" panose="020B0502040204020203" pitchFamily="34" charset="0"/>
-            </a:endParaRPr>
           </a:p>
         </p:txBody>
       </p:sp>
@@ -4322,9 +4323,6 @@
               </a:rPr>
               <a:t>DIAGRAMA DE SEQUÊNCIA</a:t>
             </a:r>
-            <a:endParaRPr lang="pt-BR" sz="1200" b="1" dirty="0">
-              <a:latin typeface="Bahnschrift SemiBold" panose="020B0502040204020203" pitchFamily="34" charset="0"/>
-            </a:endParaRPr>
           </a:p>
         </p:txBody>
       </p:sp>
@@ -4356,9 +4354,6 @@
               </a:rPr>
               <a:t>DIAGRAMA DE CLASSE</a:t>
             </a:r>
-            <a:endParaRPr lang="pt-BR" sz="1200" b="1" dirty="0">
-              <a:latin typeface="Bahnschrift SemiBold" panose="020B0502040204020203" pitchFamily="34" charset="0"/>
-            </a:endParaRPr>
           </a:p>
         </p:txBody>
       </p:sp>
@@ -4422,14 +4417,11 @@
           <a:lstStyle/>
           <a:p>
             <a:r>
-              <a:rPr lang="pt-BR" sz="1200" b="1" dirty="0" smtClean="0">
+              <a:rPr lang="pt-BR" sz="1200" b="1" dirty="0">
                 <a:latin typeface="Bahnschrift SemiBold" panose="020B0502040204020203" pitchFamily="34" charset="0"/>
               </a:rPr>
               <a:t>NOVA RODADA</a:t>
             </a:r>
-            <a:endParaRPr lang="pt-BR" sz="1200" b="1" dirty="0">
-              <a:latin typeface="Bahnschrift SemiBold" panose="020B0502040204020203" pitchFamily="34" charset="0"/>
-            </a:endParaRPr>
           </a:p>
         </p:txBody>
       </p:sp>
@@ -4459,17 +4451,8 @@
               <a:rPr lang="pt-BR" sz="1200" b="1" dirty="0">
                 <a:latin typeface="Bahnschrift SemiBold" panose="020B0502040204020203" pitchFamily="34" charset="0"/>
               </a:rPr>
-              <a:t>DIAGRAMA </a:t>
-            </a:r>
-            <a:r>
-              <a:rPr lang="pt-BR" sz="1200" b="1" dirty="0" smtClean="0">
-                <a:latin typeface="Bahnschrift SemiBold" panose="020B0502040204020203" pitchFamily="34" charset="0"/>
-              </a:rPr>
-              <a:t>DE ROBUSTEZ</a:t>
-            </a:r>
-            <a:endParaRPr lang="pt-BR" sz="1200" b="1" dirty="0">
-              <a:latin typeface="Bahnschrift SemiBold" panose="020B0502040204020203" pitchFamily="34" charset="0"/>
-            </a:endParaRPr>
+              <a:t>DIAGRAMA DE ROBUSTEZ</a:t>
+            </a:r>
           </a:p>
         </p:txBody>
       </p:sp>
@@ -4502,6 +4485,78 @@
           </a:prstGeom>
         </p:spPr>
       </p:pic>
+      <p:pic>
+        <p:nvPicPr>
+          <p:cNvPr id="7" name="Imagem 6">
+            <a:extLst>
+              <a:ext uri="{FF2B5EF4-FFF2-40B4-BE49-F238E27FC236}">
+                <a16:creationId xmlns:a16="http://schemas.microsoft.com/office/drawing/2014/main" id="{2B4EA219-DD2B-4F14-ADFB-F3EB213CF409}"/>
+              </a:ext>
+            </a:extLst>
+          </p:cNvPr>
+          <p:cNvPicPr>
+            <a:picLocks noChangeAspect="1"/>
+          </p:cNvPicPr>
+          <p:nvPr/>
+        </p:nvPicPr>
+        <p:blipFill>
+          <a:blip r:embed="rId4">
+            <a:extLst>
+              <a:ext uri="{28A0092B-C50C-407E-A947-70E740481C1C}">
+                <a14:useLocalDpi xmlns:a14="http://schemas.microsoft.com/office/drawing/2010/main" val="0"/>
+              </a:ext>
+            </a:extLst>
+          </a:blip>
+          <a:stretch>
+            <a:fillRect/>
+          </a:stretch>
+        </p:blipFill>
+        <p:spPr>
+          <a:xfrm>
+            <a:off x="8192191" y="680612"/>
+            <a:ext cx="6476190" cy="4933333"/>
+          </a:xfrm>
+          <a:prstGeom prst="rect">
+            <a:avLst/>
+          </a:prstGeom>
+        </p:spPr>
+      </p:pic>
+      <p:pic>
+        <p:nvPicPr>
+          <p:cNvPr id="9" name="Imagem 8">
+            <a:extLst>
+              <a:ext uri="{FF2B5EF4-FFF2-40B4-BE49-F238E27FC236}">
+                <a16:creationId xmlns:a16="http://schemas.microsoft.com/office/drawing/2014/main" id="{9E615B2C-AA8C-49E1-9181-C6267FABD203}"/>
+              </a:ext>
+            </a:extLst>
+          </p:cNvPr>
+          <p:cNvPicPr>
+            <a:picLocks noChangeAspect="1"/>
+          </p:cNvPicPr>
+          <p:nvPr/>
+        </p:nvPicPr>
+        <p:blipFill>
+          <a:blip r:embed="rId5">
+            <a:extLst>
+              <a:ext uri="{28A0092B-C50C-407E-A947-70E740481C1C}">
+                <a14:useLocalDpi xmlns:a14="http://schemas.microsoft.com/office/drawing/2010/main" val="0"/>
+              </a:ext>
+            </a:extLst>
+          </a:blip>
+          <a:stretch>
+            <a:fillRect/>
+          </a:stretch>
+        </p:blipFill>
+        <p:spPr>
+          <a:xfrm>
+            <a:off x="14646404" y="680612"/>
+            <a:ext cx="4894932" cy="2714177"/>
+          </a:xfrm>
+          <a:prstGeom prst="rect">
+            <a:avLst/>
+          </a:prstGeom>
+        </p:spPr>
+      </p:pic>
     </p:spTree>
     <p:extLst>
       <p:ext uri="{BB962C8B-B14F-4D97-AF65-F5344CB8AC3E}">
@@ -4512,13 +4567,6 @@
   <p:clrMapOvr>
     <a:masterClrMapping/>
   </p:clrMapOvr>
-  <p:timing>
-    <p:tnLst>
-      <p:par>
-        <p:cTn id="1" dur="indefinite" restart="never" nodeType="tmRoot"/>
-      </p:par>
-    </p:tnLst>
-  </p:timing>
 </p:sld>
 </file>
 
@@ -4638,7 +4686,6 @@
               <a:rPr lang="pt-BR" sz="1400" dirty="0"/>
               <a:t>Professor </a:t>
             </a:r>
-            <a:endParaRPr lang="pt-BR" sz="1400" dirty="0" smtClean="0"/>
           </a:p>
           <a:p>
             <a:endParaRPr lang="pt-BR" sz="1400" dirty="0"/>
@@ -4678,11 +4725,7 @@
             </a:pPr>
             <a:r>
               <a:rPr lang="pt-BR" sz="1400" dirty="0"/>
-              <a:t>Caso de uso </a:t>
-            </a:r>
-            <a:r>
-              <a:rPr lang="pt-BR" sz="1400" dirty="0" smtClean="0"/>
-              <a:t>finalizado</a:t>
+              <a:t>Caso de uso finalizado</a:t>
             </a:r>
           </a:p>
           <a:p>
@@ -4758,14 +4801,11 @@
           <a:lstStyle/>
           <a:p>
             <a:r>
-              <a:rPr lang="pt-BR" sz="2400" b="1" dirty="0" smtClean="0">
+              <a:rPr lang="pt-BR" sz="2400" b="1" dirty="0">
                 <a:latin typeface="Bahnschrift SemiBold" panose="020B0502040204020203" pitchFamily="34" charset="0"/>
               </a:rPr>
               <a:t>INICIAR RODADA</a:t>
             </a:r>
-            <a:endParaRPr lang="pt-BR" sz="2400" b="1" dirty="0">
-              <a:latin typeface="Bahnschrift SemiBold" panose="020B0502040204020203" pitchFamily="34" charset="0"/>
-            </a:endParaRPr>
           </a:p>
         </p:txBody>
       </p:sp>
@@ -4844,9 +4884,6 @@
               </a:rPr>
               <a:t>DIAGRAMA DE SEQUÊNCIA</a:t>
             </a:r>
-            <a:endParaRPr lang="pt-BR" sz="1200" b="1" dirty="0">
-              <a:latin typeface="Bahnschrift SemiBold" panose="020B0502040204020203" pitchFamily="34" charset="0"/>
-            </a:endParaRPr>
           </a:p>
         </p:txBody>
       </p:sp>
@@ -4878,9 +4915,6 @@
               </a:rPr>
               <a:t>DIAGRAMA DE CLASSE</a:t>
             </a:r>
-            <a:endParaRPr lang="pt-BR" sz="1200" b="1" dirty="0">
-              <a:latin typeface="Bahnschrift SemiBold" panose="020B0502040204020203" pitchFamily="34" charset="0"/>
-            </a:endParaRPr>
           </a:p>
         </p:txBody>
       </p:sp>
@@ -4944,14 +4978,11 @@
           <a:lstStyle/>
           <a:p>
             <a:r>
-              <a:rPr lang="pt-BR" sz="1200" b="1" dirty="0" smtClean="0">
+              <a:rPr lang="pt-BR" sz="1200" b="1" dirty="0">
                 <a:latin typeface="Bahnschrift SemiBold" panose="020B0502040204020203" pitchFamily="34" charset="0"/>
               </a:rPr>
               <a:t>NOVA RODADA</a:t>
             </a:r>
-            <a:endParaRPr lang="pt-BR" sz="1200" b="1" dirty="0">
-              <a:latin typeface="Bahnschrift SemiBold" panose="020B0502040204020203" pitchFamily="34" charset="0"/>
-            </a:endParaRPr>
           </a:p>
         </p:txBody>
       </p:sp>
@@ -4981,20 +5012,83 @@
               <a:rPr lang="pt-BR" sz="1200" b="1" dirty="0">
                 <a:latin typeface="Bahnschrift SemiBold" panose="020B0502040204020203" pitchFamily="34" charset="0"/>
               </a:rPr>
-              <a:t>DIAGRAMA </a:t>
-            </a:r>
-            <a:r>
-              <a:rPr lang="pt-BR" sz="1200" b="1" dirty="0" smtClean="0">
-                <a:latin typeface="Bahnschrift SemiBold" panose="020B0502040204020203" pitchFamily="34" charset="0"/>
-              </a:rPr>
-              <a:t>DE ROBUSTEZ</a:t>
-            </a:r>
-            <a:endParaRPr lang="pt-BR" sz="1200" b="1" dirty="0">
-              <a:latin typeface="Bahnschrift SemiBold" panose="020B0502040204020203" pitchFamily="34" charset="0"/>
-            </a:endParaRPr>
-          </a:p>
-        </p:txBody>
-      </p:sp>
+              <a:t>DIAGRAMA DE ROBUSTEZ</a:t>
+            </a:r>
+          </a:p>
+        </p:txBody>
+      </p:sp>
+      <p:pic>
+        <p:nvPicPr>
+          <p:cNvPr id="4" name="Imagem 3">
+            <a:extLst>
+              <a:ext uri="{FF2B5EF4-FFF2-40B4-BE49-F238E27FC236}">
+                <a16:creationId xmlns:a16="http://schemas.microsoft.com/office/drawing/2014/main" id="{B0865A08-C8EF-4FBD-9A61-0BCEF47A1676}"/>
+              </a:ext>
+            </a:extLst>
+          </p:cNvPr>
+          <p:cNvPicPr>
+            <a:picLocks noChangeAspect="1"/>
+          </p:cNvPicPr>
+          <p:nvPr/>
+        </p:nvPicPr>
+        <p:blipFill>
+          <a:blip r:embed="rId3">
+            <a:extLst>
+              <a:ext uri="{28A0092B-C50C-407E-A947-70E740481C1C}">
+                <a14:useLocalDpi xmlns:a14="http://schemas.microsoft.com/office/drawing/2010/main" val="0"/>
+              </a:ext>
+            </a:extLst>
+          </a:blip>
+          <a:stretch>
+            <a:fillRect/>
+          </a:stretch>
+        </p:blipFill>
+        <p:spPr>
+          <a:xfrm>
+            <a:off x="8469667" y="699877"/>
+            <a:ext cx="5023510" cy="5224450"/>
+          </a:xfrm>
+          <a:prstGeom prst="rect">
+            <a:avLst/>
+          </a:prstGeom>
+        </p:spPr>
+      </p:pic>
+      <p:pic>
+        <p:nvPicPr>
+          <p:cNvPr id="8" name="Imagem 7">
+            <a:extLst>
+              <a:ext uri="{FF2B5EF4-FFF2-40B4-BE49-F238E27FC236}">
+                <a16:creationId xmlns:a16="http://schemas.microsoft.com/office/drawing/2014/main" id="{B0424F9F-8694-4914-8CE1-F9B2600FA2BA}"/>
+              </a:ext>
+            </a:extLst>
+          </p:cNvPr>
+          <p:cNvPicPr>
+            <a:picLocks noChangeAspect="1"/>
+          </p:cNvPicPr>
+          <p:nvPr/>
+        </p:nvPicPr>
+        <p:blipFill>
+          <a:blip r:embed="rId4">
+            <a:extLst>
+              <a:ext uri="{28A0092B-C50C-407E-A947-70E740481C1C}">
+                <a14:useLocalDpi xmlns:a14="http://schemas.microsoft.com/office/drawing/2010/main" val="0"/>
+              </a:ext>
+            </a:extLst>
+          </a:blip>
+          <a:stretch>
+            <a:fillRect/>
+          </a:stretch>
+        </p:blipFill>
+        <p:spPr>
+          <a:xfrm>
+            <a:off x="13999373" y="740938"/>
+            <a:ext cx="5085460" cy="4556059"/>
+          </a:xfrm>
+          <a:prstGeom prst="rect">
+            <a:avLst/>
+          </a:prstGeom>
+        </p:spPr>
+      </p:pic>
     </p:spTree>
     <p:extLst>
       <p:ext uri="{BB962C8B-B14F-4D97-AF65-F5344CB8AC3E}">
@@ -5005,13 +5099,6 @@
   <p:clrMapOvr>
     <a:masterClrMapping/>
   </p:clrMapOvr>
-  <p:timing>
-    <p:tnLst>
-      <p:par>
-        <p:cTn id="1" dur="indefinite" restart="never" nodeType="tmRoot"/>
-      </p:par>
-    </p:tnLst>
-  </p:timing>
 </p:sld>
 </file>
 
@@ -5131,7 +5218,6 @@
               <a:rPr lang="pt-BR" sz="1400" dirty="0"/>
               <a:t>Aluno </a:t>
             </a:r>
-            <a:endParaRPr lang="pt-BR" sz="1400" dirty="0" smtClean="0"/>
           </a:p>
           <a:p>
             <a:endParaRPr lang="pt-BR" sz="1400" dirty="0"/>
@@ -5191,11 +5277,7 @@
             </a:pPr>
             <a:r>
               <a:rPr lang="pt-BR" sz="1400" dirty="0"/>
-              <a:t>Caso de uso </a:t>
-            </a:r>
-            <a:r>
-              <a:rPr lang="pt-BR" sz="1400" dirty="0" smtClean="0"/>
-              <a:t>finalizado</a:t>
+              <a:t>Caso de uso finalizado</a:t>
             </a:r>
           </a:p>
           <a:p>
@@ -5237,11 +5319,7 @@
             </a:pPr>
             <a:r>
               <a:rPr lang="pt-BR" sz="1400" dirty="0"/>
-              <a:t>Retorna ao passo 1 do fluxo principal</a:t>
-            </a:r>
-            <a:r>
-              <a:rPr lang="pt-BR" sz="1400" dirty="0" smtClean="0"/>
-              <a:t>.</a:t>
+              <a:t>Retorna ao passo 1 do fluxo principal.</a:t>
             </a:r>
           </a:p>
           <a:p>
@@ -5314,14 +5392,11 @@
           <a:lstStyle/>
           <a:p>
             <a:r>
-              <a:rPr lang="pt-BR" sz="2400" b="1" dirty="0" smtClean="0">
+              <a:rPr lang="pt-BR" sz="2400" b="1" dirty="0">
                 <a:latin typeface="Bahnschrift SemiBold" panose="020B0502040204020203" pitchFamily="34" charset="0"/>
               </a:rPr>
               <a:t>JOGAR</a:t>
             </a:r>
-            <a:endParaRPr lang="pt-BR" sz="2400" b="1" dirty="0">
-              <a:latin typeface="Bahnschrift SemiBold" panose="020B0502040204020203" pitchFamily="34" charset="0"/>
-            </a:endParaRPr>
           </a:p>
         </p:txBody>
       </p:sp>
@@ -5400,9 +5475,6 @@
               </a:rPr>
               <a:t>DIAGRAMA DE SEQUÊNCIA</a:t>
             </a:r>
-            <a:endParaRPr lang="pt-BR" sz="1200" b="1" dirty="0">
-              <a:latin typeface="Bahnschrift SemiBold" panose="020B0502040204020203" pitchFamily="34" charset="0"/>
-            </a:endParaRPr>
           </a:p>
         </p:txBody>
       </p:sp>
@@ -5434,9 +5506,6 @@
               </a:rPr>
               <a:t>DIAGRAMA DE CLASSE</a:t>
             </a:r>
-            <a:endParaRPr lang="pt-BR" sz="1200" b="1" dirty="0">
-              <a:latin typeface="Bahnschrift SemiBold" panose="020B0502040204020203" pitchFamily="34" charset="0"/>
-            </a:endParaRPr>
           </a:p>
         </p:txBody>
       </p:sp>
@@ -5463,14 +5532,11 @@
           <a:lstStyle/>
           <a:p>
             <a:r>
-              <a:rPr lang="pt-BR" sz="1200" b="1" dirty="0" smtClean="0">
+              <a:rPr lang="pt-BR" sz="1200" b="1" dirty="0">
                 <a:latin typeface="Bahnschrift SemiBold" panose="020B0502040204020203" pitchFamily="34" charset="0"/>
               </a:rPr>
               <a:t>NOVA RODADA</a:t>
             </a:r>
-            <a:endParaRPr lang="pt-BR" sz="1200" b="1" dirty="0">
-              <a:latin typeface="Bahnschrift SemiBold" panose="020B0502040204020203" pitchFamily="34" charset="0"/>
-            </a:endParaRPr>
           </a:p>
         </p:txBody>
       </p:sp>
@@ -5500,17 +5566,8 @@
               <a:rPr lang="pt-BR" sz="1200" b="1" dirty="0">
                 <a:latin typeface="Bahnschrift SemiBold" panose="020B0502040204020203" pitchFamily="34" charset="0"/>
               </a:rPr>
-              <a:t>DIAGRAMA </a:t>
-            </a:r>
-            <a:r>
-              <a:rPr lang="pt-BR" sz="1200" b="1" dirty="0" smtClean="0">
-                <a:latin typeface="Bahnschrift SemiBold" panose="020B0502040204020203" pitchFamily="34" charset="0"/>
-              </a:rPr>
-              <a:t>DE ROBUSTEZ</a:t>
-            </a:r>
-            <a:endParaRPr lang="pt-BR" sz="1200" b="1" dirty="0">
-              <a:latin typeface="Bahnschrift SemiBold" panose="020B0502040204020203" pitchFamily="34" charset="0"/>
-            </a:endParaRPr>
+              <a:t>DIAGRAMA DE ROBUSTEZ</a:t>
+            </a:r>
           </a:p>
         </p:txBody>
       </p:sp>
@@ -5582,13 +5639,6 @@
   <p:clrMapOvr>
     <a:masterClrMapping/>
   </p:clrMapOvr>
-  <p:timing>
-    <p:tnLst>
-      <p:par>
-        <p:cTn id="1" dur="indefinite" restart="never" nodeType="tmRoot"/>
-      </p:par>
-    </p:tnLst>
-  </p:timing>
 </p:sld>
 </file>
 
@@ -5708,7 +5758,6 @@
               <a:rPr lang="pt-BR" sz="1400" dirty="0"/>
               <a:t>Aluno </a:t>
             </a:r>
-            <a:endParaRPr lang="pt-BR" sz="1400" dirty="0" smtClean="0"/>
           </a:p>
           <a:p>
             <a:endParaRPr lang="pt-BR" sz="1400" dirty="0"/>
@@ -5782,14 +5831,11 @@
           <a:lstStyle/>
           <a:p>
             <a:r>
-              <a:rPr lang="pt-BR" sz="2400" b="1" dirty="0" smtClean="0">
+              <a:rPr lang="pt-BR" sz="2400" b="1" dirty="0">
                 <a:latin typeface="Bahnschrift SemiBold" panose="020B0502040204020203" pitchFamily="34" charset="0"/>
               </a:rPr>
               <a:t>ACESSAR LOJA</a:t>
             </a:r>
-            <a:endParaRPr lang="pt-BR" sz="2400" b="1" dirty="0">
-              <a:latin typeface="Bahnschrift SemiBold" panose="020B0502040204020203" pitchFamily="34" charset="0"/>
-            </a:endParaRPr>
           </a:p>
         </p:txBody>
       </p:sp>
@@ -5868,9 +5914,6 @@
               </a:rPr>
               <a:t>DIAGRAMA DE SEQUÊNCIA</a:t>
             </a:r>
-            <a:endParaRPr lang="pt-BR" sz="1200" b="1" dirty="0">
-              <a:latin typeface="Bahnschrift SemiBold" panose="020B0502040204020203" pitchFamily="34" charset="0"/>
-            </a:endParaRPr>
           </a:p>
         </p:txBody>
       </p:sp>
@@ -5902,9 +5945,6 @@
               </a:rPr>
               <a:t>DIAGRAMA DE CLASSE</a:t>
             </a:r>
-            <a:endParaRPr lang="pt-BR" sz="1200" b="1" dirty="0">
-              <a:latin typeface="Bahnschrift SemiBold" panose="020B0502040204020203" pitchFamily="34" charset="0"/>
-            </a:endParaRPr>
           </a:p>
         </p:txBody>
       </p:sp>
@@ -5931,14 +5971,11 @@
           <a:lstStyle/>
           <a:p>
             <a:r>
-              <a:rPr lang="pt-BR" sz="1200" b="1" dirty="0" smtClean="0">
+              <a:rPr lang="pt-BR" sz="1200" b="1" dirty="0">
                 <a:latin typeface="Bahnschrift SemiBold" panose="020B0502040204020203" pitchFamily="34" charset="0"/>
               </a:rPr>
               <a:t>NOVA RODADA</a:t>
             </a:r>
-            <a:endParaRPr lang="pt-BR" sz="1200" b="1" dirty="0">
-              <a:latin typeface="Bahnschrift SemiBold" panose="020B0502040204020203" pitchFamily="34" charset="0"/>
-            </a:endParaRPr>
           </a:p>
         </p:txBody>
       </p:sp>
@@ -5968,17 +6005,8 @@
               <a:rPr lang="pt-BR" sz="1200" b="1" dirty="0">
                 <a:latin typeface="Bahnschrift SemiBold" panose="020B0502040204020203" pitchFamily="34" charset="0"/>
               </a:rPr>
-              <a:t>DIAGRAMA </a:t>
-            </a:r>
-            <a:r>
-              <a:rPr lang="pt-BR" sz="1200" b="1" dirty="0" smtClean="0">
-                <a:latin typeface="Bahnschrift SemiBold" panose="020B0502040204020203" pitchFamily="34" charset="0"/>
-              </a:rPr>
-              <a:t>DE ROBUSTEZ</a:t>
-            </a:r>
-            <a:endParaRPr lang="pt-BR" sz="1200" b="1" dirty="0">
-              <a:latin typeface="Bahnschrift SemiBold" panose="020B0502040204020203" pitchFamily="34" charset="0"/>
-            </a:endParaRPr>
+              <a:t>DIAGRAMA DE ROBUSTEZ</a:t>
+            </a:r>
           </a:p>
         </p:txBody>
       </p:sp>
@@ -6079,14 +6107,11 @@
           <a:lstStyle/>
           <a:p>
             <a:r>
-              <a:rPr lang="pt-BR" sz="1200" b="1" dirty="0" smtClean="0">
+              <a:rPr lang="pt-BR" sz="1200" b="1" dirty="0">
                 <a:latin typeface="Bahnschrift SemiBold" panose="020B0502040204020203" pitchFamily="34" charset="0"/>
               </a:rPr>
               <a:t>LOJA</a:t>
             </a:r>
-            <a:endParaRPr lang="pt-BR" sz="1200" b="1" dirty="0">
-              <a:latin typeface="Bahnschrift SemiBold" panose="020B0502040204020203" pitchFamily="34" charset="0"/>
-            </a:endParaRPr>
           </a:p>
         </p:txBody>
       </p:sp>
@@ -6119,6 +6144,78 @@
           </a:prstGeom>
         </p:spPr>
       </p:pic>
+      <p:pic>
+        <p:nvPicPr>
+          <p:cNvPr id="7" name="Imagem 6">
+            <a:extLst>
+              <a:ext uri="{FF2B5EF4-FFF2-40B4-BE49-F238E27FC236}">
+                <a16:creationId xmlns:a16="http://schemas.microsoft.com/office/drawing/2014/main" id="{61C9AF16-CCCC-4BE7-9A4C-43889135E8ED}"/>
+              </a:ext>
+            </a:extLst>
+          </p:cNvPr>
+          <p:cNvPicPr>
+            <a:picLocks noChangeAspect="1"/>
+          </p:cNvPicPr>
+          <p:nvPr/>
+        </p:nvPicPr>
+        <p:blipFill>
+          <a:blip r:embed="rId5">
+            <a:extLst>
+              <a:ext uri="{28A0092B-C50C-407E-A947-70E740481C1C}">
+                <a14:useLocalDpi xmlns:a14="http://schemas.microsoft.com/office/drawing/2010/main" val="0"/>
+              </a:ext>
+            </a:extLst>
+          </a:blip>
+          <a:stretch>
+            <a:fillRect/>
+          </a:stretch>
+        </p:blipFill>
+        <p:spPr>
+          <a:xfrm>
+            <a:off x="8388098" y="995777"/>
+            <a:ext cx="5761905" cy="3295238"/>
+          </a:xfrm>
+          <a:prstGeom prst="rect">
+            <a:avLst/>
+          </a:prstGeom>
+        </p:spPr>
+      </p:pic>
+      <p:pic>
+        <p:nvPicPr>
+          <p:cNvPr id="9" name="Imagem 8">
+            <a:extLst>
+              <a:ext uri="{FF2B5EF4-FFF2-40B4-BE49-F238E27FC236}">
+                <a16:creationId xmlns:a16="http://schemas.microsoft.com/office/drawing/2014/main" id="{A33E8D4C-17BA-4344-B634-999A86F38C22}"/>
+              </a:ext>
+            </a:extLst>
+          </p:cNvPr>
+          <p:cNvPicPr>
+            <a:picLocks noChangeAspect="1"/>
+          </p:cNvPicPr>
+          <p:nvPr/>
+        </p:nvPicPr>
+        <p:blipFill>
+          <a:blip r:embed="rId6">
+            <a:extLst>
+              <a:ext uri="{28A0092B-C50C-407E-A947-70E740481C1C}">
+                <a14:useLocalDpi xmlns:a14="http://schemas.microsoft.com/office/drawing/2010/main" val="0"/>
+              </a:ext>
+            </a:extLst>
+          </a:blip>
+          <a:stretch>
+            <a:fillRect/>
+          </a:stretch>
+        </p:blipFill>
+        <p:spPr>
+          <a:xfrm>
+            <a:off x="14637784" y="995777"/>
+            <a:ext cx="5028571" cy="3295238"/>
+          </a:xfrm>
+          <a:prstGeom prst="rect">
+            <a:avLst/>
+          </a:prstGeom>
+        </p:spPr>
+      </p:pic>
     </p:spTree>
     <p:extLst>
       <p:ext uri="{BB962C8B-B14F-4D97-AF65-F5344CB8AC3E}">
@@ -6129,13 +6226,6 @@
   <p:clrMapOvr>
     <a:masterClrMapping/>
   </p:clrMapOvr>
-  <p:timing>
-    <p:tnLst>
-      <p:par>
-        <p:cTn id="1" dur="indefinite" restart="never" nodeType="tmRoot"/>
-      </p:par>
-    </p:tnLst>
-  </p:timing>
 </p:sld>
 </file>
 
@@ -6255,7 +6345,6 @@
               <a:rPr lang="pt-BR" sz="1400" dirty="0"/>
               <a:t>Aluno </a:t>
             </a:r>
-            <a:endParaRPr lang="pt-BR" sz="1400" dirty="0" smtClean="0"/>
           </a:p>
           <a:p>
             <a:endParaRPr lang="pt-BR" sz="1400" dirty="0"/>
@@ -6295,11 +6384,7 @@
             </a:pPr>
             <a:r>
               <a:rPr lang="pt-BR" sz="1400" dirty="0"/>
-              <a:t>Caso de uso finalizado</a:t>
-            </a:r>
-            <a:r>
-              <a:rPr lang="pt-BR" sz="1400" dirty="0" smtClean="0"/>
-              <a:t>.</a:t>
+              <a:t>Caso de uso finalizado.</a:t>
             </a:r>
           </a:p>
           <a:p>
@@ -6377,14 +6462,11 @@
           <a:lstStyle/>
           <a:p>
             <a:r>
-              <a:rPr lang="pt-BR" sz="2400" b="1" dirty="0" smtClean="0">
+              <a:rPr lang="pt-BR" sz="2400" b="1" dirty="0">
                 <a:latin typeface="Bahnschrift SemiBold" panose="020B0502040204020203" pitchFamily="34" charset="0"/>
               </a:rPr>
               <a:t>COMPRAR ITEM - TEMPO</a:t>
             </a:r>
-            <a:endParaRPr lang="pt-BR" sz="2400" b="1" dirty="0">
-              <a:latin typeface="Bahnschrift SemiBold" panose="020B0502040204020203" pitchFamily="34" charset="0"/>
-            </a:endParaRPr>
           </a:p>
         </p:txBody>
       </p:sp>
@@ -6463,9 +6545,6 @@
               </a:rPr>
               <a:t>DIAGRAMA DE SEQUÊNCIA</a:t>
             </a:r>
-            <a:endParaRPr lang="pt-BR" sz="1200" b="1" dirty="0">
-              <a:latin typeface="Bahnschrift SemiBold" panose="020B0502040204020203" pitchFamily="34" charset="0"/>
-            </a:endParaRPr>
           </a:p>
         </p:txBody>
       </p:sp>
@@ -6497,9 +6576,6 @@
               </a:rPr>
               <a:t>DIAGRAMA DE CLASSE</a:t>
             </a:r>
-            <a:endParaRPr lang="pt-BR" sz="1200" b="1" dirty="0">
-              <a:latin typeface="Bahnschrift SemiBold" panose="020B0502040204020203" pitchFamily="34" charset="0"/>
-            </a:endParaRPr>
           </a:p>
         </p:txBody>
       </p:sp>
@@ -6529,17 +6605,8 @@
               <a:rPr lang="pt-BR" sz="1200" b="1" dirty="0">
                 <a:latin typeface="Bahnschrift SemiBold" panose="020B0502040204020203" pitchFamily="34" charset="0"/>
               </a:rPr>
-              <a:t>DIAGRAMA </a:t>
-            </a:r>
-            <a:r>
-              <a:rPr lang="pt-BR" sz="1200" b="1" dirty="0" smtClean="0">
-                <a:latin typeface="Bahnschrift SemiBold" panose="020B0502040204020203" pitchFamily="34" charset="0"/>
-              </a:rPr>
-              <a:t>DE ROBUSTEZ</a:t>
-            </a:r>
-            <a:endParaRPr lang="pt-BR" sz="1200" b="1" dirty="0">
-              <a:latin typeface="Bahnschrift SemiBold" panose="020B0502040204020203" pitchFamily="34" charset="0"/>
-            </a:endParaRPr>
+              <a:t>DIAGRAMA DE ROBUSTEZ</a:t>
+            </a:r>
           </a:p>
         </p:txBody>
       </p:sp>
@@ -6603,14 +6670,11 @@
           <a:lstStyle/>
           <a:p>
             <a:r>
-              <a:rPr lang="pt-BR" sz="1200" b="1" dirty="0" smtClean="0">
+              <a:rPr lang="pt-BR" sz="1200" b="1" dirty="0">
                 <a:latin typeface="Bahnschrift SemiBold" panose="020B0502040204020203" pitchFamily="34" charset="0"/>
               </a:rPr>
               <a:t>LOJA</a:t>
             </a:r>
-            <a:endParaRPr lang="pt-BR" sz="1200" b="1" dirty="0">
-              <a:latin typeface="Bahnschrift SemiBold" panose="020B0502040204020203" pitchFamily="34" charset="0"/>
-            </a:endParaRPr>
           </a:p>
         </p:txBody>
       </p:sp>
@@ -6653,13 +6717,6 @@
   <p:clrMapOvr>
     <a:masterClrMapping/>
   </p:clrMapOvr>
-  <p:timing>
-    <p:tnLst>
-      <p:par>
-        <p:cTn id="1" dur="indefinite" restart="never" nodeType="tmRoot"/>
-      </p:par>
-    </p:tnLst>
-  </p:timing>
 </p:sld>
 </file>
 
@@ -6779,7 +6836,6 @@
               <a:rPr lang="pt-BR" sz="1400" dirty="0"/>
               <a:t>Aluno </a:t>
             </a:r>
-            <a:endParaRPr lang="pt-BR" sz="1400" dirty="0" smtClean="0"/>
           </a:p>
           <a:p>
             <a:endParaRPr lang="pt-BR" sz="1400" dirty="0"/>
@@ -6824,11 +6880,7 @@
             </a:pPr>
             <a:r>
               <a:rPr lang="pt-BR" sz="1400" dirty="0"/>
-              <a:t>Caso de uso finalizado</a:t>
-            </a:r>
-            <a:r>
-              <a:rPr lang="pt-BR" sz="1400" dirty="0" smtClean="0"/>
-              <a:t>.</a:t>
+              <a:t>Caso de uso finalizado.</a:t>
             </a:r>
           </a:p>
           <a:p>
@@ -6904,14 +6956,11 @@
           <a:lstStyle/>
           <a:p>
             <a:r>
-              <a:rPr lang="pt-BR" sz="2400" b="1" dirty="0" smtClean="0">
+              <a:rPr lang="pt-BR" sz="2400" b="1" dirty="0">
                 <a:latin typeface="Bahnschrift SemiBold" panose="020B0502040204020203" pitchFamily="34" charset="0"/>
               </a:rPr>
               <a:t>COMPRAR ITEM - RESPOSTA</a:t>
             </a:r>
-            <a:endParaRPr lang="pt-BR" sz="2400" b="1" dirty="0">
-              <a:latin typeface="Bahnschrift SemiBold" panose="020B0502040204020203" pitchFamily="34" charset="0"/>
-            </a:endParaRPr>
           </a:p>
         </p:txBody>
       </p:sp>
@@ -6990,9 +7039,6 @@
               </a:rPr>
               <a:t>DIAGRAMA DE SEQUÊNCIA</a:t>
             </a:r>
-            <a:endParaRPr lang="pt-BR" sz="1200" b="1" dirty="0">
-              <a:latin typeface="Bahnschrift SemiBold" panose="020B0502040204020203" pitchFamily="34" charset="0"/>
-            </a:endParaRPr>
           </a:p>
         </p:txBody>
       </p:sp>
@@ -7024,9 +7070,6 @@
               </a:rPr>
               <a:t>DIAGRAMA DE CLASSE</a:t>
             </a:r>
-            <a:endParaRPr lang="pt-BR" sz="1200" b="1" dirty="0">
-              <a:latin typeface="Bahnschrift SemiBold" panose="020B0502040204020203" pitchFamily="34" charset="0"/>
-            </a:endParaRPr>
           </a:p>
         </p:txBody>
       </p:sp>
@@ -7056,17 +7099,8 @@
               <a:rPr lang="pt-BR" sz="1200" b="1" dirty="0">
                 <a:latin typeface="Bahnschrift SemiBold" panose="020B0502040204020203" pitchFamily="34" charset="0"/>
               </a:rPr>
-              <a:t>DIAGRAMA </a:t>
-            </a:r>
-            <a:r>
-              <a:rPr lang="pt-BR" sz="1200" b="1" dirty="0" smtClean="0">
-                <a:latin typeface="Bahnschrift SemiBold" panose="020B0502040204020203" pitchFamily="34" charset="0"/>
-              </a:rPr>
-              <a:t>DE ROBUSTEZ</a:t>
-            </a:r>
-            <a:endParaRPr lang="pt-BR" sz="1200" b="1" dirty="0">
-              <a:latin typeface="Bahnschrift SemiBold" panose="020B0502040204020203" pitchFamily="34" charset="0"/>
-            </a:endParaRPr>
+              <a:t>DIAGRAMA DE ROBUSTEZ</a:t>
+            </a:r>
           </a:p>
         </p:txBody>
       </p:sp>
@@ -7130,14 +7164,11 @@
           <a:lstStyle/>
           <a:p>
             <a:r>
-              <a:rPr lang="pt-BR" sz="1200" b="1" dirty="0" smtClean="0">
+              <a:rPr lang="pt-BR" sz="1200" b="1" dirty="0">
                 <a:latin typeface="Bahnschrift SemiBold" panose="020B0502040204020203" pitchFamily="34" charset="0"/>
               </a:rPr>
               <a:t>LOJA</a:t>
             </a:r>
-            <a:endParaRPr lang="pt-BR" sz="1200" b="1" dirty="0">
-              <a:latin typeface="Bahnschrift SemiBold" panose="020B0502040204020203" pitchFamily="34" charset="0"/>
-            </a:endParaRPr>
           </a:p>
         </p:txBody>
       </p:sp>
@@ -7180,13 +7211,6 @@
   <p:clrMapOvr>
     <a:masterClrMapping/>
   </p:clrMapOvr>
-  <p:timing>
-    <p:tnLst>
-      <p:par>
-        <p:cTn id="1" dur="indefinite" restart="never" nodeType="tmRoot"/>
-      </p:par>
-    </p:tnLst>
-  </p:timing>
 </p:sld>
 </file>
 
@@ -7306,7 +7330,6 @@
               <a:rPr lang="pt-BR" sz="1400" dirty="0"/>
               <a:t>Aluno </a:t>
             </a:r>
-            <a:endParaRPr lang="pt-BR" sz="1400" dirty="0" smtClean="0"/>
           </a:p>
           <a:p>
             <a:endParaRPr lang="pt-BR" sz="1400" dirty="0"/>
@@ -7346,11 +7369,7 @@
             </a:pPr>
             <a:r>
               <a:rPr lang="pt-BR" sz="1400" dirty="0"/>
-              <a:t>Caso de uso finalizado</a:t>
-            </a:r>
-            <a:r>
-              <a:rPr lang="pt-BR" sz="1400" dirty="0" smtClean="0"/>
-              <a:t>.</a:t>
+              <a:t>Caso de uso finalizado.</a:t>
             </a:r>
           </a:p>
           <a:p>
@@ -7426,14 +7445,11 @@
           <a:lstStyle/>
           <a:p>
             <a:r>
-              <a:rPr lang="pt-BR" sz="2400" b="1" dirty="0" smtClean="0">
+              <a:rPr lang="pt-BR" sz="2400" b="1" dirty="0">
                 <a:latin typeface="Bahnschrift SemiBold" panose="020B0502040204020203" pitchFamily="34" charset="0"/>
               </a:rPr>
               <a:t>COMPRAR ITEM - PONTOS</a:t>
             </a:r>
-            <a:endParaRPr lang="pt-BR" sz="2400" b="1" dirty="0">
-              <a:latin typeface="Bahnschrift SemiBold" panose="020B0502040204020203" pitchFamily="34" charset="0"/>
-            </a:endParaRPr>
           </a:p>
         </p:txBody>
       </p:sp>
@@ -7512,9 +7528,6 @@
               </a:rPr>
               <a:t>DIAGRAMA DE SEQUÊNCIA</a:t>
             </a:r>
-            <a:endParaRPr lang="pt-BR" sz="1200" b="1" dirty="0">
-              <a:latin typeface="Bahnschrift SemiBold" panose="020B0502040204020203" pitchFamily="34" charset="0"/>
-            </a:endParaRPr>
           </a:p>
         </p:txBody>
       </p:sp>
@@ -7546,9 +7559,6 @@
               </a:rPr>
               <a:t>DIAGRAMA DE CLASSE</a:t>
             </a:r>
-            <a:endParaRPr lang="pt-BR" sz="1200" b="1" dirty="0">
-              <a:latin typeface="Bahnschrift SemiBold" panose="020B0502040204020203" pitchFamily="34" charset="0"/>
-            </a:endParaRPr>
           </a:p>
         </p:txBody>
       </p:sp>
@@ -7578,17 +7588,8 @@
               <a:rPr lang="pt-BR" sz="1200" b="1" dirty="0">
                 <a:latin typeface="Bahnschrift SemiBold" panose="020B0502040204020203" pitchFamily="34" charset="0"/>
               </a:rPr>
-              <a:t>DIAGRAMA </a:t>
-            </a:r>
-            <a:r>
-              <a:rPr lang="pt-BR" sz="1200" b="1" dirty="0" smtClean="0">
-                <a:latin typeface="Bahnschrift SemiBold" panose="020B0502040204020203" pitchFamily="34" charset="0"/>
-              </a:rPr>
-              <a:t>DE ROBUSTEZ</a:t>
-            </a:r>
-            <a:endParaRPr lang="pt-BR" sz="1200" b="1" dirty="0">
-              <a:latin typeface="Bahnschrift SemiBold" panose="020B0502040204020203" pitchFamily="34" charset="0"/>
-            </a:endParaRPr>
+              <a:t>DIAGRAMA DE ROBUSTEZ</a:t>
+            </a:r>
           </a:p>
         </p:txBody>
       </p:sp>
@@ -7652,14 +7653,11 @@
           <a:lstStyle/>
           <a:p>
             <a:r>
-              <a:rPr lang="pt-BR" sz="1200" b="1" dirty="0" smtClean="0">
+              <a:rPr lang="pt-BR" sz="1200" b="1" dirty="0">
                 <a:latin typeface="Bahnschrift SemiBold" panose="020B0502040204020203" pitchFamily="34" charset="0"/>
               </a:rPr>
               <a:t>LOJA</a:t>
             </a:r>
-            <a:endParaRPr lang="pt-BR" sz="1200" b="1" dirty="0">
-              <a:latin typeface="Bahnschrift SemiBold" panose="020B0502040204020203" pitchFamily="34" charset="0"/>
-            </a:endParaRPr>
           </a:p>
         </p:txBody>
       </p:sp>
@@ -7702,13 +7700,6 @@
   <p:clrMapOvr>
     <a:masterClrMapping/>
   </p:clrMapOvr>
-  <p:timing>
-    <p:tnLst>
-      <p:par>
-        <p:cTn id="1" dur="indefinite" restart="never" nodeType="tmRoot"/>
-      </p:par>
-    </p:tnLst>
-  </p:timing>
 </p:sld>
 </file>
 
@@ -7828,7 +7819,6 @@
               <a:rPr lang="pt-BR" sz="1400" dirty="0"/>
               <a:t>Professor </a:t>
             </a:r>
-            <a:endParaRPr lang="pt-BR" sz="1400" dirty="0" smtClean="0"/>
           </a:p>
           <a:p>
             <a:endParaRPr lang="pt-BR" sz="1400" dirty="0"/>
@@ -7888,11 +7878,7 @@
             </a:pPr>
             <a:r>
               <a:rPr lang="pt-BR" sz="1400" dirty="0"/>
-              <a:t>Caso de uso </a:t>
-            </a:r>
-            <a:r>
-              <a:rPr lang="pt-BR" sz="1400" dirty="0" smtClean="0"/>
-              <a:t>finalizado</a:t>
+              <a:t>Caso de uso finalizado</a:t>
             </a:r>
           </a:p>
           <a:p>
@@ -7968,14 +7954,11 @@
           <a:lstStyle/>
           <a:p>
             <a:r>
-              <a:rPr lang="pt-BR" sz="2400" b="1" dirty="0" smtClean="0">
+              <a:rPr lang="pt-BR" sz="2400" b="1" dirty="0">
                 <a:latin typeface="Bahnschrift SemiBold" panose="020B0502040204020203" pitchFamily="34" charset="0"/>
               </a:rPr>
               <a:t>CADASTRA PERGUNTA PARA O QUIZ</a:t>
             </a:r>
-            <a:endParaRPr lang="pt-BR" sz="2400" b="1" dirty="0">
-              <a:latin typeface="Bahnschrift SemiBold" panose="020B0502040204020203" pitchFamily="34" charset="0"/>
-            </a:endParaRPr>
           </a:p>
         </p:txBody>
       </p:sp>
@@ -8054,9 +8037,6 @@
               </a:rPr>
               <a:t>DIAGRAMA DE SEQUÊNCIA</a:t>
             </a:r>
-            <a:endParaRPr lang="pt-BR" sz="1200" b="1" dirty="0">
-              <a:latin typeface="Bahnschrift SemiBold" panose="020B0502040204020203" pitchFamily="34" charset="0"/>
-            </a:endParaRPr>
           </a:p>
         </p:txBody>
       </p:sp>
@@ -8088,9 +8068,6 @@
               </a:rPr>
               <a:t>DIAGRAMA DE CLASSE</a:t>
             </a:r>
-            <a:endParaRPr lang="pt-BR" sz="1200" b="1" dirty="0">
-              <a:latin typeface="Bahnschrift SemiBold" panose="020B0502040204020203" pitchFamily="34" charset="0"/>
-            </a:endParaRPr>
           </a:p>
         </p:txBody>
       </p:sp>
@@ -8120,17 +8097,8 @@
               <a:rPr lang="pt-BR" sz="1200" b="1" dirty="0">
                 <a:latin typeface="Bahnschrift SemiBold" panose="020B0502040204020203" pitchFamily="34" charset="0"/>
               </a:rPr>
-              <a:t>DIAGRAMA </a:t>
-            </a:r>
-            <a:r>
-              <a:rPr lang="pt-BR" sz="1200" b="1" dirty="0" smtClean="0">
-                <a:latin typeface="Bahnschrift SemiBold" panose="020B0502040204020203" pitchFamily="34" charset="0"/>
-              </a:rPr>
-              <a:t>DE ROBUSTEZ</a:t>
-            </a:r>
-            <a:endParaRPr lang="pt-BR" sz="1200" b="1" dirty="0">
-              <a:latin typeface="Bahnschrift SemiBold" panose="020B0502040204020203" pitchFamily="34" charset="0"/>
-            </a:endParaRPr>
+              <a:t>DIAGRAMA DE ROBUSTEZ</a:t>
+            </a:r>
           </a:p>
         </p:txBody>
       </p:sp>
@@ -8157,14 +8125,11 @@
           <a:lstStyle/>
           <a:p>
             <a:r>
-              <a:rPr lang="pt-BR" sz="1200" b="1" dirty="0" smtClean="0">
+              <a:rPr lang="pt-BR" sz="1200" b="1" dirty="0">
                 <a:latin typeface="Bahnschrift SemiBold" panose="020B0502040204020203" pitchFamily="34" charset="0"/>
               </a:rPr>
               <a:t>LOJA</a:t>
             </a:r>
-            <a:endParaRPr lang="pt-BR" sz="1200" b="1" dirty="0">
-              <a:latin typeface="Bahnschrift SemiBold" panose="020B0502040204020203" pitchFamily="34" charset="0"/>
-            </a:endParaRPr>
           </a:p>
         </p:txBody>
       </p:sp>
@@ -8264,14 +8229,11 @@
           <a:lstStyle/>
           <a:p>
             <a:r>
-              <a:rPr lang="pt-BR" sz="1200" b="1" dirty="0" smtClean="0">
+              <a:rPr lang="pt-BR" sz="1200" b="1" dirty="0">
                 <a:latin typeface="Bahnschrift SemiBold" panose="020B0502040204020203" pitchFamily="34" charset="0"/>
               </a:rPr>
               <a:t>LOJA</a:t>
             </a:r>
-            <a:endParaRPr lang="pt-BR" sz="1200" b="1" dirty="0">
-              <a:latin typeface="Bahnschrift SemiBold" panose="020B0502040204020203" pitchFamily="34" charset="0"/>
-            </a:endParaRPr>
           </a:p>
         </p:txBody>
       </p:sp>
@@ -8314,13 +8276,6 @@
   <p:clrMapOvr>
     <a:masterClrMapping/>
   </p:clrMapOvr>
-  <p:timing>
-    <p:tnLst>
-      <p:par>
-        <p:cTn id="1" dur="indefinite" restart="never" nodeType="tmRoot"/>
-      </p:par>
-    </p:tnLst>
-  </p:timing>
 </p:sld>
 </file>
 
@@ -8440,7 +8395,6 @@
               <a:rPr lang="pt-BR" sz="1400" dirty="0"/>
               <a:t>Aluno </a:t>
             </a:r>
-            <a:endParaRPr lang="pt-BR" sz="1400" dirty="0" smtClean="0"/>
           </a:p>
           <a:p>
             <a:endParaRPr lang="pt-BR" sz="1400" dirty="0"/>
@@ -8470,13 +8424,8 @@
             </a:pPr>
             <a:r>
               <a:rPr lang="pt-BR" sz="1400" dirty="0"/>
-              <a:t>Sistema abre a tela “Ajuda</a:t>
-            </a:r>
-            <a:r>
-              <a:rPr lang="pt-BR" sz="1400" dirty="0" smtClean="0"/>
-              <a:t>”</a:t>
-            </a:r>
-            <a:endParaRPr lang="pt-BR" sz="1400" dirty="0"/>
+              <a:t>Sistema abre a tela “Ajuda”</a:t>
+            </a:r>
           </a:p>
           <a:p>
             <a:endParaRPr lang="pt-BR" sz="1890" dirty="0"/>
@@ -8506,14 +8455,11 @@
           <a:lstStyle/>
           <a:p>
             <a:r>
-              <a:rPr lang="pt-BR" sz="2400" b="1" dirty="0" smtClean="0">
+              <a:rPr lang="pt-BR" sz="2400" b="1" dirty="0">
                 <a:latin typeface="Bahnschrift SemiBold" panose="020B0502040204020203" pitchFamily="34" charset="0"/>
               </a:rPr>
               <a:t>ACESSAR COMO FUNCIONA</a:t>
             </a:r>
-            <a:endParaRPr lang="pt-BR" sz="2400" b="1" dirty="0">
-              <a:latin typeface="Bahnschrift SemiBold" panose="020B0502040204020203" pitchFamily="34" charset="0"/>
-            </a:endParaRPr>
           </a:p>
         </p:txBody>
       </p:sp>
@@ -8592,9 +8538,6 @@
               </a:rPr>
               <a:t>DIAGRAMA DE SEQUÊNCIA</a:t>
             </a:r>
-            <a:endParaRPr lang="pt-BR" sz="1200" b="1" dirty="0">
-              <a:latin typeface="Bahnschrift SemiBold" panose="020B0502040204020203" pitchFamily="34" charset="0"/>
-            </a:endParaRPr>
           </a:p>
         </p:txBody>
       </p:sp>
@@ -8626,9 +8569,6 @@
               </a:rPr>
               <a:t>DIAGRAMA DE CLASSE</a:t>
             </a:r>
-            <a:endParaRPr lang="pt-BR" sz="1200" b="1" dirty="0">
-              <a:latin typeface="Bahnschrift SemiBold" panose="020B0502040204020203" pitchFamily="34" charset="0"/>
-            </a:endParaRPr>
           </a:p>
         </p:txBody>
       </p:sp>
@@ -8658,17 +8598,8 @@
               <a:rPr lang="pt-BR" sz="1200" b="1" dirty="0">
                 <a:latin typeface="Bahnschrift SemiBold" panose="020B0502040204020203" pitchFamily="34" charset="0"/>
               </a:rPr>
-              <a:t>DIAGRAMA </a:t>
-            </a:r>
-            <a:r>
-              <a:rPr lang="pt-BR" sz="1200" b="1" dirty="0" smtClean="0">
-                <a:latin typeface="Bahnschrift SemiBold" panose="020B0502040204020203" pitchFamily="34" charset="0"/>
-              </a:rPr>
-              <a:t>DE ROBUSTEZ</a:t>
-            </a:r>
-            <a:endParaRPr lang="pt-BR" sz="1200" b="1" dirty="0">
-              <a:latin typeface="Bahnschrift SemiBold" panose="020B0502040204020203" pitchFamily="34" charset="0"/>
-            </a:endParaRPr>
+              <a:t>DIAGRAMA DE ROBUSTEZ</a:t>
+            </a:r>
           </a:p>
         </p:txBody>
       </p:sp>
@@ -8695,14 +8626,11 @@
           <a:lstStyle/>
           <a:p>
             <a:r>
-              <a:rPr lang="pt-BR" sz="1200" b="1" dirty="0" smtClean="0">
+              <a:rPr lang="pt-BR" sz="1200" b="1" dirty="0">
                 <a:latin typeface="Bahnschrift SemiBold" panose="020B0502040204020203" pitchFamily="34" charset="0"/>
               </a:rPr>
               <a:t>AJUDA</a:t>
             </a:r>
-            <a:endParaRPr lang="pt-BR" sz="1200" b="1" dirty="0">
-              <a:latin typeface="Bahnschrift SemiBold" panose="020B0502040204020203" pitchFamily="34" charset="0"/>
-            </a:endParaRPr>
           </a:p>
         </p:txBody>
       </p:sp>
@@ -8782,13 +8710,6 @@
   <p:clrMapOvr>
     <a:masterClrMapping/>
   </p:clrMapOvr>
-  <p:timing>
-    <p:tnLst>
-      <p:par>
-        <p:cTn id="1" dur="indefinite" restart="never" nodeType="tmRoot"/>
-      </p:par>
-    </p:tnLst>
-  </p:timing>
 </p:sld>
 </file>
 
@@ -8899,11 +8820,7 @@
             </a:r>
             <a:r>
               <a:rPr lang="pt-BR" sz="1400" dirty="0"/>
-              <a:t>Aluno e </a:t>
-            </a:r>
-            <a:r>
-              <a:rPr lang="pt-BR" sz="1400" dirty="0" smtClean="0"/>
-              <a:t>Professor</a:t>
+              <a:t>Aluno e Professor</a:t>
             </a:r>
           </a:p>
           <a:p>
@@ -8950,11 +8867,7 @@
             </a:pPr>
             <a:r>
               <a:rPr lang="pt-BR" sz="1400" dirty="0"/>
-              <a:t>Caso de uso </a:t>
-            </a:r>
-            <a:r>
-              <a:rPr lang="pt-BR" sz="1400" dirty="0" smtClean="0"/>
-              <a:t>finalizado</a:t>
+              <a:t>Caso de uso finalizado</a:t>
             </a:r>
           </a:p>
           <a:p>
@@ -9038,9 +8951,6 @@
               </a:rPr>
               <a:t>LOGAR</a:t>
             </a:r>
-            <a:endParaRPr lang="pt-BR" sz="2400" b="1" dirty="0">
-              <a:latin typeface="Bahnschrift SemiBold" panose="020B0502040204020203" pitchFamily="34" charset="0"/>
-            </a:endParaRPr>
           </a:p>
         </p:txBody>
       </p:sp>
@@ -9072,9 +8982,6 @@
               </a:rPr>
               <a:t>TELA LOGIN ALUNO</a:t>
             </a:r>
-            <a:endParaRPr lang="pt-BR" sz="1200" b="1" dirty="0">
-              <a:latin typeface="Bahnschrift SemiBold" panose="020B0502040204020203" pitchFamily="34" charset="0"/>
-            </a:endParaRPr>
           </a:p>
         </p:txBody>
       </p:sp>
@@ -9225,9 +9132,6 @@
               </a:rPr>
               <a:t>MENSAGEM ERRO</a:t>
             </a:r>
-            <a:endParaRPr lang="pt-BR" sz="1200" b="1" dirty="0">
-              <a:latin typeface="Bahnschrift SemiBold" panose="020B0502040204020203" pitchFamily="34" charset="0"/>
-            </a:endParaRPr>
           </a:p>
         </p:txBody>
       </p:sp>
@@ -9311,11 +9215,6 @@
                 </a:rPr>
                 <a:t>Usuário ou Senha incorretos</a:t>
               </a:r>
-              <a:endParaRPr lang="pt-BR" sz="945" dirty="0">
-                <a:solidFill>
-                  <a:srgbClr val="FF0000"/>
-                </a:solidFill>
-              </a:endParaRPr>
             </a:p>
           </p:txBody>
         </p:sp>
@@ -9348,9 +9247,6 @@
               </a:rPr>
               <a:t>TELA LOGIN PROFESSOR</a:t>
             </a:r>
-            <a:endParaRPr lang="pt-BR" sz="1200" b="1" dirty="0">
-              <a:latin typeface="Bahnschrift SemiBold" panose="020B0502040204020203" pitchFamily="34" charset="0"/>
-            </a:endParaRPr>
           </a:p>
         </p:txBody>
       </p:sp>
@@ -9412,15 +9308,114 @@
           </a:prstGeom>
         </p:spPr>
       </p:pic>
+      <p:sp>
+        <p:nvSpPr>
+          <p:cNvPr id="25" name="CaixaDeTexto 24"/>
+          <p:cNvSpPr txBox="1"/>
+          <p:nvPr/>
+        </p:nvSpPr>
+        <p:spPr>
+          <a:xfrm>
+            <a:off x="9878589" y="42183"/>
+            <a:ext cx="3838308" cy="276999"/>
+          </a:xfrm>
+          <a:prstGeom prst="rect">
+            <a:avLst/>
+          </a:prstGeom>
+          <a:noFill/>
+        </p:spPr>
+        <p:txBody>
+          <a:bodyPr wrap="square" rtlCol="0">
+            <a:spAutoFit/>
+          </a:bodyPr>
+          <a:lstStyle/>
+          <a:p>
+            <a:r>
+              <a:rPr lang="pt-BR" sz="1200" b="1" dirty="0">
+                <a:latin typeface="Bahnschrift SemiBold" panose="020B0502040204020203" pitchFamily="34" charset="0"/>
+              </a:rPr>
+              <a:t>DIAGRAMA DE SEQUENCIA</a:t>
+            </a:r>
+          </a:p>
+        </p:txBody>
+      </p:sp>
+      <p:sp>
+        <p:nvSpPr>
+          <p:cNvPr id="26" name="CaixaDeTexto 25"/>
+          <p:cNvSpPr txBox="1"/>
+          <p:nvPr/>
+        </p:nvSpPr>
+        <p:spPr>
+          <a:xfrm>
+            <a:off x="16466230" y="64706"/>
+            <a:ext cx="3838308" cy="276999"/>
+          </a:xfrm>
+          <a:prstGeom prst="rect">
+            <a:avLst/>
+          </a:prstGeom>
+          <a:noFill/>
+        </p:spPr>
+        <p:txBody>
+          <a:bodyPr wrap="square" rtlCol="0">
+            <a:spAutoFit/>
+          </a:bodyPr>
+          <a:lstStyle/>
+          <a:p>
+            <a:r>
+              <a:rPr lang="pt-BR" sz="1200" b="1" dirty="0">
+                <a:latin typeface="Bahnschrift SemiBold" panose="020B0502040204020203" pitchFamily="34" charset="0"/>
+              </a:rPr>
+              <a:t>DIAGRAMA DE CLASSE</a:t>
+            </a:r>
+          </a:p>
+        </p:txBody>
+      </p:sp>
+      <p:sp>
+        <p:nvSpPr>
+          <p:cNvPr id="27" name="CaixaDeTexto 26"/>
+          <p:cNvSpPr txBox="1"/>
+          <p:nvPr/>
+        </p:nvSpPr>
+        <p:spPr>
+          <a:xfrm>
+            <a:off x="11617619" y="5726400"/>
+            <a:ext cx="3838308" cy="276999"/>
+          </a:xfrm>
+          <a:prstGeom prst="rect">
+            <a:avLst/>
+          </a:prstGeom>
+          <a:noFill/>
+        </p:spPr>
+        <p:txBody>
+          <a:bodyPr wrap="square" rtlCol="0">
+            <a:spAutoFit/>
+          </a:bodyPr>
+          <a:lstStyle/>
+          <a:p>
+            <a:r>
+              <a:rPr lang="pt-BR" sz="1200" b="1" dirty="0">
+                <a:latin typeface="Bahnschrift SemiBold" panose="020B0502040204020203" pitchFamily="34" charset="0"/>
+              </a:rPr>
+              <a:t>DIAGRAMA DE ROBUSTEZ</a:t>
+            </a:r>
+          </a:p>
+        </p:txBody>
+      </p:sp>
       <p:pic>
         <p:nvPicPr>
-          <p:cNvPr id="11" name="Imagem 10"/>
+          <p:cNvPr id="10" name="Imagem 9">
+            <a:extLst>
+              <a:ext uri="{FF2B5EF4-FFF2-40B4-BE49-F238E27FC236}">
+                <a16:creationId xmlns:a16="http://schemas.microsoft.com/office/drawing/2014/main" id="{661CF106-30F7-4709-B0CF-3E334DAD90ED}"/>
+              </a:ext>
+            </a:extLst>
+          </p:cNvPr>
           <p:cNvPicPr>
             <a:picLocks noChangeAspect="1"/>
           </p:cNvPicPr>
           <p:nvPr/>
         </p:nvPicPr>
-        <p:blipFill rotWithShape="1">
+        <p:blipFill>
           <a:blip r:embed="rId6">
             <a:extLst>
               <a:ext uri="{28A0092B-C50C-407E-A947-70E740481C1C}">
@@ -9428,127 +9423,20 @@
               </a:ext>
             </a:extLst>
           </a:blip>
-          <a:srcRect l="19010" t="6116" r="2347" b="5543"/>
-          <a:stretch/>
+          <a:stretch>
+            <a:fillRect/>
+          </a:stretch>
         </p:blipFill>
         <p:spPr>
           <a:xfrm>
-            <a:off x="14923227" y="618704"/>
-            <a:ext cx="4680183" cy="4527981"/>
+            <a:off x="14675176" y="319182"/>
+            <a:ext cx="5013955" cy="4928415"/>
           </a:xfrm>
           <a:prstGeom prst="rect">
             <a:avLst/>
           </a:prstGeom>
         </p:spPr>
       </p:pic>
-      <p:sp>
-        <p:nvSpPr>
-          <p:cNvPr id="25" name="CaixaDeTexto 24"/>
-          <p:cNvSpPr txBox="1"/>
-          <p:nvPr/>
-        </p:nvSpPr>
-        <p:spPr>
-          <a:xfrm>
-            <a:off x="9878589" y="42183"/>
-            <a:ext cx="3838308" cy="276999"/>
-          </a:xfrm>
-          <a:prstGeom prst="rect">
-            <a:avLst/>
-          </a:prstGeom>
-          <a:noFill/>
-        </p:spPr>
-        <p:txBody>
-          <a:bodyPr wrap="square" rtlCol="0">
-            <a:spAutoFit/>
-          </a:bodyPr>
-          <a:lstStyle/>
-          <a:p>
-            <a:r>
-              <a:rPr lang="pt-BR" sz="1200" b="1" dirty="0">
-                <a:latin typeface="Bahnschrift SemiBold" panose="020B0502040204020203" pitchFamily="34" charset="0"/>
-              </a:rPr>
-              <a:t>DIAGRAMA DE SEQUENCIA</a:t>
-            </a:r>
-            <a:endParaRPr lang="pt-BR" sz="1200" b="1" dirty="0">
-              <a:latin typeface="Bahnschrift SemiBold" panose="020B0502040204020203" pitchFamily="34" charset="0"/>
-            </a:endParaRPr>
-          </a:p>
-        </p:txBody>
-      </p:sp>
-      <p:sp>
-        <p:nvSpPr>
-          <p:cNvPr id="26" name="CaixaDeTexto 25"/>
-          <p:cNvSpPr txBox="1"/>
-          <p:nvPr/>
-        </p:nvSpPr>
-        <p:spPr>
-          <a:xfrm>
-            <a:off x="16466230" y="64706"/>
-            <a:ext cx="3838308" cy="276999"/>
-          </a:xfrm>
-          <a:prstGeom prst="rect">
-            <a:avLst/>
-          </a:prstGeom>
-          <a:noFill/>
-        </p:spPr>
-        <p:txBody>
-          <a:bodyPr wrap="square" rtlCol="0">
-            <a:spAutoFit/>
-          </a:bodyPr>
-          <a:lstStyle/>
-          <a:p>
-            <a:r>
-              <a:rPr lang="pt-BR" sz="1200" b="1" dirty="0">
-                <a:latin typeface="Bahnschrift SemiBold" panose="020B0502040204020203" pitchFamily="34" charset="0"/>
-              </a:rPr>
-              <a:t>DIAGRAMA DE </a:t>
-            </a:r>
-            <a:r>
-              <a:rPr lang="pt-BR" sz="1200" b="1" dirty="0" smtClean="0">
-                <a:latin typeface="Bahnschrift SemiBold" panose="020B0502040204020203" pitchFamily="34" charset="0"/>
-              </a:rPr>
-              <a:t>CLASSE</a:t>
-            </a:r>
-            <a:endParaRPr lang="pt-BR" sz="1200" b="1" dirty="0">
-              <a:latin typeface="Bahnschrift SemiBold" panose="020B0502040204020203" pitchFamily="34" charset="0"/>
-            </a:endParaRPr>
-          </a:p>
-        </p:txBody>
-      </p:sp>
-      <p:sp>
-        <p:nvSpPr>
-          <p:cNvPr id="27" name="CaixaDeTexto 26"/>
-          <p:cNvSpPr txBox="1"/>
-          <p:nvPr/>
-        </p:nvSpPr>
-        <p:spPr>
-          <a:xfrm>
-            <a:off x="11617619" y="5726400"/>
-            <a:ext cx="3838308" cy="276999"/>
-          </a:xfrm>
-          <a:prstGeom prst="rect">
-            <a:avLst/>
-          </a:prstGeom>
-          <a:noFill/>
-        </p:spPr>
-        <p:txBody>
-          <a:bodyPr wrap="square" rtlCol="0">
-            <a:spAutoFit/>
-          </a:bodyPr>
-          <a:lstStyle/>
-          <a:p>
-            <a:r>
-              <a:rPr lang="pt-BR" sz="1200" b="1" dirty="0" smtClean="0">
-                <a:latin typeface="Bahnschrift SemiBold" panose="020B0502040204020203" pitchFamily="34" charset="0"/>
-              </a:rPr>
-              <a:t>DIAGRAMA DE ROBUSTEZ</a:t>
-            </a:r>
-            <a:endParaRPr lang="pt-BR" sz="1200" b="1" dirty="0">
-              <a:latin typeface="Bahnschrift SemiBold" panose="020B0502040204020203" pitchFamily="34" charset="0"/>
-            </a:endParaRPr>
-          </a:p>
-        </p:txBody>
-      </p:sp>
     </p:spTree>
     <p:extLst>
       <p:ext uri="{BB962C8B-B14F-4D97-AF65-F5344CB8AC3E}">
@@ -9559,13 +9447,6 @@
   <p:clrMapOvr>
     <a:masterClrMapping/>
   </p:clrMapOvr>
-  <p:timing>
-    <p:tnLst>
-      <p:par>
-        <p:cTn id="1" dur="indefinite" restart="never" nodeType="tmRoot"/>
-      </p:par>
-    </p:tnLst>
-  </p:timing>
 </p:sld>
 </file>
 
@@ -9679,7 +9560,7 @@
               <a:t>Atores: </a:t>
             </a:r>
             <a:r>
-              <a:rPr lang="pt-BR" sz="1400" dirty="0" smtClean="0"/>
+              <a:rPr lang="pt-BR" sz="1400" dirty="0"/>
               <a:t>Aluno</a:t>
             </a:r>
           </a:p>
@@ -9741,11 +9622,7 @@
             </a:pPr>
             <a:r>
               <a:rPr lang="pt-BR" sz="1400" dirty="0"/>
-              <a:t>Caso de uso finalizado</a:t>
-            </a:r>
-            <a:r>
-              <a:rPr lang="pt-BR" sz="1400" dirty="0" smtClean="0"/>
-              <a:t>.</a:t>
+              <a:t>Caso de uso finalizado.</a:t>
             </a:r>
           </a:p>
           <a:p>
@@ -9827,9 +9704,6 @@
               </a:rPr>
               <a:t>CADASTRAR ALUNO</a:t>
             </a:r>
-            <a:endParaRPr lang="pt-BR" sz="2400" b="1" dirty="0">
-              <a:latin typeface="Bahnschrift SemiBold" panose="020B0502040204020203" pitchFamily="34" charset="0"/>
-            </a:endParaRPr>
           </a:p>
         </p:txBody>
       </p:sp>
@@ -9861,9 +9735,6 @@
               </a:rPr>
               <a:t>TELA LOGIN ALUNO</a:t>
             </a:r>
-            <a:endParaRPr lang="pt-BR" sz="1200" b="1" dirty="0">
-              <a:latin typeface="Bahnschrift SemiBold" panose="020B0502040204020203" pitchFamily="34" charset="0"/>
-            </a:endParaRPr>
           </a:p>
         </p:txBody>
       </p:sp>
@@ -9979,9 +9850,6 @@
               </a:rPr>
               <a:t>TELA DE CADASTRO</a:t>
             </a:r>
-            <a:endParaRPr lang="pt-BR" sz="1200" b="1" dirty="0">
-              <a:latin typeface="Bahnschrift SemiBold" panose="020B0502040204020203" pitchFamily="34" charset="0"/>
-            </a:endParaRPr>
           </a:p>
         </p:txBody>
       </p:sp>
@@ -10044,15 +9912,114 @@
           </a:prstGeom>
         </p:spPr>
       </p:pic>
+      <p:sp>
+        <p:nvSpPr>
+          <p:cNvPr id="19" name="CaixaDeTexto 18"/>
+          <p:cNvSpPr txBox="1"/>
+          <p:nvPr/>
+        </p:nvSpPr>
+        <p:spPr>
+          <a:xfrm>
+            <a:off x="11615949" y="133072"/>
+            <a:ext cx="3838308" cy="276999"/>
+          </a:xfrm>
+          <a:prstGeom prst="rect">
+            <a:avLst/>
+          </a:prstGeom>
+          <a:noFill/>
+        </p:spPr>
+        <p:txBody>
+          <a:bodyPr wrap="square" rtlCol="0">
+            <a:spAutoFit/>
+          </a:bodyPr>
+          <a:lstStyle/>
+          <a:p>
+            <a:r>
+              <a:rPr lang="pt-BR" sz="1200" b="1" dirty="0">
+                <a:latin typeface="Bahnschrift SemiBold" panose="020B0502040204020203" pitchFamily="34" charset="0"/>
+              </a:rPr>
+              <a:t>DIAGRAMA DE SEQUENCIA</a:t>
+            </a:r>
+          </a:p>
+        </p:txBody>
+      </p:sp>
+      <p:sp>
+        <p:nvSpPr>
+          <p:cNvPr id="20" name="CaixaDeTexto 19"/>
+          <p:cNvSpPr txBox="1"/>
+          <p:nvPr/>
+        </p:nvSpPr>
+        <p:spPr>
+          <a:xfrm>
+            <a:off x="17033158" y="133072"/>
+            <a:ext cx="3838308" cy="276999"/>
+          </a:xfrm>
+          <a:prstGeom prst="rect">
+            <a:avLst/>
+          </a:prstGeom>
+          <a:noFill/>
+        </p:spPr>
+        <p:txBody>
+          <a:bodyPr wrap="square" rtlCol="0">
+            <a:spAutoFit/>
+          </a:bodyPr>
+          <a:lstStyle/>
+          <a:p>
+            <a:r>
+              <a:rPr lang="pt-BR" sz="1200" b="1" dirty="0">
+                <a:latin typeface="Bahnschrift SemiBold" panose="020B0502040204020203" pitchFamily="34" charset="0"/>
+              </a:rPr>
+              <a:t>DIAGRAMA DE CLASSE</a:t>
+            </a:r>
+          </a:p>
+        </p:txBody>
+      </p:sp>
+      <p:sp>
+        <p:nvSpPr>
+          <p:cNvPr id="21" name="CaixaDeTexto 20"/>
+          <p:cNvSpPr txBox="1"/>
+          <p:nvPr/>
+        </p:nvSpPr>
+        <p:spPr>
+          <a:xfrm>
+            <a:off x="13535103" y="5427697"/>
+            <a:ext cx="3838308" cy="276999"/>
+          </a:xfrm>
+          <a:prstGeom prst="rect">
+            <a:avLst/>
+          </a:prstGeom>
+          <a:noFill/>
+        </p:spPr>
+        <p:txBody>
+          <a:bodyPr wrap="square" rtlCol="0">
+            <a:spAutoFit/>
+          </a:bodyPr>
+          <a:lstStyle/>
+          <a:p>
+            <a:r>
+              <a:rPr lang="pt-BR" sz="1200" b="1" dirty="0">
+                <a:latin typeface="Bahnschrift SemiBold" panose="020B0502040204020203" pitchFamily="34" charset="0"/>
+              </a:rPr>
+              <a:t>DIAGRAMA DE ROBUSTEZ</a:t>
+            </a:r>
+          </a:p>
+        </p:txBody>
+      </p:sp>
       <p:pic>
         <p:nvPicPr>
-          <p:cNvPr id="4" name="Imagem 3"/>
+          <p:cNvPr id="10" name="Imagem 9">
+            <a:extLst>
+              <a:ext uri="{FF2B5EF4-FFF2-40B4-BE49-F238E27FC236}">
+                <a16:creationId xmlns:a16="http://schemas.microsoft.com/office/drawing/2014/main" id="{0EB307E1-0424-4BE3-B15F-8F906E1A1C41}"/>
+              </a:ext>
+            </a:extLst>
+          </p:cNvPr>
           <p:cNvPicPr>
             <a:picLocks noChangeAspect="1"/>
           </p:cNvPicPr>
           <p:nvPr/>
         </p:nvPicPr>
-        <p:blipFill rotWithShape="1">
+        <p:blipFill>
           <a:blip r:embed="rId5">
             <a:extLst>
               <a:ext uri="{28A0092B-C50C-407E-A947-70E740481C1C}">
@@ -10060,13 +10027,14 @@
               </a:ext>
             </a:extLst>
           </a:blip>
-          <a:srcRect l="5782" t="6004" r="5585" b="4633"/>
-          <a:stretch/>
+          <a:stretch>
+            <a:fillRect/>
+          </a:stretch>
         </p:blipFill>
         <p:spPr>
           <a:xfrm>
-            <a:off x="8283773" y="496453"/>
-            <a:ext cx="7383968" cy="4961104"/>
+            <a:off x="9810025" y="627349"/>
+            <a:ext cx="5543542" cy="4777362"/>
           </a:xfrm>
           <a:prstGeom prst="rect">
             <a:avLst/>
@@ -10075,13 +10043,19 @@
       </p:pic>
       <p:pic>
         <p:nvPicPr>
-          <p:cNvPr id="9" name="Imagem 8"/>
+          <p:cNvPr id="12" name="Imagem 11">
+            <a:extLst>
+              <a:ext uri="{FF2B5EF4-FFF2-40B4-BE49-F238E27FC236}">
+                <a16:creationId xmlns:a16="http://schemas.microsoft.com/office/drawing/2014/main" id="{5AE2A67E-34AD-4A13-92E8-44B4ECDEC49D}"/>
+              </a:ext>
+            </a:extLst>
+          </p:cNvPr>
           <p:cNvPicPr>
             <a:picLocks noChangeAspect="1"/>
           </p:cNvPicPr>
           <p:nvPr/>
         </p:nvPicPr>
-        <p:blipFill rotWithShape="1">
+        <p:blipFill>
           <a:blip r:embed="rId6">
             <a:extLst>
               <a:ext uri="{28A0092B-C50C-407E-A947-70E740481C1C}">
@@ -10089,127 +10063,20 @@
               </a:ext>
             </a:extLst>
           </a:blip>
-          <a:srcRect l="38899" t="8154" r="2679" b="14816"/>
-          <a:stretch/>
+          <a:stretch>
+            <a:fillRect/>
+          </a:stretch>
         </p:blipFill>
         <p:spPr>
           <a:xfrm>
-            <a:off x="15872991" y="627349"/>
-            <a:ext cx="3767327" cy="3226931"/>
+            <a:off x="15454257" y="627349"/>
+            <a:ext cx="4184754" cy="3907356"/>
           </a:xfrm>
           <a:prstGeom prst="rect">
             <a:avLst/>
           </a:prstGeom>
         </p:spPr>
       </p:pic>
-      <p:sp>
-        <p:nvSpPr>
-          <p:cNvPr id="19" name="CaixaDeTexto 18"/>
-          <p:cNvSpPr txBox="1"/>
-          <p:nvPr/>
-        </p:nvSpPr>
-        <p:spPr>
-          <a:xfrm>
-            <a:off x="11615949" y="133072"/>
-            <a:ext cx="3838308" cy="276999"/>
-          </a:xfrm>
-          <a:prstGeom prst="rect">
-            <a:avLst/>
-          </a:prstGeom>
-          <a:noFill/>
-        </p:spPr>
-        <p:txBody>
-          <a:bodyPr wrap="square" rtlCol="0">
-            <a:spAutoFit/>
-          </a:bodyPr>
-          <a:lstStyle/>
-          <a:p>
-            <a:r>
-              <a:rPr lang="pt-BR" sz="1200" b="1" dirty="0">
-                <a:latin typeface="Bahnschrift SemiBold" panose="020B0502040204020203" pitchFamily="34" charset="0"/>
-              </a:rPr>
-              <a:t>DIAGRAMA DE SEQUENCIA</a:t>
-            </a:r>
-            <a:endParaRPr lang="pt-BR" sz="1200" b="1" dirty="0">
-              <a:latin typeface="Bahnschrift SemiBold" panose="020B0502040204020203" pitchFamily="34" charset="0"/>
-            </a:endParaRPr>
-          </a:p>
-        </p:txBody>
-      </p:sp>
-      <p:sp>
-        <p:nvSpPr>
-          <p:cNvPr id="20" name="CaixaDeTexto 19"/>
-          <p:cNvSpPr txBox="1"/>
-          <p:nvPr/>
-        </p:nvSpPr>
-        <p:spPr>
-          <a:xfrm>
-            <a:off x="17033158" y="133072"/>
-            <a:ext cx="3838308" cy="276999"/>
-          </a:xfrm>
-          <a:prstGeom prst="rect">
-            <a:avLst/>
-          </a:prstGeom>
-          <a:noFill/>
-        </p:spPr>
-        <p:txBody>
-          <a:bodyPr wrap="square" rtlCol="0">
-            <a:spAutoFit/>
-          </a:bodyPr>
-          <a:lstStyle/>
-          <a:p>
-            <a:r>
-              <a:rPr lang="pt-BR" sz="1200" b="1" dirty="0">
-                <a:latin typeface="Bahnschrift SemiBold" panose="020B0502040204020203" pitchFamily="34" charset="0"/>
-              </a:rPr>
-              <a:t>DIAGRAMA DE </a:t>
-            </a:r>
-            <a:r>
-              <a:rPr lang="pt-BR" sz="1200" b="1" dirty="0" smtClean="0">
-                <a:latin typeface="Bahnschrift SemiBold" panose="020B0502040204020203" pitchFamily="34" charset="0"/>
-              </a:rPr>
-              <a:t>CLASSE</a:t>
-            </a:r>
-            <a:endParaRPr lang="pt-BR" sz="1200" b="1" dirty="0">
-              <a:latin typeface="Bahnschrift SemiBold" panose="020B0502040204020203" pitchFamily="34" charset="0"/>
-            </a:endParaRPr>
-          </a:p>
-        </p:txBody>
-      </p:sp>
-      <p:sp>
-        <p:nvSpPr>
-          <p:cNvPr id="21" name="CaixaDeTexto 20"/>
-          <p:cNvSpPr txBox="1"/>
-          <p:nvPr/>
-        </p:nvSpPr>
-        <p:spPr>
-          <a:xfrm>
-            <a:off x="13535103" y="5427697"/>
-            <a:ext cx="3838308" cy="276999"/>
-          </a:xfrm>
-          <a:prstGeom prst="rect">
-            <a:avLst/>
-          </a:prstGeom>
-          <a:noFill/>
-        </p:spPr>
-        <p:txBody>
-          <a:bodyPr wrap="square" rtlCol="0">
-            <a:spAutoFit/>
-          </a:bodyPr>
-          <a:lstStyle/>
-          <a:p>
-            <a:r>
-              <a:rPr lang="pt-BR" sz="1200" b="1" dirty="0" smtClean="0">
-                <a:latin typeface="Bahnschrift SemiBold" panose="020B0502040204020203" pitchFamily="34" charset="0"/>
-              </a:rPr>
-              <a:t>DIAGRAMA DE ROBUSTEZ</a:t>
-            </a:r>
-            <a:endParaRPr lang="pt-BR" sz="1200" b="1" dirty="0">
-              <a:latin typeface="Bahnschrift SemiBold" panose="020B0502040204020203" pitchFamily="34" charset="0"/>
-            </a:endParaRPr>
-          </a:p>
-        </p:txBody>
-      </p:sp>
     </p:spTree>
     <p:extLst>
       <p:ext uri="{BB962C8B-B14F-4D97-AF65-F5344CB8AC3E}">
@@ -10220,13 +10087,6 @@
   <p:clrMapOvr>
     <a:masterClrMapping/>
   </p:clrMapOvr>
-  <p:timing>
-    <p:tnLst>
-      <p:par>
-        <p:cTn id="1" dur="indefinite" restart="never" nodeType="tmRoot"/>
-      </p:par>
-    </p:tnLst>
-  </p:timing>
 </p:sld>
 </file>
 
@@ -10444,11 +10304,7 @@
             </a:pPr>
             <a:r>
               <a:rPr lang="pt-BR" sz="1400" dirty="0"/>
-              <a:t>Caso de uso finalizado</a:t>
-            </a:r>
-            <a:r>
-              <a:rPr lang="pt-BR" sz="1400" dirty="0"/>
-              <a:t>.</a:t>
+              <a:t>Caso de uso finalizado.</a:t>
             </a:r>
           </a:p>
           <a:p>
@@ -10490,11 +10346,7 @@
             </a:pPr>
             <a:r>
               <a:rPr lang="pt-BR" sz="1400" dirty="0"/>
-              <a:t>Retorna ao passo 2 do fluxo principal</a:t>
-            </a:r>
-            <a:r>
-              <a:rPr lang="pt-BR" sz="1400" dirty="0"/>
-              <a:t>.</a:t>
+              <a:t>Retorna ao passo 2 do fluxo principal.</a:t>
             </a:r>
           </a:p>
           <a:p>
@@ -10517,16 +10369,6 @@
             <a:r>
               <a:rPr lang="pt-BR" sz="1400" dirty="0"/>
               <a:t>A partir do passo 4 o sistema detectou que a chave gerada já existia.  </a:t>
-            </a:r>
-          </a:p>
-          <a:p>
-            <a:pPr marL="342900" indent="-342900">
-              <a:buFont typeface="+mj-lt"/>
-              <a:buAutoNum type="arabicPeriod"/>
-            </a:pPr>
-            <a:r>
-              <a:rPr lang="pt-BR" sz="1400" dirty="0"/>
-              <a:t>Sistema gera outra chave.</a:t>
             </a:r>
           </a:p>
           <a:p>
@@ -10655,7 +10497,7 @@
               <a:rPr lang="pt-BR" sz="2400" b="1" dirty="0">
                 <a:latin typeface="Bahnschrift SemiBold" panose="020B0502040204020203" pitchFamily="34" charset="0"/>
               </a:rPr>
-              <a:t>CADASTRAR SALAS</a:t>
+              <a:t>CADASTRAR SALA</a:t>
             </a:r>
           </a:p>
         </p:txBody>
@@ -10798,9 +10640,71 @@
           </a:prstGeom>
         </p:spPr>
       </p:pic>
+      <p:sp>
+        <p:nvSpPr>
+          <p:cNvPr id="84" name="CaixaDeTexto 83"/>
+          <p:cNvSpPr txBox="1"/>
+          <p:nvPr/>
+        </p:nvSpPr>
+        <p:spPr>
+          <a:xfrm>
+            <a:off x="10311695" y="349499"/>
+            <a:ext cx="3838308" cy="276999"/>
+          </a:xfrm>
+          <a:prstGeom prst="rect">
+            <a:avLst/>
+          </a:prstGeom>
+          <a:noFill/>
+        </p:spPr>
+        <p:txBody>
+          <a:bodyPr wrap="square" rtlCol="0">
+            <a:spAutoFit/>
+          </a:bodyPr>
+          <a:lstStyle/>
+          <a:p>
+            <a:r>
+              <a:rPr lang="pt-BR" sz="1200" b="1" dirty="0">
+                <a:latin typeface="Bahnschrift SemiBold" panose="020B0502040204020203" pitchFamily="34" charset="0"/>
+              </a:rPr>
+              <a:t>DIAGRAMA DE SEQUÊNCIA</a:t>
+            </a:r>
+          </a:p>
+        </p:txBody>
+      </p:sp>
+      <p:sp>
+        <p:nvSpPr>
+          <p:cNvPr id="87" name="CaixaDeTexto 86"/>
+          <p:cNvSpPr txBox="1"/>
+          <p:nvPr/>
+        </p:nvSpPr>
+        <p:spPr>
+          <a:xfrm>
+            <a:off x="15722967" y="346071"/>
+            <a:ext cx="3838308" cy="276999"/>
+          </a:xfrm>
+          <a:prstGeom prst="rect">
+            <a:avLst/>
+          </a:prstGeom>
+          <a:noFill/>
+        </p:spPr>
+        <p:txBody>
+          <a:bodyPr wrap="square" rtlCol="0">
+            <a:spAutoFit/>
+          </a:bodyPr>
+          <a:lstStyle/>
+          <a:p>
+            <a:r>
+              <a:rPr lang="pt-BR" sz="1200" b="1" dirty="0">
+                <a:latin typeface="Bahnschrift SemiBold" panose="020B0502040204020203" pitchFamily="34" charset="0"/>
+              </a:rPr>
+              <a:t>DIAGRAMA DE CLASSE</a:t>
+            </a:r>
+          </a:p>
+        </p:txBody>
+      </p:sp>
       <p:pic>
         <p:nvPicPr>
-          <p:cNvPr id="13" name="Imagem 12"/>
+          <p:cNvPr id="14" name="Imagem 13"/>
           <p:cNvPicPr>
             <a:picLocks noChangeAspect="1"/>
           </p:cNvPicPr>
@@ -10814,13 +10718,13 @@
               </a:ext>
             </a:extLst>
           </a:blip>
-          <a:srcRect l="7213" t="5028" r="6067" b="4471"/>
+          <a:srcRect l="31467" t="9283" r="2322" b="5297"/>
           <a:stretch/>
         </p:blipFill>
         <p:spPr>
           <a:xfrm>
-            <a:off x="8990320" y="616215"/>
-            <a:ext cx="4886101" cy="5207556"/>
+            <a:off x="14294380" y="720752"/>
+            <a:ext cx="4834867" cy="3569786"/>
           </a:xfrm>
           <a:prstGeom prst="rect">
             <a:avLst/>
@@ -10829,13 +10733,13 @@
       </p:pic>
       <p:sp>
         <p:nvSpPr>
-          <p:cNvPr id="84" name="CaixaDeTexto 83"/>
+          <p:cNvPr id="88" name="CaixaDeTexto 87"/>
           <p:cNvSpPr txBox="1"/>
           <p:nvPr/>
         </p:nvSpPr>
         <p:spPr>
           <a:xfrm>
-            <a:off x="10311695" y="349499"/>
+            <a:off x="13656474" y="6157689"/>
             <a:ext cx="3838308" cy="276999"/>
           </a:xfrm>
           <a:prstGeom prst="rect">
@@ -10853,57 +10757,26 @@
               <a:rPr lang="pt-BR" sz="1200" b="1" dirty="0">
                 <a:latin typeface="Bahnschrift SemiBold" panose="020B0502040204020203" pitchFamily="34" charset="0"/>
               </a:rPr>
-              <a:t>DIAGRAMA DE SEQUÊNCIA</a:t>
-            </a:r>
-            <a:endParaRPr lang="pt-BR" sz="1200" b="1" dirty="0">
-              <a:latin typeface="Bahnschrift SemiBold" panose="020B0502040204020203" pitchFamily="34" charset="0"/>
-            </a:endParaRPr>
-          </a:p>
-        </p:txBody>
-      </p:sp>
-      <p:sp>
-        <p:nvSpPr>
-          <p:cNvPr id="87" name="CaixaDeTexto 86"/>
-          <p:cNvSpPr txBox="1"/>
-          <p:nvPr/>
-        </p:nvSpPr>
-        <p:spPr>
-          <a:xfrm>
-            <a:off x="15722967" y="346071"/>
-            <a:ext cx="3838308" cy="276999"/>
-          </a:xfrm>
-          <a:prstGeom prst="rect">
-            <a:avLst/>
-          </a:prstGeom>
-          <a:noFill/>
-        </p:spPr>
-        <p:txBody>
-          <a:bodyPr wrap="square" rtlCol="0">
-            <a:spAutoFit/>
-          </a:bodyPr>
-          <a:lstStyle/>
-          <a:p>
-            <a:r>
-              <a:rPr lang="pt-BR" sz="1200" b="1" dirty="0">
-                <a:latin typeface="Bahnschrift SemiBold" panose="020B0502040204020203" pitchFamily="34" charset="0"/>
-              </a:rPr>
-              <a:t>DIAGRAMA DE CLASSE</a:t>
-            </a:r>
-            <a:endParaRPr lang="pt-BR" sz="1200" b="1" dirty="0">
-              <a:latin typeface="Bahnschrift SemiBold" panose="020B0502040204020203" pitchFamily="34" charset="0"/>
-            </a:endParaRPr>
+              <a:t>DIAGRAMA DE ROBUSTEZ</a:t>
+            </a:r>
           </a:p>
         </p:txBody>
       </p:sp>
       <p:pic>
         <p:nvPicPr>
-          <p:cNvPr id="14" name="Imagem 13"/>
+          <p:cNvPr id="6" name="Imagem 5">
+            <a:extLst>
+              <a:ext uri="{FF2B5EF4-FFF2-40B4-BE49-F238E27FC236}">
+                <a16:creationId xmlns:a16="http://schemas.microsoft.com/office/drawing/2014/main" id="{D6CDA069-FFE4-4347-B6D5-DE8915636EEC}"/>
+              </a:ext>
+            </a:extLst>
+          </p:cNvPr>
           <p:cNvPicPr>
             <a:picLocks noChangeAspect="1"/>
           </p:cNvPicPr>
           <p:nvPr/>
         </p:nvPicPr>
-        <p:blipFill rotWithShape="1">
+        <p:blipFill>
           <a:blip r:embed="rId6">
             <a:extLst>
               <a:ext uri="{28A0092B-C50C-407E-A947-70E740481C1C}">
@@ -10911,53 +10784,20 @@
               </a:ext>
             </a:extLst>
           </a:blip>
-          <a:srcRect l="31467" t="9283" r="2322" b="5297"/>
-          <a:stretch/>
+          <a:stretch>
+            <a:fillRect/>
+          </a:stretch>
         </p:blipFill>
         <p:spPr>
           <a:xfrm>
-            <a:off x="14294380" y="720752"/>
-            <a:ext cx="4834867" cy="3569786"/>
+            <a:off x="8599557" y="632571"/>
+            <a:ext cx="4949261" cy="6024214"/>
           </a:xfrm>
           <a:prstGeom prst="rect">
             <a:avLst/>
           </a:prstGeom>
         </p:spPr>
       </p:pic>
-      <p:sp>
-        <p:nvSpPr>
-          <p:cNvPr id="88" name="CaixaDeTexto 87"/>
-          <p:cNvSpPr txBox="1"/>
-          <p:nvPr/>
-        </p:nvSpPr>
-        <p:spPr>
-          <a:xfrm>
-            <a:off x="13656474" y="6157689"/>
-            <a:ext cx="3838308" cy="276999"/>
-          </a:xfrm>
-          <a:prstGeom prst="rect">
-            <a:avLst/>
-          </a:prstGeom>
-          <a:noFill/>
-        </p:spPr>
-        <p:txBody>
-          <a:bodyPr wrap="square" rtlCol="0">
-            <a:spAutoFit/>
-          </a:bodyPr>
-          <a:lstStyle/>
-          <a:p>
-            <a:r>
-              <a:rPr lang="pt-BR" sz="1200" b="1" dirty="0">
-                <a:latin typeface="Bahnschrift SemiBold" panose="020B0502040204020203" pitchFamily="34" charset="0"/>
-              </a:rPr>
-              <a:t>DIAGRAMA DE ROBUSTEZ</a:t>
-            </a:r>
-            <a:endParaRPr lang="pt-BR" sz="1200" b="1" dirty="0">
-              <a:latin typeface="Bahnschrift SemiBold" panose="020B0502040204020203" pitchFamily="34" charset="0"/>
-            </a:endParaRPr>
-          </a:p>
-        </p:txBody>
-      </p:sp>
     </p:spTree>
     <p:extLst>
       <p:ext uri="{BB962C8B-B14F-4D97-AF65-F5344CB8AC3E}">
@@ -10968,13 +10808,6 @@
   <p:clrMapOvr>
     <a:masterClrMapping/>
   </p:clrMapOvr>
-  <p:timing>
-    <p:tnLst>
-      <p:par>
-        <p:cTn id="1" dur="indefinite" restart="never" nodeType="tmRoot"/>
-      </p:par>
-    </p:tnLst>
-  </p:timing>
 </p:sld>
 </file>
 
@@ -11098,7 +10931,6 @@
               <a:rPr lang="pt-BR" sz="1400" dirty="0"/>
               <a:t>Aluno </a:t>
             </a:r>
-            <a:endParaRPr lang="pt-BR" sz="1400" dirty="0" smtClean="0"/>
           </a:p>
           <a:p>
             <a:endParaRPr lang="pt-BR" sz="1400" dirty="0"/>
@@ -11158,11 +10990,7 @@
             </a:pPr>
             <a:r>
               <a:rPr lang="pt-BR" sz="1400" dirty="0"/>
-              <a:t>Caso de uso finalizado</a:t>
-            </a:r>
-            <a:r>
-              <a:rPr lang="pt-BR" sz="1400" dirty="0" smtClean="0"/>
-              <a:t>.</a:t>
+              <a:t>Caso de uso finalizado.</a:t>
             </a:r>
           </a:p>
           <a:p>
@@ -11242,14 +11070,11 @@
           <a:lstStyle/>
           <a:p>
             <a:r>
-              <a:rPr lang="pt-BR" sz="2400" b="1" dirty="0" smtClean="0">
+              <a:rPr lang="pt-BR" sz="2400" b="1" dirty="0">
                 <a:latin typeface="Bahnschrift SemiBold" panose="020B0502040204020203" pitchFamily="34" charset="0"/>
               </a:rPr>
               <a:t>ACESSAR SALA</a:t>
             </a:r>
-            <a:endParaRPr lang="pt-BR" sz="2400" b="1" dirty="0">
-              <a:latin typeface="Bahnschrift SemiBold" panose="020B0502040204020203" pitchFamily="34" charset="0"/>
-            </a:endParaRPr>
           </a:p>
         </p:txBody>
       </p:sp>
@@ -11354,14 +11179,11 @@
           <a:lstStyle/>
           <a:p>
             <a:r>
-              <a:rPr lang="pt-BR" sz="1200" b="1" dirty="0" smtClean="0">
+              <a:rPr lang="pt-BR" sz="1200" b="1" dirty="0">
                 <a:latin typeface="Bahnschrift SemiBold" panose="020B0502040204020203" pitchFamily="34" charset="0"/>
               </a:rPr>
               <a:t>TELA DE ESPERA</a:t>
             </a:r>
-            <a:endParaRPr lang="pt-BR" sz="1200" b="1" dirty="0">
-              <a:latin typeface="Bahnschrift SemiBold" panose="020B0502040204020203" pitchFamily="34" charset="0"/>
-            </a:endParaRPr>
           </a:p>
         </p:txBody>
       </p:sp>
@@ -11393,9 +11215,6 @@
               </a:rPr>
               <a:t>DIAGRAMA DE SEQUÊNCIA</a:t>
             </a:r>
-            <a:endParaRPr lang="pt-BR" sz="1200" b="1" dirty="0">
-              <a:latin typeface="Bahnschrift SemiBold" panose="020B0502040204020203" pitchFamily="34" charset="0"/>
-            </a:endParaRPr>
           </a:p>
         </p:txBody>
       </p:sp>
@@ -11427,9 +11246,6 @@
               </a:rPr>
               <a:t>DIAGRAMA DE CLASSE</a:t>
             </a:r>
-            <a:endParaRPr lang="pt-BR" sz="1200" b="1" dirty="0">
-              <a:latin typeface="Bahnschrift SemiBold" panose="020B0502040204020203" pitchFamily="34" charset="0"/>
-            </a:endParaRPr>
           </a:p>
         </p:txBody>
       </p:sp>
@@ -11461,9 +11277,6 @@
               </a:rPr>
               <a:t>DIAGRAMA DE ROBUSTEZ</a:t>
             </a:r>
-            <a:endParaRPr lang="pt-BR" sz="1200" b="1" dirty="0">
-              <a:latin typeface="Bahnschrift SemiBold" panose="020B0502040204020203" pitchFamily="34" charset="0"/>
-            </a:endParaRPr>
           </a:p>
         </p:txBody>
       </p:sp>
@@ -11592,14 +11405,11 @@
           <a:lstStyle/>
           <a:p>
             <a:r>
-              <a:rPr lang="pt-BR" sz="1200" b="1" dirty="0" smtClean="0">
+              <a:rPr lang="pt-BR" sz="1200" b="1" dirty="0">
                 <a:latin typeface="Bahnschrift SemiBold" panose="020B0502040204020203" pitchFamily="34" charset="0"/>
               </a:rPr>
               <a:t>HOME</a:t>
             </a:r>
-            <a:endParaRPr lang="pt-BR" sz="1200" b="1" dirty="0">
-              <a:latin typeface="Bahnschrift SemiBold" panose="020B0502040204020203" pitchFamily="34" charset="0"/>
-            </a:endParaRPr>
           </a:p>
         </p:txBody>
       </p:sp>
@@ -11700,13 +11510,6 @@
   <p:clrMapOvr>
     <a:masterClrMapping/>
   </p:clrMapOvr>
-  <p:timing>
-    <p:tnLst>
-      <p:par>
-        <p:cTn id="1" dur="indefinite" restart="never" nodeType="tmRoot"/>
-      </p:par>
-    </p:tnLst>
-  </p:timing>
 </p:sld>
 </file>
 
@@ -11826,7 +11629,6 @@
               <a:rPr lang="pt-BR" sz="1400" dirty="0"/>
               <a:t>Professor </a:t>
             </a:r>
-            <a:endParaRPr lang="pt-BR" sz="1400" dirty="0" smtClean="0"/>
           </a:p>
           <a:p>
             <a:endParaRPr lang="pt-BR" sz="1400" dirty="0"/>
@@ -11886,11 +11688,7 @@
             </a:pPr>
             <a:r>
               <a:rPr lang="pt-BR" sz="1400" dirty="0"/>
-              <a:t>Caso de uso </a:t>
-            </a:r>
-            <a:r>
-              <a:rPr lang="pt-BR" sz="1400" dirty="0" smtClean="0"/>
-              <a:t>finalizado</a:t>
+              <a:t>Caso de uso finalizado</a:t>
             </a:r>
           </a:p>
           <a:p>
@@ -11966,14 +11764,11 @@
           <a:lstStyle/>
           <a:p>
             <a:r>
-              <a:rPr lang="pt-BR" sz="2400" b="1" dirty="0" smtClean="0">
+              <a:rPr lang="pt-BR" sz="2400" b="1" dirty="0">
                 <a:latin typeface="Bahnschrift SemiBold" panose="020B0502040204020203" pitchFamily="34" charset="0"/>
               </a:rPr>
               <a:t>ACESSAR SALA</a:t>
             </a:r>
-            <a:endParaRPr lang="pt-BR" sz="2400" b="1" dirty="0">
-              <a:latin typeface="Bahnschrift SemiBold" panose="020B0502040204020203" pitchFamily="34" charset="0"/>
-            </a:endParaRPr>
           </a:p>
         </p:txBody>
       </p:sp>
@@ -12000,14 +11795,11 @@
           <a:lstStyle/>
           <a:p>
             <a:r>
-              <a:rPr lang="pt-BR" sz="1200" b="1" dirty="0" smtClean="0">
+              <a:rPr lang="pt-BR" sz="1200" b="1" dirty="0">
                 <a:latin typeface="Bahnschrift SemiBold" panose="020B0502040204020203" pitchFamily="34" charset="0"/>
               </a:rPr>
               <a:t>ACESSO SALA</a:t>
             </a:r>
-            <a:endParaRPr lang="pt-BR" sz="1200" b="1" dirty="0">
-              <a:latin typeface="Bahnschrift SemiBold" panose="020B0502040204020203" pitchFamily="34" charset="0"/>
-            </a:endParaRPr>
           </a:p>
         </p:txBody>
       </p:sp>
@@ -12086,9 +11878,6 @@
               </a:rPr>
               <a:t>DIAGRAMA DE SEQUÊNCIA</a:t>
             </a:r>
-            <a:endParaRPr lang="pt-BR" sz="1200" b="1" dirty="0">
-              <a:latin typeface="Bahnschrift SemiBold" panose="020B0502040204020203" pitchFamily="34" charset="0"/>
-            </a:endParaRPr>
           </a:p>
         </p:txBody>
       </p:sp>
@@ -12120,9 +11909,6 @@
               </a:rPr>
               <a:t>DIAGRAMA DE CLASSE</a:t>
             </a:r>
-            <a:endParaRPr lang="pt-BR" sz="1200" b="1" dirty="0">
-              <a:latin typeface="Bahnschrift SemiBold" panose="020B0502040204020203" pitchFamily="34" charset="0"/>
-            </a:endParaRPr>
           </a:p>
         </p:txBody>
       </p:sp>
@@ -12154,9 +11940,6 @@
               </a:rPr>
               <a:t>DIAGRAMA DE ROBUSTEZ</a:t>
             </a:r>
-            <a:endParaRPr lang="pt-BR" sz="1200" b="1" dirty="0">
-              <a:latin typeface="Bahnschrift SemiBold" panose="020B0502040204020203" pitchFamily="34" charset="0"/>
-            </a:endParaRPr>
           </a:p>
         </p:txBody>
       </p:sp>
@@ -12219,14 +12002,11 @@
           <a:lstStyle/>
           <a:p>
             <a:r>
-              <a:rPr lang="pt-BR" sz="1200" b="1" dirty="0" smtClean="0">
+              <a:rPr lang="pt-BR" sz="1200" b="1" dirty="0">
                 <a:latin typeface="Bahnschrift SemiBold" panose="020B0502040204020203" pitchFamily="34" charset="0"/>
               </a:rPr>
               <a:t>HOME</a:t>
             </a:r>
-            <a:endParaRPr lang="pt-BR" sz="1200" b="1" dirty="0">
-              <a:latin typeface="Bahnschrift SemiBold" panose="020B0502040204020203" pitchFamily="34" charset="0"/>
-            </a:endParaRPr>
           </a:p>
         </p:txBody>
       </p:sp>
@@ -12326,14 +12106,11 @@
           <a:lstStyle/>
           <a:p>
             <a:r>
-              <a:rPr lang="pt-BR" sz="1200" b="1" dirty="0" smtClean="0">
+              <a:rPr lang="pt-BR" sz="1200" b="1" dirty="0">
                 <a:latin typeface="Bahnschrift SemiBold" panose="020B0502040204020203" pitchFamily="34" charset="0"/>
               </a:rPr>
               <a:t>SALA</a:t>
             </a:r>
-            <a:endParaRPr lang="pt-BR" sz="1200" b="1" dirty="0">
-              <a:latin typeface="Bahnschrift SemiBold" panose="020B0502040204020203" pitchFamily="34" charset="0"/>
-            </a:endParaRPr>
           </a:p>
         </p:txBody>
       </p:sp>
@@ -12434,13 +12211,6 @@
   <p:clrMapOvr>
     <a:masterClrMapping/>
   </p:clrMapOvr>
-  <p:timing>
-    <p:tnLst>
-      <p:par>
-        <p:cTn id="1" dur="indefinite" restart="never" nodeType="tmRoot"/>
-      </p:par>
-    </p:tnLst>
-  </p:timing>
 </p:sld>
 </file>
 
@@ -12565,7 +12335,7 @@
               <a:t>Atores: </a:t>
             </a:r>
             <a:r>
-              <a:rPr lang="pt-BR" sz="1400" dirty="0" smtClean="0"/>
+              <a:rPr lang="pt-BR" sz="1400" dirty="0"/>
               <a:t>Professor</a:t>
             </a:r>
           </a:p>
@@ -12574,14 +12344,11 @@
           </a:p>
           <a:p>
             <a:r>
-              <a:rPr lang="pt-BR" sz="1600" b="1" dirty="0" smtClean="0">
+              <a:rPr lang="pt-BR" sz="1600" b="1" dirty="0">
                 <a:latin typeface="Bahnschrift SemiBold" panose="020B0502040204020203" pitchFamily="34" charset="0"/>
               </a:rPr>
               <a:t>Fluxo principal</a:t>
             </a:r>
-            <a:endParaRPr lang="pt-BR" sz="1600" b="1" dirty="0">
-              <a:latin typeface="Bahnschrift SemiBold" panose="020B0502040204020203" pitchFamily="34" charset="0"/>
-            </a:endParaRPr>
           </a:p>
           <a:p>
             <a:pPr marL="342900" lvl="0" indent="-342900">
@@ -12641,14 +12408,11 @@
           <a:lstStyle/>
           <a:p>
             <a:r>
-              <a:rPr lang="pt-BR" sz="2400" b="1" dirty="0" smtClean="0">
+              <a:rPr lang="pt-BR" sz="2400" b="1" dirty="0">
                 <a:latin typeface="Bahnschrift SemiBold" panose="020B0502040204020203" pitchFamily="34" charset="0"/>
               </a:rPr>
               <a:t>CRIAR RODADA</a:t>
             </a:r>
-            <a:endParaRPr lang="pt-BR" sz="2400" b="1" dirty="0">
-              <a:latin typeface="Bahnschrift SemiBold" panose="020B0502040204020203" pitchFamily="34" charset="0"/>
-            </a:endParaRPr>
           </a:p>
         </p:txBody>
       </p:sp>
@@ -12727,9 +12491,6 @@
               </a:rPr>
               <a:t>DIAGRAMA DE SEQUÊNCIA</a:t>
             </a:r>
-            <a:endParaRPr lang="pt-BR" sz="1200" b="1" dirty="0">
-              <a:latin typeface="Bahnschrift SemiBold" panose="020B0502040204020203" pitchFamily="34" charset="0"/>
-            </a:endParaRPr>
           </a:p>
         </p:txBody>
       </p:sp>
@@ -12761,9 +12522,6 @@
               </a:rPr>
               <a:t>DIAGRAMA DE CLASSE</a:t>
             </a:r>
-            <a:endParaRPr lang="pt-BR" sz="1200" b="1" dirty="0">
-              <a:latin typeface="Bahnschrift SemiBold" panose="020B0502040204020203" pitchFamily="34" charset="0"/>
-            </a:endParaRPr>
           </a:p>
         </p:txBody>
       </p:sp>
@@ -12795,9 +12553,6 @@
               </a:rPr>
               <a:t>DIAGRAMA DE ROBUSTEZ</a:t>
             </a:r>
-            <a:endParaRPr lang="pt-BR" sz="1200" b="1" dirty="0">
-              <a:latin typeface="Bahnschrift SemiBold" panose="020B0502040204020203" pitchFamily="34" charset="0"/>
-            </a:endParaRPr>
           </a:p>
         </p:txBody>
       </p:sp>
@@ -12860,14 +12615,11 @@
           <a:lstStyle/>
           <a:p>
             <a:r>
-              <a:rPr lang="pt-BR" sz="1200" b="1" dirty="0" smtClean="0">
+              <a:rPr lang="pt-BR" sz="1200" b="1" dirty="0">
                 <a:latin typeface="Bahnschrift SemiBold" panose="020B0502040204020203" pitchFamily="34" charset="0"/>
               </a:rPr>
               <a:t>SALA</a:t>
             </a:r>
-            <a:endParaRPr lang="pt-BR" sz="1200" b="1" dirty="0">
-              <a:latin typeface="Bahnschrift SemiBold" panose="020B0502040204020203" pitchFamily="34" charset="0"/>
-            </a:endParaRPr>
           </a:p>
         </p:txBody>
       </p:sp>
@@ -12931,14 +12683,11 @@
           <a:lstStyle/>
           <a:p>
             <a:r>
-              <a:rPr lang="pt-BR" sz="1200" b="1" dirty="0" smtClean="0">
+              <a:rPr lang="pt-BR" sz="1200" b="1" dirty="0">
                 <a:latin typeface="Bahnschrift SemiBold" panose="020B0502040204020203" pitchFamily="34" charset="0"/>
               </a:rPr>
               <a:t>NOVA RODADA</a:t>
             </a:r>
-            <a:endParaRPr lang="pt-BR" sz="1200" b="1" dirty="0">
-              <a:latin typeface="Bahnschrift SemiBold" panose="020B0502040204020203" pitchFamily="34" charset="0"/>
-            </a:endParaRPr>
           </a:p>
         </p:txBody>
       </p:sp>
@@ -13039,13 +12788,6 @@
   <p:clrMapOvr>
     <a:masterClrMapping/>
   </p:clrMapOvr>
-  <p:timing>
-    <p:tnLst>
-      <p:par>
-        <p:cTn id="1" dur="indefinite" restart="never" nodeType="tmRoot"/>
-      </p:par>
-    </p:tnLst>
-  </p:timing>
 </p:sld>
 </file>
 
@@ -13122,7 +12864,7 @@
         <p:spPr>
           <a:xfrm>
             <a:off x="154788" y="1288631"/>
-            <a:ext cx="3929583" cy="3891835"/>
+            <a:ext cx="3929583" cy="4138056"/>
           </a:xfrm>
           <a:prstGeom prst="rect">
             <a:avLst/>
@@ -13160,7 +12902,7 @@
               <a:t>Atores: </a:t>
             </a:r>
             <a:r>
-              <a:rPr lang="pt-BR" sz="1400" dirty="0" smtClean="0"/>
+              <a:rPr lang="pt-BR" sz="1400" dirty="0"/>
               <a:t>Professor</a:t>
             </a:r>
           </a:p>
@@ -13192,23 +12934,7 @@
             </a:pPr>
             <a:r>
               <a:rPr lang="pt-BR" sz="1400" dirty="0"/>
-              <a:t>Sistema salva o </a:t>
-            </a:r>
-            <a:r>
-              <a:rPr lang="pt-BR" sz="1400" dirty="0" err="1"/>
-              <a:t>Quiz</a:t>
-            </a:r>
-            <a:r>
-              <a:rPr lang="pt-BR" sz="1400" dirty="0"/>
-              <a:t> na rodada e o adiciona </a:t>
-            </a:r>
-            <a:r>
-              <a:rPr lang="pt-BR" sz="1400" dirty="0" err="1"/>
-              <a:t>Quiz</a:t>
-            </a:r>
-            <a:r>
-              <a:rPr lang="pt-BR" sz="1400" dirty="0"/>
-              <a:t> ao quadro “Jogos cadastrados”</a:t>
+              <a:t>Sistema valida perguntas, salva o Quiz na rodada e o adiciona Quiz ao quadro “Jogos cadastrados”</a:t>
             </a:r>
           </a:p>
           <a:p>
@@ -13218,11 +12944,7 @@
             </a:pPr>
             <a:r>
               <a:rPr lang="pt-BR" sz="1400" dirty="0"/>
-              <a:t>Caso de uso </a:t>
-            </a:r>
-            <a:r>
-              <a:rPr lang="pt-BR" sz="1400" dirty="0" smtClean="0"/>
-              <a:t>finalizado</a:t>
+              <a:t>Caso de uso finalizado</a:t>
             </a:r>
           </a:p>
           <a:p>
@@ -13298,14 +13020,11 @@
           <a:lstStyle/>
           <a:p>
             <a:r>
-              <a:rPr lang="pt-BR" sz="2400" b="1" dirty="0" smtClean="0">
-                <a:latin typeface="Bahnschrift SemiBold" panose="020B0502040204020203" pitchFamily="34" charset="0"/>
-              </a:rPr>
-              <a:t>ADICIONAR PERGUNTAS DO QUIS NA RODADA</a:t>
-            </a:r>
-            <a:endParaRPr lang="pt-BR" sz="2400" b="1" dirty="0">
-              <a:latin typeface="Bahnschrift SemiBold" panose="020B0502040204020203" pitchFamily="34" charset="0"/>
-            </a:endParaRPr>
+              <a:rPr lang="pt-BR" sz="2400" b="1" dirty="0">
+                <a:latin typeface="Bahnschrift SemiBold" panose="020B0502040204020203" pitchFamily="34" charset="0"/>
+              </a:rPr>
+              <a:t>ADICIONAR JOGO QUIZ NA RODADA</a:t>
+            </a:r>
           </a:p>
         </p:txBody>
       </p:sp>
@@ -13364,7 +13083,7 @@
         </p:nvSpPr>
         <p:spPr>
           <a:xfrm>
-            <a:off x="10311695" y="349499"/>
+            <a:off x="10094441" y="324841"/>
             <a:ext cx="3838308" cy="276999"/>
           </a:xfrm>
           <a:prstGeom prst="rect">
@@ -13384,9 +13103,6 @@
               </a:rPr>
               <a:t>DIAGRAMA DE SEQUÊNCIA</a:t>
             </a:r>
-            <a:endParaRPr lang="pt-BR" sz="1200" b="1" dirty="0">
-              <a:latin typeface="Bahnschrift SemiBold" panose="020B0502040204020203" pitchFamily="34" charset="0"/>
-            </a:endParaRPr>
           </a:p>
         </p:txBody>
       </p:sp>
@@ -13418,9 +13134,6 @@
               </a:rPr>
               <a:t>DIAGRAMA DE CLASSE</a:t>
             </a:r>
-            <a:endParaRPr lang="pt-BR" sz="1200" b="1" dirty="0">
-              <a:latin typeface="Bahnschrift SemiBold" panose="020B0502040204020203" pitchFamily="34" charset="0"/>
-            </a:endParaRPr>
           </a:p>
         </p:txBody>
       </p:sp>
@@ -13484,14 +13197,11 @@
           <a:lstStyle/>
           <a:p>
             <a:r>
-              <a:rPr lang="pt-BR" sz="1200" b="1" dirty="0" smtClean="0">
+              <a:rPr lang="pt-BR" sz="1200" b="1" dirty="0">
                 <a:latin typeface="Bahnschrift SemiBold" panose="020B0502040204020203" pitchFamily="34" charset="0"/>
               </a:rPr>
               <a:t>NOVA RODADA</a:t>
             </a:r>
-            <a:endParaRPr lang="pt-BR" sz="1200" b="1" dirty="0">
-              <a:latin typeface="Bahnschrift SemiBold" panose="020B0502040204020203" pitchFamily="34" charset="0"/>
-            </a:endParaRPr>
           </a:p>
         </p:txBody>
       </p:sp>
@@ -13550,20 +13260,83 @@
               <a:rPr lang="pt-BR" sz="1200" b="1" dirty="0">
                 <a:latin typeface="Bahnschrift SemiBold" panose="020B0502040204020203" pitchFamily="34" charset="0"/>
               </a:rPr>
-              <a:t>DIAGRAMA </a:t>
-            </a:r>
-            <a:r>
-              <a:rPr lang="pt-BR" sz="1200" b="1" dirty="0" smtClean="0">
-                <a:latin typeface="Bahnschrift SemiBold" panose="020B0502040204020203" pitchFamily="34" charset="0"/>
-              </a:rPr>
-              <a:t>DE ROBUSTEZ</a:t>
-            </a:r>
-            <a:endParaRPr lang="pt-BR" sz="1200" b="1" dirty="0">
-              <a:latin typeface="Bahnschrift SemiBold" panose="020B0502040204020203" pitchFamily="34" charset="0"/>
-            </a:endParaRPr>
-          </a:p>
-        </p:txBody>
-      </p:sp>
+              <a:t>DIAGRAMA DE ROBUSTEZ</a:t>
+            </a:r>
+          </a:p>
+        </p:txBody>
+      </p:sp>
+      <p:pic>
+        <p:nvPicPr>
+          <p:cNvPr id="7" name="Imagem 6">
+            <a:extLst>
+              <a:ext uri="{FF2B5EF4-FFF2-40B4-BE49-F238E27FC236}">
+                <a16:creationId xmlns:a16="http://schemas.microsoft.com/office/drawing/2014/main" id="{9DD4ACBE-0D51-4B7A-BD82-8E0E655CD655}"/>
+              </a:ext>
+            </a:extLst>
+          </p:cNvPr>
+          <p:cNvPicPr>
+            <a:picLocks noChangeAspect="1"/>
+          </p:cNvPicPr>
+          <p:nvPr/>
+        </p:nvPicPr>
+        <p:blipFill>
+          <a:blip r:embed="rId4">
+            <a:extLst>
+              <a:ext uri="{28A0092B-C50C-407E-A947-70E740481C1C}">
+                <a14:useLocalDpi xmlns:a14="http://schemas.microsoft.com/office/drawing/2010/main" val="0"/>
+              </a:ext>
+            </a:extLst>
+          </a:blip>
+          <a:stretch>
+            <a:fillRect/>
+          </a:stretch>
+        </p:blipFill>
+        <p:spPr>
+          <a:xfrm>
+            <a:off x="8566264" y="618915"/>
+            <a:ext cx="4884507" cy="4930588"/>
+          </a:xfrm>
+          <a:prstGeom prst="rect">
+            <a:avLst/>
+          </a:prstGeom>
+        </p:spPr>
+      </p:pic>
+      <p:pic>
+        <p:nvPicPr>
+          <p:cNvPr id="9" name="Imagem 8">
+            <a:extLst>
+              <a:ext uri="{FF2B5EF4-FFF2-40B4-BE49-F238E27FC236}">
+                <a16:creationId xmlns:a16="http://schemas.microsoft.com/office/drawing/2014/main" id="{1FBC9049-5D70-4643-A3DF-0D0E271B5F4F}"/>
+              </a:ext>
+            </a:extLst>
+          </p:cNvPr>
+          <p:cNvPicPr>
+            <a:picLocks noChangeAspect="1"/>
+          </p:cNvPicPr>
+          <p:nvPr/>
+        </p:nvPicPr>
+        <p:blipFill>
+          <a:blip r:embed="rId5">
+            <a:extLst>
+              <a:ext uri="{28A0092B-C50C-407E-A947-70E740481C1C}">
+                <a14:useLocalDpi xmlns:a14="http://schemas.microsoft.com/office/drawing/2010/main" val="0"/>
+              </a:ext>
+            </a:extLst>
+          </a:blip>
+          <a:stretch>
+            <a:fillRect/>
+          </a:stretch>
+        </p:blipFill>
+        <p:spPr>
+          <a:xfrm>
+            <a:off x="14055296" y="680612"/>
+            <a:ext cx="5257451" cy="3839803"/>
+          </a:xfrm>
+          <a:prstGeom prst="rect">
+            <a:avLst/>
+          </a:prstGeom>
+        </p:spPr>
+      </p:pic>
     </p:spTree>
     <p:extLst>
       <p:ext uri="{BB962C8B-B14F-4D97-AF65-F5344CB8AC3E}">
@@ -13574,13 +13347,6 @@
   <p:clrMapOvr>
     <a:masterClrMapping/>
   </p:clrMapOvr>
-  <p:timing>
-    <p:tnLst>
-      <p:par>
-        <p:cTn id="1" dur="indefinite" restart="never" nodeType="tmRoot"/>
-      </p:par>
-    </p:tnLst>
-  </p:timing>
 </p:sld>
 </file>
 
@@ -13697,7 +13463,7 @@
               <a:t>Atores: </a:t>
             </a:r>
             <a:r>
-              <a:rPr lang="pt-BR" sz="1400" dirty="0" smtClean="0"/>
+              <a:rPr lang="pt-BR" sz="1400" dirty="0"/>
               <a:t>Professor</a:t>
             </a:r>
           </a:p>
@@ -13770,14 +13536,11 @@
           <a:lstStyle/>
           <a:p>
             <a:r>
-              <a:rPr lang="pt-BR" sz="2400" b="1" dirty="0" smtClean="0">
+              <a:rPr lang="pt-BR" sz="2400" b="1" dirty="0">
                 <a:latin typeface="Bahnschrift SemiBold" panose="020B0502040204020203" pitchFamily="34" charset="0"/>
               </a:rPr>
               <a:t>ADICIONAR JOGO DA MEMÓRIA NA RODADA</a:t>
             </a:r>
-            <a:endParaRPr lang="pt-BR" sz="2400" b="1" dirty="0">
-              <a:latin typeface="Bahnschrift SemiBold" panose="020B0502040204020203" pitchFamily="34" charset="0"/>
-            </a:endParaRPr>
           </a:p>
         </p:txBody>
       </p:sp>
@@ -13856,9 +13619,6 @@
               </a:rPr>
               <a:t>DIAGRAMA DE SEQUÊNCIA</a:t>
             </a:r>
-            <a:endParaRPr lang="pt-BR" sz="1200" b="1" dirty="0">
-              <a:latin typeface="Bahnschrift SemiBold" panose="020B0502040204020203" pitchFamily="34" charset="0"/>
-            </a:endParaRPr>
           </a:p>
         </p:txBody>
       </p:sp>
@@ -13890,9 +13650,6 @@
               </a:rPr>
               <a:t>DIAGRAMA DE CLASSE</a:t>
             </a:r>
-            <a:endParaRPr lang="pt-BR" sz="1200" b="1" dirty="0">
-              <a:latin typeface="Bahnschrift SemiBold" panose="020B0502040204020203" pitchFamily="34" charset="0"/>
-            </a:endParaRPr>
           </a:p>
         </p:txBody>
       </p:sp>
@@ -13956,14 +13713,11 @@
           <a:lstStyle/>
           <a:p>
             <a:r>
-              <a:rPr lang="pt-BR" sz="1200" b="1" dirty="0" smtClean="0">
+              <a:rPr lang="pt-BR" sz="1200" b="1" dirty="0">
                 <a:latin typeface="Bahnschrift SemiBold" panose="020B0502040204020203" pitchFamily="34" charset="0"/>
               </a:rPr>
               <a:t>NOVA RODADA</a:t>
             </a:r>
-            <a:endParaRPr lang="pt-BR" sz="1200" b="1" dirty="0">
-              <a:latin typeface="Bahnschrift SemiBold" panose="020B0502040204020203" pitchFamily="34" charset="0"/>
-            </a:endParaRPr>
           </a:p>
         </p:txBody>
       </p:sp>
@@ -13993,17 +13747,8 @@
               <a:rPr lang="pt-BR" sz="1200" b="1" dirty="0">
                 <a:latin typeface="Bahnschrift SemiBold" panose="020B0502040204020203" pitchFamily="34" charset="0"/>
               </a:rPr>
-              <a:t>DIAGRAMA </a:t>
-            </a:r>
-            <a:r>
-              <a:rPr lang="pt-BR" sz="1200" b="1" dirty="0" smtClean="0">
-                <a:latin typeface="Bahnschrift SemiBold" panose="020B0502040204020203" pitchFamily="34" charset="0"/>
-              </a:rPr>
-              <a:t>DE ROBUSTEZ</a:t>
-            </a:r>
-            <a:endParaRPr lang="pt-BR" sz="1200" b="1" dirty="0">
-              <a:latin typeface="Bahnschrift SemiBold" panose="020B0502040204020203" pitchFamily="34" charset="0"/>
-            </a:endParaRPr>
+              <a:t>DIAGRAMA DE ROBUSTEZ</a:t>
+            </a:r>
           </a:p>
         </p:txBody>
       </p:sp>
@@ -14036,6 +13781,78 @@
           </a:prstGeom>
         </p:spPr>
       </p:pic>
+      <p:pic>
+        <p:nvPicPr>
+          <p:cNvPr id="7" name="Imagem 6">
+            <a:extLst>
+              <a:ext uri="{FF2B5EF4-FFF2-40B4-BE49-F238E27FC236}">
+                <a16:creationId xmlns:a16="http://schemas.microsoft.com/office/drawing/2014/main" id="{5306184D-CB29-4DA0-8B79-3639DECBC483}"/>
+              </a:ext>
+            </a:extLst>
+          </p:cNvPr>
+          <p:cNvPicPr>
+            <a:picLocks noChangeAspect="1"/>
+          </p:cNvPicPr>
+          <p:nvPr/>
+        </p:nvPicPr>
+        <p:blipFill>
+          <a:blip r:embed="rId4">
+            <a:extLst>
+              <a:ext uri="{28A0092B-C50C-407E-A947-70E740481C1C}">
+                <a14:useLocalDpi xmlns:a14="http://schemas.microsoft.com/office/drawing/2010/main" val="0"/>
+              </a:ext>
+            </a:extLst>
+          </a:blip>
+          <a:stretch>
+            <a:fillRect/>
+          </a:stretch>
+        </p:blipFill>
+        <p:spPr>
+          <a:xfrm>
+            <a:off x="8230372" y="850501"/>
+            <a:ext cx="6150857" cy="4503766"/>
+          </a:xfrm>
+          <a:prstGeom prst="rect">
+            <a:avLst/>
+          </a:prstGeom>
+        </p:spPr>
+      </p:pic>
+      <p:pic>
+        <p:nvPicPr>
+          <p:cNvPr id="11" name="Imagem 10">
+            <a:extLst>
+              <a:ext uri="{FF2B5EF4-FFF2-40B4-BE49-F238E27FC236}">
+                <a16:creationId xmlns:a16="http://schemas.microsoft.com/office/drawing/2014/main" id="{E770F56D-9D44-4985-A4D4-230EB0BB41FB}"/>
+              </a:ext>
+            </a:extLst>
+          </p:cNvPr>
+          <p:cNvPicPr>
+            <a:picLocks noChangeAspect="1"/>
+          </p:cNvPicPr>
+          <p:nvPr/>
+        </p:nvPicPr>
+        <p:blipFill>
+          <a:blip r:embed="rId5">
+            <a:extLst>
+              <a:ext uri="{28A0092B-C50C-407E-A947-70E740481C1C}">
+                <a14:useLocalDpi xmlns:a14="http://schemas.microsoft.com/office/drawing/2010/main" val="0"/>
+              </a:ext>
+            </a:extLst>
+          </a:blip>
+          <a:stretch>
+            <a:fillRect/>
+          </a:stretch>
+        </p:blipFill>
+        <p:spPr>
+          <a:xfrm>
+            <a:off x="14661619" y="850501"/>
+            <a:ext cx="4908652" cy="2713089"/>
+          </a:xfrm>
+          <a:prstGeom prst="rect">
+            <a:avLst/>
+          </a:prstGeom>
+        </p:spPr>
+      </p:pic>
     </p:spTree>
     <p:extLst>
       <p:ext uri="{BB962C8B-B14F-4D97-AF65-F5344CB8AC3E}">
@@ -14046,13 +13863,6 @@
   <p:clrMapOvr>
     <a:masterClrMapping/>
   </p:clrMapOvr>
-  <p:timing>
-    <p:tnLst>
-      <p:par>
-        <p:cTn id="1" dur="indefinite" restart="never" nodeType="tmRoot"/>
-      </p:par>
-    </p:tnLst>
-  </p:timing>
 </p:sld>
 </file>
 

</xml_diff>

<commit_message>
Diagramas sequência e classe, atualização board e novos casos de uso
</commit_message>
<xml_diff>
--- a/DocumentacaoProjeto/Board_Projeto_Recicla.pptx
+++ b/DocumentacaoProjeto/Board_Projeto_Recicla.pptx
@@ -151,7 +151,18 @@
       </p14:sectionLst>
     </p:ext>
     <p:ext uri="{EFAFB233-063F-42B5-8137-9DF3F51BA10A}">
-      <p15:sldGuideLst xmlns:p15="http://schemas.microsoft.com/office/powerpoint/2012/main" xmlns=""/>
+      <p15:sldGuideLst xmlns:p15="http://schemas.microsoft.com/office/powerpoint/2012/main">
+        <p15:guide id="1" orient="horz" pos="2494">
+          <p15:clr>
+            <a:srgbClr val="A4A3A4"/>
+          </p15:clr>
+        </p15:guide>
+        <p15:guide id="2" pos="6236">
+          <p15:clr>
+            <a:srgbClr val="A4A3A4"/>
+          </p15:clr>
+        </p15:guide>
+      </p15:sldGuideLst>
     </p:ext>
   </p:extLst>
 </p:presentation>
@@ -288,7 +299,7 @@
           <a:p>
             <a:fld id="{8F958ABE-8C21-4B45-A9DE-805EA20DAA6A}" type="datetimeFigureOut">
               <a:rPr lang="pt-BR" smtClean="0"/>
-              <a:t>28/06/2020</a:t>
+              <a:t>29/06/2020</a:t>
             </a:fld>
             <a:endParaRPr lang="pt-BR"/>
           </a:p>
@@ -458,7 +469,7 @@
           <a:p>
             <a:fld id="{8F958ABE-8C21-4B45-A9DE-805EA20DAA6A}" type="datetimeFigureOut">
               <a:rPr lang="pt-BR" smtClean="0"/>
-              <a:t>28/06/2020</a:t>
+              <a:t>29/06/2020</a:t>
             </a:fld>
             <a:endParaRPr lang="pt-BR"/>
           </a:p>
@@ -638,7 +649,7 @@
           <a:p>
             <a:fld id="{8F958ABE-8C21-4B45-A9DE-805EA20DAA6A}" type="datetimeFigureOut">
               <a:rPr lang="pt-BR" smtClean="0"/>
-              <a:t>28/06/2020</a:t>
+              <a:t>29/06/2020</a:t>
             </a:fld>
             <a:endParaRPr lang="pt-BR"/>
           </a:p>
@@ -808,7 +819,7 @@
           <a:p>
             <a:fld id="{8F958ABE-8C21-4B45-A9DE-805EA20DAA6A}" type="datetimeFigureOut">
               <a:rPr lang="pt-BR" smtClean="0"/>
-              <a:t>28/06/2020</a:t>
+              <a:t>29/06/2020</a:t>
             </a:fld>
             <a:endParaRPr lang="pt-BR"/>
           </a:p>
@@ -1054,7 +1065,7 @@
           <a:p>
             <a:fld id="{8F958ABE-8C21-4B45-A9DE-805EA20DAA6A}" type="datetimeFigureOut">
               <a:rPr lang="pt-BR" smtClean="0"/>
-              <a:t>28/06/2020</a:t>
+              <a:t>29/06/2020</a:t>
             </a:fld>
             <a:endParaRPr lang="pt-BR"/>
           </a:p>
@@ -1286,7 +1297,7 @@
           <a:p>
             <a:fld id="{8F958ABE-8C21-4B45-A9DE-805EA20DAA6A}" type="datetimeFigureOut">
               <a:rPr lang="pt-BR" smtClean="0"/>
-              <a:t>28/06/2020</a:t>
+              <a:t>29/06/2020</a:t>
             </a:fld>
             <a:endParaRPr lang="pt-BR"/>
           </a:p>
@@ -1653,7 +1664,7 @@
           <a:p>
             <a:fld id="{8F958ABE-8C21-4B45-A9DE-805EA20DAA6A}" type="datetimeFigureOut">
               <a:rPr lang="pt-BR" smtClean="0"/>
-              <a:t>28/06/2020</a:t>
+              <a:t>29/06/2020</a:t>
             </a:fld>
             <a:endParaRPr lang="pt-BR"/>
           </a:p>
@@ -1771,7 +1782,7 @@
           <a:p>
             <a:fld id="{8F958ABE-8C21-4B45-A9DE-805EA20DAA6A}" type="datetimeFigureOut">
               <a:rPr lang="pt-BR" smtClean="0"/>
-              <a:t>28/06/2020</a:t>
+              <a:t>29/06/2020</a:t>
             </a:fld>
             <a:endParaRPr lang="pt-BR"/>
           </a:p>
@@ -1866,7 +1877,7 @@
           <a:p>
             <a:fld id="{8F958ABE-8C21-4B45-A9DE-805EA20DAA6A}" type="datetimeFigureOut">
               <a:rPr lang="pt-BR" smtClean="0"/>
-              <a:t>28/06/2020</a:t>
+              <a:t>29/06/2020</a:t>
             </a:fld>
             <a:endParaRPr lang="pt-BR"/>
           </a:p>
@@ -2143,7 +2154,7 @@
           <a:p>
             <a:fld id="{8F958ABE-8C21-4B45-A9DE-805EA20DAA6A}" type="datetimeFigureOut">
               <a:rPr lang="pt-BR" smtClean="0"/>
-              <a:t>28/06/2020</a:t>
+              <a:t>29/06/2020</a:t>
             </a:fld>
             <a:endParaRPr lang="pt-BR"/>
           </a:p>
@@ -2400,7 +2411,7 @@
           <a:p>
             <a:fld id="{8F958ABE-8C21-4B45-A9DE-805EA20DAA6A}" type="datetimeFigureOut">
               <a:rPr lang="pt-BR" smtClean="0"/>
-              <a:t>28/06/2020</a:t>
+              <a:t>29/06/2020</a:t>
             </a:fld>
             <a:endParaRPr lang="pt-BR"/>
           </a:p>
@@ -2613,7 +2624,7 @@
           <a:p>
             <a:fld id="{8F958ABE-8C21-4B45-A9DE-805EA20DAA6A}" type="datetimeFigureOut">
               <a:rPr lang="pt-BR" smtClean="0"/>
-              <a:t>28/06/2020</a:t>
+              <a:t>29/06/2020</a:t>
             </a:fld>
             <a:endParaRPr lang="pt-BR"/>
           </a:p>
@@ -3913,7 +3924,7 @@
           <p:cNvPr id="7" name="Imagem 6">
             <a:extLst>
               <a:ext uri="{FF2B5EF4-FFF2-40B4-BE49-F238E27FC236}">
-                <a16:creationId xmlns:a16="http://schemas.microsoft.com/office/drawing/2014/main" xmlns="" id="{0BA01D9B-E878-415A-835E-220D5752AB74}"/>
+                <a16:creationId xmlns:a16="http://schemas.microsoft.com/office/drawing/2014/main" id="{0BA01D9B-E878-415A-835E-220D5752AB74}"/>
               </a:ext>
             </a:extLst>
           </p:cNvPr>
@@ -3949,7 +3960,7 @@
           <p:cNvPr id="9" name="Imagem 8">
             <a:extLst>
               <a:ext uri="{FF2B5EF4-FFF2-40B4-BE49-F238E27FC236}">
-                <a16:creationId xmlns:a16="http://schemas.microsoft.com/office/drawing/2014/main" xmlns="" id="{5DB8552A-19F9-4A5F-8C36-78BC33897A3E}"/>
+                <a16:creationId xmlns:a16="http://schemas.microsoft.com/office/drawing/2014/main" id="{5DB8552A-19F9-4A5F-8C36-78BC33897A3E}"/>
               </a:ext>
             </a:extLst>
           </p:cNvPr>
@@ -4020,13 +4031,6 @@
   <p:clrMapOvr>
     <a:masterClrMapping/>
   </p:clrMapOvr>
-  <p:timing>
-    <p:tnLst>
-      <p:par>
-        <p:cTn id="1" dur="indefinite" restart="never" nodeType="tmRoot"/>
-      </p:par>
-    </p:tnLst>
-  </p:timing>
 </p:sld>
 </file>
 
@@ -4498,7 +4502,7 @@
           <p:cNvPr id="7" name="Imagem 6">
             <a:extLst>
               <a:ext uri="{FF2B5EF4-FFF2-40B4-BE49-F238E27FC236}">
-                <a16:creationId xmlns:a16="http://schemas.microsoft.com/office/drawing/2014/main" xmlns="" id="{2B4EA219-DD2B-4F14-ADFB-F3EB213CF409}"/>
+                <a16:creationId xmlns:a16="http://schemas.microsoft.com/office/drawing/2014/main" id="{2B4EA219-DD2B-4F14-ADFB-F3EB213CF409}"/>
               </a:ext>
             </a:extLst>
           </p:cNvPr>
@@ -4534,7 +4538,7 @@
           <p:cNvPr id="9" name="Imagem 8">
             <a:extLst>
               <a:ext uri="{FF2B5EF4-FFF2-40B4-BE49-F238E27FC236}">
-                <a16:creationId xmlns:a16="http://schemas.microsoft.com/office/drawing/2014/main" xmlns="" id="{9E615B2C-AA8C-49E1-9181-C6267FABD203}"/>
+                <a16:creationId xmlns:a16="http://schemas.microsoft.com/office/drawing/2014/main" id="{9E615B2C-AA8C-49E1-9181-C6267FABD203}"/>
               </a:ext>
             </a:extLst>
           </p:cNvPr>
@@ -4575,13 +4579,6 @@
   <p:clrMapOvr>
     <a:masterClrMapping/>
   </p:clrMapOvr>
-  <p:timing>
-    <p:tnLst>
-      <p:par>
-        <p:cTn id="1" dur="indefinite" restart="never" nodeType="tmRoot"/>
-      </p:par>
-    </p:tnLst>
-  </p:timing>
 </p:sld>
 </file>
 
@@ -5037,7 +5034,7 @@
           <p:cNvPr id="4" name="Imagem 3">
             <a:extLst>
               <a:ext uri="{FF2B5EF4-FFF2-40B4-BE49-F238E27FC236}">
-                <a16:creationId xmlns:a16="http://schemas.microsoft.com/office/drawing/2014/main" xmlns="" id="{B0865A08-C8EF-4FBD-9A61-0BCEF47A1676}"/>
+                <a16:creationId xmlns:a16="http://schemas.microsoft.com/office/drawing/2014/main" id="{B0865A08-C8EF-4FBD-9A61-0BCEF47A1676}"/>
               </a:ext>
             </a:extLst>
           </p:cNvPr>
@@ -5073,7 +5070,7 @@
           <p:cNvPr id="8" name="Imagem 7">
             <a:extLst>
               <a:ext uri="{FF2B5EF4-FFF2-40B4-BE49-F238E27FC236}">
-                <a16:creationId xmlns:a16="http://schemas.microsoft.com/office/drawing/2014/main" xmlns="" id="{B0424F9F-8694-4914-8CE1-F9B2600FA2BA}"/>
+                <a16:creationId xmlns:a16="http://schemas.microsoft.com/office/drawing/2014/main" id="{B0424F9F-8694-4914-8CE1-F9B2600FA2BA}"/>
               </a:ext>
             </a:extLst>
           </p:cNvPr>
@@ -5144,13 +5141,6 @@
   <p:clrMapOvr>
     <a:masterClrMapping/>
   </p:clrMapOvr>
-  <p:timing>
-    <p:tnLst>
-      <p:par>
-        <p:cTn id="1" dur="indefinite" restart="never" nodeType="tmRoot"/>
-      </p:par>
-    </p:tnLst>
-  </p:timing>
 </p:sld>
 </file>
 
@@ -5692,13 +5682,6 @@
   <p:clrMapOvr>
     <a:masterClrMapping/>
   </p:clrMapOvr>
-  <p:timing>
-    <p:tnLst>
-      <p:par>
-        <p:cTn id="1" dur="indefinite" restart="never" nodeType="tmRoot"/>
-      </p:par>
-    </p:tnLst>
-  </p:timing>
 </p:sld>
 </file>
 
@@ -6209,7 +6192,7 @@
           <p:cNvPr id="7" name="Imagem 6">
             <a:extLst>
               <a:ext uri="{FF2B5EF4-FFF2-40B4-BE49-F238E27FC236}">
-                <a16:creationId xmlns:a16="http://schemas.microsoft.com/office/drawing/2014/main" xmlns="" id="{61C9AF16-CCCC-4BE7-9A4C-43889135E8ED}"/>
+                <a16:creationId xmlns:a16="http://schemas.microsoft.com/office/drawing/2014/main" id="{61C9AF16-CCCC-4BE7-9A4C-43889135E8ED}"/>
               </a:ext>
             </a:extLst>
           </p:cNvPr>
@@ -6245,7 +6228,7 @@
           <p:cNvPr id="9" name="Imagem 8">
             <a:extLst>
               <a:ext uri="{FF2B5EF4-FFF2-40B4-BE49-F238E27FC236}">
-                <a16:creationId xmlns:a16="http://schemas.microsoft.com/office/drawing/2014/main" xmlns="" id="{A33E8D4C-17BA-4344-B634-999A86F38C22}"/>
+                <a16:creationId xmlns:a16="http://schemas.microsoft.com/office/drawing/2014/main" id="{A33E8D4C-17BA-4344-B634-999A86F38C22}"/>
               </a:ext>
             </a:extLst>
           </p:cNvPr>
@@ -6286,13 +6269,6 @@
   <p:clrMapOvr>
     <a:masterClrMapping/>
   </p:clrMapOvr>
-  <p:timing>
-    <p:tnLst>
-      <p:par>
-        <p:cTn id="1" dur="indefinite" restart="never" nodeType="tmRoot"/>
-      </p:par>
-    </p:tnLst>
-  </p:timing>
 </p:sld>
 </file>
 
@@ -6774,6 +6750,78 @@
           </a:prstGeom>
         </p:spPr>
       </p:pic>
+      <p:pic>
+        <p:nvPicPr>
+          <p:cNvPr id="12" name="Imagem 11">
+            <a:extLst>
+              <a:ext uri="{FF2B5EF4-FFF2-40B4-BE49-F238E27FC236}">
+                <a16:creationId xmlns:a16="http://schemas.microsoft.com/office/drawing/2014/main" id="{7E6DD137-97D1-41E1-AE73-44D585BC02E5}"/>
+              </a:ext>
+            </a:extLst>
+          </p:cNvPr>
+          <p:cNvPicPr>
+            <a:picLocks noChangeAspect="1"/>
+          </p:cNvPicPr>
+          <p:nvPr/>
+        </p:nvPicPr>
+        <p:blipFill>
+          <a:blip r:embed="rId4">
+            <a:extLst>
+              <a:ext uri="{28A0092B-C50C-407E-A947-70E740481C1C}">
+                <a14:useLocalDpi xmlns:a14="http://schemas.microsoft.com/office/drawing/2010/main" val="0"/>
+              </a:ext>
+            </a:extLst>
+          </a:blip>
+          <a:stretch>
+            <a:fillRect/>
+          </a:stretch>
+        </p:blipFill>
+        <p:spPr>
+          <a:xfrm>
+            <a:off x="8340389" y="680611"/>
+            <a:ext cx="6011519" cy="4657104"/>
+          </a:xfrm>
+          <a:prstGeom prst="rect">
+            <a:avLst/>
+          </a:prstGeom>
+        </p:spPr>
+      </p:pic>
+      <p:pic>
+        <p:nvPicPr>
+          <p:cNvPr id="13" name="Imagem 12">
+            <a:extLst>
+              <a:ext uri="{FF2B5EF4-FFF2-40B4-BE49-F238E27FC236}">
+                <a16:creationId xmlns:a16="http://schemas.microsoft.com/office/drawing/2014/main" id="{E46BE020-E52D-42ED-BE05-42E4FDBE7357}"/>
+              </a:ext>
+            </a:extLst>
+          </p:cNvPr>
+          <p:cNvPicPr>
+            <a:picLocks noChangeAspect="1"/>
+          </p:cNvPicPr>
+          <p:nvPr/>
+        </p:nvPicPr>
+        <p:blipFill>
+          <a:blip r:embed="rId5">
+            <a:extLst>
+              <a:ext uri="{28A0092B-C50C-407E-A947-70E740481C1C}">
+                <a14:useLocalDpi xmlns:a14="http://schemas.microsoft.com/office/drawing/2010/main" val="0"/>
+              </a:ext>
+            </a:extLst>
+          </a:blip>
+          <a:stretch>
+            <a:fillRect/>
+          </a:stretch>
+        </p:blipFill>
+        <p:spPr>
+          <a:xfrm>
+            <a:off x="14576612" y="680611"/>
+            <a:ext cx="4922976" cy="4107090"/>
+          </a:xfrm>
+          <a:prstGeom prst="rect">
+            <a:avLst/>
+          </a:prstGeom>
+        </p:spPr>
+      </p:pic>
     </p:spTree>
     <p:extLst>
       <p:ext uri="{BB962C8B-B14F-4D97-AF65-F5344CB8AC3E}">
@@ -6784,13 +6832,6 @@
   <p:clrMapOvr>
     <a:masterClrMapping/>
   </p:clrMapOvr>
-  <p:timing>
-    <p:tnLst>
-      <p:par>
-        <p:cTn id="1" dur="indefinite" restart="never" nodeType="tmRoot"/>
-      </p:par>
-    </p:tnLst>
-  </p:timing>
 </p:sld>
 </file>
 
@@ -7269,6 +7310,78 @@
           <a:xfrm>
             <a:off x="11828513" y="5975779"/>
             <a:ext cx="7608484" cy="1723469"/>
+          </a:xfrm>
+          <a:prstGeom prst="rect">
+            <a:avLst/>
+          </a:prstGeom>
+        </p:spPr>
+      </p:pic>
+      <p:pic>
+        <p:nvPicPr>
+          <p:cNvPr id="7" name="Imagem 6">
+            <a:extLst>
+              <a:ext uri="{FF2B5EF4-FFF2-40B4-BE49-F238E27FC236}">
+                <a16:creationId xmlns:a16="http://schemas.microsoft.com/office/drawing/2014/main" id="{BCF9F190-85A6-4336-AD69-16D12F786F2D}"/>
+              </a:ext>
+            </a:extLst>
+          </p:cNvPr>
+          <p:cNvPicPr>
+            <a:picLocks noChangeAspect="1"/>
+          </p:cNvPicPr>
+          <p:nvPr/>
+        </p:nvPicPr>
+        <p:blipFill>
+          <a:blip r:embed="rId4">
+            <a:extLst>
+              <a:ext uri="{28A0092B-C50C-407E-A947-70E740481C1C}">
+                <a14:useLocalDpi xmlns:a14="http://schemas.microsoft.com/office/drawing/2010/main" val="0"/>
+              </a:ext>
+            </a:extLst>
+          </a:blip>
+          <a:stretch>
+            <a:fillRect/>
+          </a:stretch>
+        </p:blipFill>
+        <p:spPr>
+          <a:xfrm>
+            <a:off x="8340389" y="680611"/>
+            <a:ext cx="6200364" cy="4803402"/>
+          </a:xfrm>
+          <a:prstGeom prst="rect">
+            <a:avLst/>
+          </a:prstGeom>
+        </p:spPr>
+      </p:pic>
+      <p:pic>
+        <p:nvPicPr>
+          <p:cNvPr id="9" name="Imagem 8">
+            <a:extLst>
+              <a:ext uri="{FF2B5EF4-FFF2-40B4-BE49-F238E27FC236}">
+                <a16:creationId xmlns:a16="http://schemas.microsoft.com/office/drawing/2014/main" id="{C72B87B0-2DF6-4207-AB2E-824FFDC0E5EF}"/>
+              </a:ext>
+            </a:extLst>
+          </p:cNvPr>
+          <p:cNvPicPr>
+            <a:picLocks noChangeAspect="1"/>
+          </p:cNvPicPr>
+          <p:nvPr/>
+        </p:nvPicPr>
+        <p:blipFill>
+          <a:blip r:embed="rId5">
+            <a:extLst>
+              <a:ext uri="{28A0092B-C50C-407E-A947-70E740481C1C}">
+                <a14:useLocalDpi xmlns:a14="http://schemas.microsoft.com/office/drawing/2010/main" val="0"/>
+              </a:ext>
+            </a:extLst>
+          </a:blip>
+          <a:stretch>
+            <a:fillRect/>
+          </a:stretch>
+        </p:blipFill>
+        <p:spPr>
+          <a:xfrm>
+            <a:off x="14742654" y="680611"/>
+            <a:ext cx="4857931" cy="4284805"/>
           </a:xfrm>
           <a:prstGeom prst="rect">
             <a:avLst/>
@@ -7423,7 +7536,7 @@
             </a:pPr>
             <a:r>
               <a:rPr lang="pt-BR" sz="1400" dirty="0"/>
-              <a:t>Aluno clica no botão “Comprar” do item Pontos. O item Tempo dobra a quantidade de pontos recebida em um jogo. Além disso é permitido em todos os jogos.</a:t>
+              <a:t>Aluno clica no botão “Comprar” do item Pontos. O item dobra a quantidade de pontos recebida em um jogo. Além disso é permitido em todos os jogos.</a:t>
             </a:r>
           </a:p>
           <a:p>
@@ -7764,6 +7877,78 @@
           </a:prstGeom>
         </p:spPr>
       </p:pic>
+      <p:pic>
+        <p:nvPicPr>
+          <p:cNvPr id="11" name="Imagem 10">
+            <a:extLst>
+              <a:ext uri="{FF2B5EF4-FFF2-40B4-BE49-F238E27FC236}">
+                <a16:creationId xmlns:a16="http://schemas.microsoft.com/office/drawing/2014/main" id="{C0DA064A-9AC8-412E-AF8B-30100C829BCF}"/>
+              </a:ext>
+            </a:extLst>
+          </p:cNvPr>
+          <p:cNvPicPr>
+            <a:picLocks noChangeAspect="1"/>
+          </p:cNvPicPr>
+          <p:nvPr/>
+        </p:nvPicPr>
+        <p:blipFill>
+          <a:blip r:embed="rId4">
+            <a:extLst>
+              <a:ext uri="{28A0092B-C50C-407E-A947-70E740481C1C}">
+                <a14:useLocalDpi xmlns:a14="http://schemas.microsoft.com/office/drawing/2010/main" val="0"/>
+              </a:ext>
+            </a:extLst>
+          </a:blip>
+          <a:stretch>
+            <a:fillRect/>
+          </a:stretch>
+        </p:blipFill>
+        <p:spPr>
+          <a:xfrm>
+            <a:off x="8340389" y="680611"/>
+            <a:ext cx="5948863" cy="4608565"/>
+          </a:xfrm>
+          <a:prstGeom prst="rect">
+            <a:avLst/>
+          </a:prstGeom>
+        </p:spPr>
+      </p:pic>
+      <p:pic>
+        <p:nvPicPr>
+          <p:cNvPr id="13" name="Imagem 12">
+            <a:extLst>
+              <a:ext uri="{FF2B5EF4-FFF2-40B4-BE49-F238E27FC236}">
+                <a16:creationId xmlns:a16="http://schemas.microsoft.com/office/drawing/2014/main" id="{81B1C821-8861-48EC-9BB5-A2340EAFB738}"/>
+              </a:ext>
+            </a:extLst>
+          </p:cNvPr>
+          <p:cNvPicPr>
+            <a:picLocks noChangeAspect="1"/>
+          </p:cNvPicPr>
+          <p:nvPr/>
+        </p:nvPicPr>
+        <p:blipFill>
+          <a:blip r:embed="rId5">
+            <a:extLst>
+              <a:ext uri="{28A0092B-C50C-407E-A947-70E740481C1C}">
+                <a14:useLocalDpi xmlns:a14="http://schemas.microsoft.com/office/drawing/2010/main" val="0"/>
+              </a:ext>
+            </a:extLst>
+          </a:blip>
+          <a:stretch>
+            <a:fillRect/>
+          </a:stretch>
+        </p:blipFill>
+        <p:spPr>
+          <a:xfrm>
+            <a:off x="14602170" y="680611"/>
+            <a:ext cx="4897418" cy="4319633"/>
+          </a:xfrm>
+          <a:prstGeom prst="rect">
+            <a:avLst/>
+          </a:prstGeom>
+        </p:spPr>
+      </p:pic>
     </p:spTree>
     <p:extLst>
       <p:ext uri="{BB962C8B-B14F-4D97-AF65-F5344CB8AC3E}">
@@ -7774,13 +7959,6 @@
   <p:clrMapOvr>
     <a:masterClrMapping/>
   </p:clrMapOvr>
-  <p:timing>
-    <p:tnLst>
-      <p:par>
-        <p:cTn id="1" dur="indefinite" restart="never" nodeType="tmRoot"/>
-      </p:par>
-    </p:tnLst>
-  </p:timing>
 </p:sld>
 </file>
 
@@ -8348,6 +8526,78 @@
           </a:prstGeom>
         </p:spPr>
       </p:pic>
+      <p:pic>
+        <p:nvPicPr>
+          <p:cNvPr id="6" name="Imagem 5">
+            <a:extLst>
+              <a:ext uri="{FF2B5EF4-FFF2-40B4-BE49-F238E27FC236}">
+                <a16:creationId xmlns:a16="http://schemas.microsoft.com/office/drawing/2014/main" id="{2D5029BD-C27B-44E0-823C-F119A1E7FA94}"/>
+              </a:ext>
+            </a:extLst>
+          </p:cNvPr>
+          <p:cNvPicPr>
+            <a:picLocks noChangeAspect="1"/>
+          </p:cNvPicPr>
+          <p:nvPr/>
+        </p:nvPicPr>
+        <p:blipFill>
+          <a:blip r:embed="rId5">
+            <a:extLst>
+              <a:ext uri="{28A0092B-C50C-407E-A947-70E740481C1C}">
+                <a14:useLocalDpi xmlns:a14="http://schemas.microsoft.com/office/drawing/2010/main" val="0"/>
+              </a:ext>
+            </a:extLst>
+          </a:blip>
+          <a:stretch>
+            <a:fillRect/>
+          </a:stretch>
+        </p:blipFill>
+        <p:spPr>
+          <a:xfrm>
+            <a:off x="8114836" y="631355"/>
+            <a:ext cx="5088507" cy="4926046"/>
+          </a:xfrm>
+          <a:prstGeom prst="rect">
+            <a:avLst/>
+          </a:prstGeom>
+        </p:spPr>
+      </p:pic>
+      <p:pic>
+        <p:nvPicPr>
+          <p:cNvPr id="9" name="Imagem 8">
+            <a:extLst>
+              <a:ext uri="{FF2B5EF4-FFF2-40B4-BE49-F238E27FC236}">
+                <a16:creationId xmlns:a16="http://schemas.microsoft.com/office/drawing/2014/main" id="{7E941A6F-687A-41BF-8CE0-8190F3D268B8}"/>
+              </a:ext>
+            </a:extLst>
+          </p:cNvPr>
+          <p:cNvPicPr>
+            <a:picLocks noChangeAspect="1"/>
+          </p:cNvPicPr>
+          <p:nvPr/>
+        </p:nvPicPr>
+        <p:blipFill>
+          <a:blip r:embed="rId6">
+            <a:extLst>
+              <a:ext uri="{28A0092B-C50C-407E-A947-70E740481C1C}">
+                <a14:useLocalDpi xmlns:a14="http://schemas.microsoft.com/office/drawing/2010/main" val="0"/>
+              </a:ext>
+            </a:extLst>
+          </a:blip>
+          <a:stretch>
+            <a:fillRect/>
+          </a:stretch>
+        </p:blipFill>
+        <p:spPr>
+          <a:xfrm>
+            <a:off x="14242225" y="715393"/>
+            <a:ext cx="4843124" cy="4395205"/>
+          </a:xfrm>
+          <a:prstGeom prst="rect">
+            <a:avLst/>
+          </a:prstGeom>
+        </p:spPr>
+      </p:pic>
     </p:spTree>
     <p:extLst>
       <p:ext uri="{BB962C8B-B14F-4D97-AF65-F5344CB8AC3E}">
@@ -8358,13 +8608,6 @@
   <p:clrMapOvr>
     <a:masterClrMapping/>
   </p:clrMapOvr>
-  <p:timing>
-    <p:tnLst>
-      <p:par>
-        <p:cTn id="1" dur="indefinite" restart="never" nodeType="tmRoot"/>
-      </p:par>
-    </p:tnLst>
-  </p:timing>
 </p:sld>
 </file>
 
@@ -8745,7 +8988,7 @@
         </p:blipFill>
         <p:spPr>
           <a:xfrm>
-            <a:off x="4501556" y="680611"/>
+            <a:off x="4484014" y="680611"/>
             <a:ext cx="3413645" cy="2071058"/>
           </a:xfrm>
           <a:prstGeom prst="rect">
@@ -8789,6 +9032,78 @@
           </a:prstGeom>
         </p:spPr>
       </p:pic>
+      <p:pic>
+        <p:nvPicPr>
+          <p:cNvPr id="7" name="Imagem 6">
+            <a:extLst>
+              <a:ext uri="{FF2B5EF4-FFF2-40B4-BE49-F238E27FC236}">
+                <a16:creationId xmlns:a16="http://schemas.microsoft.com/office/drawing/2014/main" id="{A624A659-8F1A-447A-9FC5-24BF39FBA8A5}"/>
+              </a:ext>
+            </a:extLst>
+          </p:cNvPr>
+          <p:cNvPicPr>
+            <a:picLocks noChangeAspect="1"/>
+          </p:cNvPicPr>
+          <p:nvPr/>
+        </p:nvPicPr>
+        <p:blipFill>
+          <a:blip r:embed="rId4">
+            <a:extLst>
+              <a:ext uri="{28A0092B-C50C-407E-A947-70E740481C1C}">
+                <a14:useLocalDpi xmlns:a14="http://schemas.microsoft.com/office/drawing/2010/main" val="0"/>
+              </a:ext>
+            </a:extLst>
+          </a:blip>
+          <a:stretch>
+            <a:fillRect/>
+          </a:stretch>
+        </p:blipFill>
+        <p:spPr>
+          <a:xfrm>
+            <a:off x="8227319" y="680611"/>
+            <a:ext cx="5734225" cy="3279408"/>
+          </a:xfrm>
+          <a:prstGeom prst="rect">
+            <a:avLst/>
+          </a:prstGeom>
+        </p:spPr>
+      </p:pic>
+      <p:pic>
+        <p:nvPicPr>
+          <p:cNvPr id="9" name="Imagem 8">
+            <a:extLst>
+              <a:ext uri="{FF2B5EF4-FFF2-40B4-BE49-F238E27FC236}">
+                <a16:creationId xmlns:a16="http://schemas.microsoft.com/office/drawing/2014/main" id="{ED4D3564-9C64-4D6F-99F0-1FAAD2EA4C0B}"/>
+              </a:ext>
+            </a:extLst>
+          </p:cNvPr>
+          <p:cNvPicPr>
+            <a:picLocks noChangeAspect="1"/>
+          </p:cNvPicPr>
+          <p:nvPr/>
+        </p:nvPicPr>
+        <p:blipFill>
+          <a:blip r:embed="rId5">
+            <a:extLst>
+              <a:ext uri="{28A0092B-C50C-407E-A947-70E740481C1C}">
+                <a14:useLocalDpi xmlns:a14="http://schemas.microsoft.com/office/drawing/2010/main" val="0"/>
+              </a:ext>
+            </a:extLst>
+          </a:blip>
+          <a:stretch>
+            <a:fillRect/>
+          </a:stretch>
+        </p:blipFill>
+        <p:spPr>
+          <a:xfrm>
+            <a:off x="14291205" y="680611"/>
+            <a:ext cx="5212932" cy="3279408"/>
+          </a:xfrm>
+          <a:prstGeom prst="rect">
+            <a:avLst/>
+          </a:prstGeom>
+        </p:spPr>
+      </p:pic>
     </p:spTree>
     <p:extLst>
       <p:ext uri="{BB962C8B-B14F-4D97-AF65-F5344CB8AC3E}">
@@ -8799,13 +9114,6 @@
   <p:clrMapOvr>
     <a:masterClrMapping/>
   </p:clrMapOvr>
-  <p:timing>
-    <p:tnLst>
-      <p:par>
-        <p:cTn id="1" dur="indefinite" restart="never" nodeType="tmRoot"/>
-      </p:par>
-    </p:tnLst>
-  </p:timing>
 </p:sld>
 </file>
 
@@ -9502,7 +9810,7 @@
           <p:cNvPr id="10" name="Imagem 9">
             <a:extLst>
               <a:ext uri="{FF2B5EF4-FFF2-40B4-BE49-F238E27FC236}">
-                <a16:creationId xmlns:a16="http://schemas.microsoft.com/office/drawing/2014/main" xmlns="" id="{661CF106-30F7-4709-B0CF-3E334DAD90ED}"/>
+                <a16:creationId xmlns:a16="http://schemas.microsoft.com/office/drawing/2014/main" id="{661CF106-30F7-4709-B0CF-3E334DAD90ED}"/>
               </a:ext>
             </a:extLst>
           </p:cNvPr>
@@ -9543,13 +9851,6 @@
   <p:clrMapOvr>
     <a:masterClrMapping/>
   </p:clrMapOvr>
-  <p:timing>
-    <p:tnLst>
-      <p:par>
-        <p:cTn id="1" dur="indefinite" restart="never" nodeType="tmRoot"/>
-      </p:par>
-    </p:tnLst>
-  </p:timing>
 </p:sld>
 </file>
 
@@ -10113,7 +10414,7 @@
           <p:cNvPr id="10" name="Imagem 9">
             <a:extLst>
               <a:ext uri="{FF2B5EF4-FFF2-40B4-BE49-F238E27FC236}">
-                <a16:creationId xmlns:a16="http://schemas.microsoft.com/office/drawing/2014/main" xmlns="" id="{0EB307E1-0424-4BE3-B15F-8F906E1A1C41}"/>
+                <a16:creationId xmlns:a16="http://schemas.microsoft.com/office/drawing/2014/main" id="{0EB307E1-0424-4BE3-B15F-8F906E1A1C41}"/>
               </a:ext>
             </a:extLst>
           </p:cNvPr>
@@ -10149,7 +10450,7 @@
           <p:cNvPr id="12" name="Imagem 11">
             <a:extLst>
               <a:ext uri="{FF2B5EF4-FFF2-40B4-BE49-F238E27FC236}">
-                <a16:creationId xmlns:a16="http://schemas.microsoft.com/office/drawing/2014/main" xmlns="" id="{5AE2A67E-34AD-4A13-92E8-44B4ECDEC49D}"/>
+                <a16:creationId xmlns:a16="http://schemas.microsoft.com/office/drawing/2014/main" id="{5AE2A67E-34AD-4A13-92E8-44B4ECDEC49D}"/>
               </a:ext>
             </a:extLst>
           </p:cNvPr>
@@ -10190,13 +10491,6 @@
   <p:clrMapOvr>
     <a:masterClrMapping/>
   </p:clrMapOvr>
-  <p:timing>
-    <p:tnLst>
-      <p:par>
-        <p:cTn id="1" dur="indefinite" restart="never" nodeType="tmRoot"/>
-      </p:par>
-    </p:tnLst>
-  </p:timing>
 </p:sld>
 </file>
 
@@ -10848,7 +11142,7 @@
           <p:cNvPr id="6" name="Imagem 5">
             <a:extLst>
               <a:ext uri="{FF2B5EF4-FFF2-40B4-BE49-F238E27FC236}">
-                <a16:creationId xmlns:a16="http://schemas.microsoft.com/office/drawing/2014/main" xmlns="" id="{D6CDA069-FFE4-4347-B6D5-DE8915636EEC}"/>
+                <a16:creationId xmlns:a16="http://schemas.microsoft.com/office/drawing/2014/main" id="{D6CDA069-FFE4-4347-B6D5-DE8915636EEC}"/>
               </a:ext>
             </a:extLst>
           </p:cNvPr>
@@ -10919,13 +11213,6 @@
   <p:clrMapOvr>
     <a:masterClrMapping/>
   </p:clrMapOvr>
-  <p:timing>
-    <p:tnLst>
-      <p:par>
-        <p:cTn id="1" dur="indefinite" restart="never" nodeType="tmRoot"/>
-      </p:par>
-    </p:tnLst>
-  </p:timing>
 </p:sld>
 </file>
 
@@ -11629,13 +11916,6 @@
   <p:clrMapOvr>
     <a:masterClrMapping/>
   </p:clrMapOvr>
-  <p:timing>
-    <p:tnLst>
-      <p:par>
-        <p:cTn id="1" dur="indefinite" restart="never" nodeType="tmRoot"/>
-      </p:par>
-    </p:tnLst>
-  </p:timing>
 </p:sld>
 </file>
 
@@ -12338,13 +12618,6 @@
   <p:clrMapOvr>
     <a:masterClrMapping/>
   </p:clrMapOvr>
-  <p:timing>
-    <p:tnLst>
-      <p:par>
-        <p:cTn id="1" dur="indefinite" restart="never" nodeType="tmRoot"/>
-      </p:par>
-    </p:tnLst>
-  </p:timing>
 </p:sld>
 </file>
 
@@ -12922,13 +13195,6 @@
   <p:clrMapOvr>
     <a:masterClrMapping/>
   </p:clrMapOvr>
-  <p:timing>
-    <p:tnLst>
-      <p:par>
-        <p:cTn id="1" dur="indefinite" restart="never" nodeType="tmRoot"/>
-      </p:par>
-    </p:tnLst>
-  </p:timing>
 </p:sld>
 </file>
 
@@ -13382,7 +13648,7 @@
           <p:cNvPr id="7" name="Imagem 6">
             <a:extLst>
               <a:ext uri="{FF2B5EF4-FFF2-40B4-BE49-F238E27FC236}">
-                <a16:creationId xmlns:a16="http://schemas.microsoft.com/office/drawing/2014/main" xmlns="" id="{9DD4ACBE-0D51-4B7A-BD82-8E0E655CD655}"/>
+                <a16:creationId xmlns:a16="http://schemas.microsoft.com/office/drawing/2014/main" id="{9DD4ACBE-0D51-4B7A-BD82-8E0E655CD655}"/>
               </a:ext>
             </a:extLst>
           </p:cNvPr>
@@ -13418,7 +13684,7 @@
           <p:cNvPr id="9" name="Imagem 8">
             <a:extLst>
               <a:ext uri="{FF2B5EF4-FFF2-40B4-BE49-F238E27FC236}">
-                <a16:creationId xmlns:a16="http://schemas.microsoft.com/office/drawing/2014/main" xmlns="" id="{1FBC9049-5D70-4643-A3DF-0D0E271B5F4F}"/>
+                <a16:creationId xmlns:a16="http://schemas.microsoft.com/office/drawing/2014/main" id="{1FBC9049-5D70-4643-A3DF-0D0E271B5F4F}"/>
               </a:ext>
             </a:extLst>
           </p:cNvPr>
@@ -13489,13 +13755,6 @@
   <p:clrMapOvr>
     <a:masterClrMapping/>
   </p:clrMapOvr>
-  <p:timing>
-    <p:tnLst>
-      <p:par>
-        <p:cTn id="1" dur="indefinite" restart="never" nodeType="tmRoot"/>
-      </p:par>
-    </p:tnLst>
-  </p:timing>
 </p:sld>
 </file>
 
@@ -13906,7 +14165,7 @@
           <p:cNvPr id="7" name="Imagem 6">
             <a:extLst>
               <a:ext uri="{FF2B5EF4-FFF2-40B4-BE49-F238E27FC236}">
-                <a16:creationId xmlns:a16="http://schemas.microsoft.com/office/drawing/2014/main" xmlns="" id="{5306184D-CB29-4DA0-8B79-3639DECBC483}"/>
+                <a16:creationId xmlns:a16="http://schemas.microsoft.com/office/drawing/2014/main" id="{5306184D-CB29-4DA0-8B79-3639DECBC483}"/>
               </a:ext>
             </a:extLst>
           </p:cNvPr>
@@ -13942,7 +14201,7 @@
           <p:cNvPr id="11" name="Imagem 10">
             <a:extLst>
               <a:ext uri="{FF2B5EF4-FFF2-40B4-BE49-F238E27FC236}">
-                <a16:creationId xmlns:a16="http://schemas.microsoft.com/office/drawing/2014/main" xmlns="" id="{E770F56D-9D44-4985-A4D4-230EB0BB41FB}"/>
+                <a16:creationId xmlns:a16="http://schemas.microsoft.com/office/drawing/2014/main" id="{E770F56D-9D44-4985-A4D4-230EB0BB41FB}"/>
               </a:ext>
             </a:extLst>
           </p:cNvPr>
@@ -14013,13 +14272,6 @@
   <p:clrMapOvr>
     <a:masterClrMapping/>
   </p:clrMapOvr>
-  <p:timing>
-    <p:tnLst>
-      <p:par>
-        <p:cTn id="1" dur="indefinite" restart="never" nodeType="tmRoot"/>
-      </p:par>
-    </p:tnLst>
-  </p:timing>
 </p:sld>
 </file>
 
@@ -14278,7 +14530,7 @@
   <a:extraClrSchemeLst/>
   <a:extLst>
     <a:ext uri="{05A4C25C-085E-4340-85A3-A5531E510DB2}">
-      <thm15:themeFamily xmlns:thm15="http://schemas.microsoft.com/office/thememl/2012/main" xmlns="" name="Office Theme" id="{62F939B6-93AF-4DB8-9C6B-D6C7DFDC589F}" vid="{4A3C46E8-61CC-4603-A589-7422A47A8E4A}"/>
+      <thm15:themeFamily xmlns:thm15="http://schemas.microsoft.com/office/thememl/2012/main" name="Office Theme" id="{62F939B6-93AF-4DB8-9C6B-D6C7DFDC589F}" vid="{4A3C46E8-61CC-4603-A589-7422A47A8E4A}"/>
     </a:ext>
   </a:extLst>
 </a:theme>

</xml_diff>

<commit_message>
Add the new cases on board
</commit_message>
<xml_diff>
--- a/DocumentacaoProjeto/Board_Projeto_Recicla.pptx
+++ b/DocumentacaoProjeto/Board_Projeto_Recicla.pptx
@@ -22,8 +22,11 @@
     <p:sldId id="270" r:id="rId16"/>
     <p:sldId id="271" r:id="rId17"/>
     <p:sldId id="272" r:id="rId18"/>
-    <p:sldId id="273" r:id="rId19"/>
-    <p:sldId id="274" r:id="rId20"/>
+    <p:sldId id="275" r:id="rId19"/>
+    <p:sldId id="277" r:id="rId20"/>
+    <p:sldId id="276" r:id="rId21"/>
+    <p:sldId id="273" r:id="rId22"/>
+    <p:sldId id="274" r:id="rId23"/>
   </p:sldIdLst>
   <p:sldSz cx="19800888" cy="7920038"/>
   <p:notesSz cx="6858000" cy="9144000"/>
@@ -144,6 +147,9 @@
             <p14:sldId id="270"/>
             <p14:sldId id="271"/>
             <p14:sldId id="272"/>
+            <p14:sldId id="275"/>
+            <p14:sldId id="277"/>
+            <p14:sldId id="276"/>
             <p14:sldId id="273"/>
             <p14:sldId id="274"/>
           </p14:sldIdLst>
@@ -3924,7 +3930,7 @@
           <p:cNvPr id="7" name="Imagem 6">
             <a:extLst>
               <a:ext uri="{FF2B5EF4-FFF2-40B4-BE49-F238E27FC236}">
-                <a16:creationId xmlns:a16="http://schemas.microsoft.com/office/drawing/2014/main" id="{0BA01D9B-E878-415A-835E-220D5752AB74}"/>
+                <a16:creationId xmlns:a16="http://schemas.microsoft.com/office/drawing/2014/main" xmlns="" id="{0BA01D9B-E878-415A-835E-220D5752AB74}"/>
               </a:ext>
             </a:extLst>
           </p:cNvPr>
@@ -3960,7 +3966,7 @@
           <p:cNvPr id="9" name="Imagem 8">
             <a:extLst>
               <a:ext uri="{FF2B5EF4-FFF2-40B4-BE49-F238E27FC236}">
-                <a16:creationId xmlns:a16="http://schemas.microsoft.com/office/drawing/2014/main" id="{5DB8552A-19F9-4A5F-8C36-78BC33897A3E}"/>
+                <a16:creationId xmlns:a16="http://schemas.microsoft.com/office/drawing/2014/main" xmlns="" id="{5DB8552A-19F9-4A5F-8C36-78BC33897A3E}"/>
               </a:ext>
             </a:extLst>
           </p:cNvPr>
@@ -4502,7 +4508,7 @@
           <p:cNvPr id="7" name="Imagem 6">
             <a:extLst>
               <a:ext uri="{FF2B5EF4-FFF2-40B4-BE49-F238E27FC236}">
-                <a16:creationId xmlns:a16="http://schemas.microsoft.com/office/drawing/2014/main" id="{2B4EA219-DD2B-4F14-ADFB-F3EB213CF409}"/>
+                <a16:creationId xmlns:a16="http://schemas.microsoft.com/office/drawing/2014/main" xmlns="" id="{2B4EA219-DD2B-4F14-ADFB-F3EB213CF409}"/>
               </a:ext>
             </a:extLst>
           </p:cNvPr>
@@ -4538,7 +4544,7 @@
           <p:cNvPr id="9" name="Imagem 8">
             <a:extLst>
               <a:ext uri="{FF2B5EF4-FFF2-40B4-BE49-F238E27FC236}">
-                <a16:creationId xmlns:a16="http://schemas.microsoft.com/office/drawing/2014/main" id="{9E615B2C-AA8C-49E1-9181-C6267FABD203}"/>
+                <a16:creationId xmlns:a16="http://schemas.microsoft.com/office/drawing/2014/main" xmlns="" id="{9E615B2C-AA8C-49E1-9181-C6267FABD203}"/>
               </a:ext>
             </a:extLst>
           </p:cNvPr>
@@ -5034,7 +5040,7 @@
           <p:cNvPr id="4" name="Imagem 3">
             <a:extLst>
               <a:ext uri="{FF2B5EF4-FFF2-40B4-BE49-F238E27FC236}">
-                <a16:creationId xmlns:a16="http://schemas.microsoft.com/office/drawing/2014/main" id="{B0865A08-C8EF-4FBD-9A61-0BCEF47A1676}"/>
+                <a16:creationId xmlns:a16="http://schemas.microsoft.com/office/drawing/2014/main" xmlns="" id="{B0865A08-C8EF-4FBD-9A61-0BCEF47A1676}"/>
               </a:ext>
             </a:extLst>
           </p:cNvPr>
@@ -5070,7 +5076,7 @@
           <p:cNvPr id="8" name="Imagem 7">
             <a:extLst>
               <a:ext uri="{FF2B5EF4-FFF2-40B4-BE49-F238E27FC236}">
-                <a16:creationId xmlns:a16="http://schemas.microsoft.com/office/drawing/2014/main" id="{B0424F9F-8694-4914-8CE1-F9B2600FA2BA}"/>
+                <a16:creationId xmlns:a16="http://schemas.microsoft.com/office/drawing/2014/main" xmlns="" id="{B0424F9F-8694-4914-8CE1-F9B2600FA2BA}"/>
               </a:ext>
             </a:extLst>
           </p:cNvPr>
@@ -6192,7 +6198,7 @@
           <p:cNvPr id="7" name="Imagem 6">
             <a:extLst>
               <a:ext uri="{FF2B5EF4-FFF2-40B4-BE49-F238E27FC236}">
-                <a16:creationId xmlns:a16="http://schemas.microsoft.com/office/drawing/2014/main" id="{61C9AF16-CCCC-4BE7-9A4C-43889135E8ED}"/>
+                <a16:creationId xmlns:a16="http://schemas.microsoft.com/office/drawing/2014/main" xmlns="" id="{61C9AF16-CCCC-4BE7-9A4C-43889135E8ED}"/>
               </a:ext>
             </a:extLst>
           </p:cNvPr>
@@ -6228,7 +6234,7 @@
           <p:cNvPr id="9" name="Imagem 8">
             <a:extLst>
               <a:ext uri="{FF2B5EF4-FFF2-40B4-BE49-F238E27FC236}">
-                <a16:creationId xmlns:a16="http://schemas.microsoft.com/office/drawing/2014/main" id="{A33E8D4C-17BA-4344-B634-999A86F38C22}"/>
+                <a16:creationId xmlns:a16="http://schemas.microsoft.com/office/drawing/2014/main" xmlns="" id="{A33E8D4C-17BA-4344-B634-999A86F38C22}"/>
               </a:ext>
             </a:extLst>
           </p:cNvPr>
@@ -6755,7 +6761,7 @@
           <p:cNvPr id="12" name="Imagem 11">
             <a:extLst>
               <a:ext uri="{FF2B5EF4-FFF2-40B4-BE49-F238E27FC236}">
-                <a16:creationId xmlns:a16="http://schemas.microsoft.com/office/drawing/2014/main" id="{7E6DD137-97D1-41E1-AE73-44D585BC02E5}"/>
+                <a16:creationId xmlns:a16="http://schemas.microsoft.com/office/drawing/2014/main" xmlns="" id="{7E6DD137-97D1-41E1-AE73-44D585BC02E5}"/>
               </a:ext>
             </a:extLst>
           </p:cNvPr>
@@ -6791,7 +6797,7 @@
           <p:cNvPr id="13" name="Imagem 12">
             <a:extLst>
               <a:ext uri="{FF2B5EF4-FFF2-40B4-BE49-F238E27FC236}">
-                <a16:creationId xmlns:a16="http://schemas.microsoft.com/office/drawing/2014/main" id="{E46BE020-E52D-42ED-BE05-42E4FDBE7357}"/>
+                <a16:creationId xmlns:a16="http://schemas.microsoft.com/office/drawing/2014/main" xmlns="" id="{E46BE020-E52D-42ED-BE05-42E4FDBE7357}"/>
               </a:ext>
             </a:extLst>
           </p:cNvPr>
@@ -6832,6 +6838,13 @@
   <p:clrMapOvr>
     <a:masterClrMapping/>
   </p:clrMapOvr>
+  <p:timing>
+    <p:tnLst>
+      <p:par>
+        <p:cTn id="1" dur="indefinite" restart="never" nodeType="tmRoot"/>
+      </p:par>
+    </p:tnLst>
+  </p:timing>
 </p:sld>
 </file>
 
@@ -7321,7 +7334,7 @@
           <p:cNvPr id="7" name="Imagem 6">
             <a:extLst>
               <a:ext uri="{FF2B5EF4-FFF2-40B4-BE49-F238E27FC236}">
-                <a16:creationId xmlns:a16="http://schemas.microsoft.com/office/drawing/2014/main" id="{BCF9F190-85A6-4336-AD69-16D12F786F2D}"/>
+                <a16:creationId xmlns:a16="http://schemas.microsoft.com/office/drawing/2014/main" xmlns="" id="{BCF9F190-85A6-4336-AD69-16D12F786F2D}"/>
               </a:ext>
             </a:extLst>
           </p:cNvPr>
@@ -7357,7 +7370,7 @@
           <p:cNvPr id="9" name="Imagem 8">
             <a:extLst>
               <a:ext uri="{FF2B5EF4-FFF2-40B4-BE49-F238E27FC236}">
-                <a16:creationId xmlns:a16="http://schemas.microsoft.com/office/drawing/2014/main" id="{C72B87B0-2DF6-4207-AB2E-824FFDC0E5EF}"/>
+                <a16:creationId xmlns:a16="http://schemas.microsoft.com/office/drawing/2014/main" xmlns="" id="{C72B87B0-2DF6-4207-AB2E-824FFDC0E5EF}"/>
               </a:ext>
             </a:extLst>
           </p:cNvPr>
@@ -7398,6 +7411,13 @@
   <p:clrMapOvr>
     <a:masterClrMapping/>
   </p:clrMapOvr>
+  <p:timing>
+    <p:tnLst>
+      <p:par>
+        <p:cTn id="1" dur="indefinite" restart="never" nodeType="tmRoot"/>
+      </p:par>
+    </p:tnLst>
+  </p:timing>
 </p:sld>
 </file>
 
@@ -7882,7 +7902,7 @@
           <p:cNvPr id="11" name="Imagem 10">
             <a:extLst>
               <a:ext uri="{FF2B5EF4-FFF2-40B4-BE49-F238E27FC236}">
-                <a16:creationId xmlns:a16="http://schemas.microsoft.com/office/drawing/2014/main" id="{C0DA064A-9AC8-412E-AF8B-30100C829BCF}"/>
+                <a16:creationId xmlns:a16="http://schemas.microsoft.com/office/drawing/2014/main" xmlns="" id="{C0DA064A-9AC8-412E-AF8B-30100C829BCF}"/>
               </a:ext>
             </a:extLst>
           </p:cNvPr>
@@ -7918,7 +7938,7 @@
           <p:cNvPr id="13" name="Imagem 12">
             <a:extLst>
               <a:ext uri="{FF2B5EF4-FFF2-40B4-BE49-F238E27FC236}">
-                <a16:creationId xmlns:a16="http://schemas.microsoft.com/office/drawing/2014/main" id="{81B1C821-8861-48EC-9BB5-A2340EAFB738}"/>
+                <a16:creationId xmlns:a16="http://schemas.microsoft.com/office/drawing/2014/main" xmlns="" id="{81B1C821-8861-48EC-9BB5-A2340EAFB738}"/>
               </a:ext>
             </a:extLst>
           </p:cNvPr>
@@ -8034,8 +8054,8 @@
         </p:nvSpPr>
         <p:spPr>
           <a:xfrm>
-            <a:off x="135336" y="1529947"/>
-            <a:ext cx="3929583" cy="5461495"/>
+            <a:off x="135336" y="1160615"/>
+            <a:ext cx="3929583" cy="2845394"/>
           </a:xfrm>
           <a:prstGeom prst="rect">
             <a:avLst/>
@@ -8052,7 +8072,11 @@
               <a:rPr lang="pt-BR" sz="1600" b="1" dirty="0">
                 <a:latin typeface="Bahnschrift SemiBold" panose="020B0502040204020203" pitchFamily="34" charset="0"/>
               </a:rPr>
-              <a:t>Pré-requisito: </a:t>
+              <a:t>Pré-requisito</a:t>
+            </a:r>
+            <a:r>
+              <a:rPr lang="pt-BR" sz="1400" b="1" dirty="0"/>
+              <a:t>: </a:t>
             </a:r>
             <a:r>
               <a:rPr lang="pt-BR" sz="1400" dirty="0"/>
@@ -8060,11 +8084,11 @@
             </a:r>
             <a:r>
               <a:rPr lang="pt-BR" sz="1400" i="1" dirty="0"/>
-              <a:t>Logar</a:t>
-            </a:r>
-            <a:r>
-              <a:rPr lang="pt-BR" sz="1400" dirty="0"/>
-              <a:t>.</a:t>
+              <a:t>Jogar </a:t>
+            </a:r>
+            <a:r>
+              <a:rPr lang="pt-BR" sz="1400" dirty="0"/>
+              <a:t>de qualquer jogo.</a:t>
             </a:r>
           </a:p>
           <a:p>
@@ -8076,8 +8100,9 @@
             </a:r>
             <a:r>
               <a:rPr lang="pt-BR" sz="1400" dirty="0"/>
-              <a:t>Professor </a:t>
-            </a:r>
+              <a:t>Aluno </a:t>
+            </a:r>
+            <a:endParaRPr lang="pt-BR" sz="1400" dirty="0" smtClean="0"/>
           </a:p>
           <a:p>
             <a:endParaRPr lang="pt-BR" sz="1400" dirty="0"/>
@@ -8097,7 +8122,7 @@
             </a:pPr>
             <a:r>
               <a:rPr lang="pt-BR" sz="1400" dirty="0"/>
-              <a:t>Na tela “Home”, Professor clica no botão “Adicionar pergunta”</a:t>
+              <a:t>Na tela de qualquer um dos jogos Aluno clica no ícone do item Tempo</a:t>
             </a:r>
           </a:p>
           <a:p>
@@ -8107,7 +8132,7 @@
             </a:pPr>
             <a:r>
               <a:rPr lang="pt-BR" sz="1400" dirty="0"/>
-              <a:t>Sistema exibe janela “Cadastro de pergunta”</a:t>
+              <a:t>Sistema adiciona 30 segundos ao tempo restante e desconta item do inventário dele.</a:t>
             </a:r>
           </a:p>
           <a:p>
@@ -8117,69 +8142,7 @@
             </a:pPr>
             <a:r>
               <a:rPr lang="pt-BR" sz="1400" dirty="0"/>
-              <a:t>Professor preenche os campos: “Pergunta”, “Alternativa 1”, “Alternativa 2” e “Alternativa 3”. Após isso, clica no botão “Salvar”. </a:t>
-            </a:r>
-          </a:p>
-          <a:p>
-            <a:pPr marL="342900" lvl="0" indent="-342900">
-              <a:buFont typeface="+mj-lt"/>
-              <a:buAutoNum type="arabicPeriod"/>
-            </a:pPr>
-            <a:r>
-              <a:rPr lang="pt-BR" sz="1400" dirty="0"/>
-              <a:t>Sistema valida cadastro de pergunta. Salva pergunta e exibe mensagem de Sucesso.</a:t>
-            </a:r>
-          </a:p>
-          <a:p>
-            <a:pPr marL="342900" lvl="0" indent="-342900">
-              <a:buFont typeface="+mj-lt"/>
-              <a:buAutoNum type="arabicPeriod"/>
-            </a:pPr>
-            <a:r>
-              <a:rPr lang="pt-BR" sz="1400" dirty="0"/>
-              <a:t>Caso de uso finalizado</a:t>
-            </a:r>
-          </a:p>
-          <a:p>
-            <a:pPr lvl="0"/>
-            <a:endParaRPr lang="pt-BR" sz="1400" dirty="0"/>
-          </a:p>
-          <a:p>
-            <a:r>
-              <a:rPr lang="pt-BR" sz="1600" b="1" dirty="0">
-                <a:latin typeface="Bahnschrift SemiBold" panose="020B0502040204020203" pitchFamily="34" charset="0"/>
-              </a:rPr>
-              <a:t>Fluxo alternativo 1</a:t>
-            </a:r>
-          </a:p>
-          <a:p>
-            <a:pPr marL="342900" lvl="0" indent="-342900">
-              <a:buFont typeface="+mj-lt"/>
-              <a:buAutoNum type="arabicPeriod"/>
-            </a:pPr>
-            <a:r>
-              <a:rPr lang="pt-BR" sz="1400" dirty="0"/>
-              <a:t>A partir do passo 4 o sistema detectou erro (dados inválidos ou campos em branco) em “Pergunta”, “Alternativa 1”, “Alternativa 2” ou “Alternativa 3”.</a:t>
-            </a:r>
-          </a:p>
-          <a:p>
-            <a:pPr marL="342900" lvl="0" indent="-342900">
-              <a:buFont typeface="+mj-lt"/>
-              <a:buAutoNum type="arabicPeriod"/>
-            </a:pPr>
-            <a:r>
-              <a:rPr lang="pt-BR" sz="1400" dirty="0"/>
-              <a:t>Sistema exibe mensagem de erro.</a:t>
-            </a:r>
-          </a:p>
-          <a:p>
-            <a:pPr marL="342900" lvl="0" indent="-342900">
-              <a:buFont typeface="+mj-lt"/>
-              <a:buAutoNum type="arabicPeriod"/>
-            </a:pPr>
-            <a:r>
-              <a:rPr lang="pt-BR" sz="1400" dirty="0"/>
-              <a:t>Retorna ao passo 6 do fluxo principal.</a:t>
+              <a:t>Caso de uso finalizado.</a:t>
             </a:r>
           </a:p>
           <a:p>
@@ -8199,7 +8162,7 @@
         <p:spPr>
           <a:xfrm>
             <a:off x="301300" y="349475"/>
-            <a:ext cx="3838308" cy="830997"/>
+            <a:ext cx="3838308" cy="461665"/>
           </a:xfrm>
           <a:prstGeom prst="rect">
             <a:avLst/>
@@ -8213,11 +8176,14 @@
           <a:lstStyle/>
           <a:p>
             <a:r>
-              <a:rPr lang="pt-BR" sz="2400" b="1" dirty="0">
-                <a:latin typeface="Bahnschrift SemiBold" panose="020B0502040204020203" pitchFamily="34" charset="0"/>
-              </a:rPr>
-              <a:t>CADASTRA PERGUNTA PARA O QUIZ</a:t>
-            </a:r>
+              <a:rPr lang="pt-BR" sz="2400" b="1" dirty="0" smtClean="0">
+                <a:latin typeface="Bahnschrift SemiBold" panose="020B0502040204020203" pitchFamily="34" charset="0"/>
+              </a:rPr>
+              <a:t>USAR ITEM - TEMPO</a:t>
+            </a:r>
+            <a:endParaRPr lang="pt-BR" sz="2400" b="1" dirty="0">
+              <a:latin typeface="Bahnschrift SemiBold" panose="020B0502040204020203" pitchFamily="34" charset="0"/>
+            </a:endParaRPr>
           </a:p>
         </p:txBody>
       </p:sp>
@@ -8338,7 +8304,7 @@
         </p:nvSpPr>
         <p:spPr>
           <a:xfrm>
-            <a:off x="13686368" y="5280402"/>
+            <a:off x="15922087" y="5570893"/>
             <a:ext cx="3838308" cy="276999"/>
           </a:xfrm>
           <a:prstGeom prst="rect">
@@ -8369,7 +8335,7 @@
         </p:nvSpPr>
         <p:spPr>
           <a:xfrm>
-            <a:off x="5381505" y="403612"/>
+            <a:off x="5292138" y="405616"/>
             <a:ext cx="3838308" cy="276999"/>
           </a:xfrm>
           <a:prstGeom prst="rect">
@@ -8384,17 +8350,20 @@
           <a:lstStyle/>
           <a:p>
             <a:r>
-              <a:rPr lang="pt-BR" sz="1200" b="1" dirty="0">
-                <a:latin typeface="Bahnschrift SemiBold" panose="020B0502040204020203" pitchFamily="34" charset="0"/>
-              </a:rPr>
-              <a:t>LOJA</a:t>
-            </a:r>
+              <a:rPr lang="pt-BR" sz="1200" b="1" dirty="0" smtClean="0">
+                <a:latin typeface="Bahnschrift SemiBold" panose="020B0502040204020203" pitchFamily="34" charset="0"/>
+              </a:rPr>
+              <a:t>JOGO DA MEMÓRIA</a:t>
+            </a:r>
+            <a:endParaRPr lang="pt-BR" sz="1200" b="1" dirty="0">
+              <a:latin typeface="Bahnschrift SemiBold" panose="020B0502040204020203" pitchFamily="34" charset="0"/>
+            </a:endParaRPr>
           </a:p>
         </p:txBody>
       </p:sp>
       <p:pic>
         <p:nvPicPr>
-          <p:cNvPr id="12" name="Imagem 11"/>
+          <p:cNvPr id="3" name="Imagem 2"/>
           <p:cNvPicPr>
             <a:picLocks noChangeAspect="1"/>
           </p:cNvPicPr>
@@ -8414,8 +8383,8 @@
         </p:blipFill>
         <p:spPr>
           <a:xfrm>
-            <a:off x="4495407" y="680611"/>
-            <a:ext cx="3413645" cy="2063472"/>
+            <a:off x="4477393" y="680611"/>
+            <a:ext cx="3431659" cy="2093568"/>
           </a:xfrm>
           <a:prstGeom prst="rect">
             <a:avLst/>
@@ -8429,179 +8398,10 @@
           </a:effectLst>
         </p:spPr>
       </p:pic>
-      <p:pic>
-        <p:nvPicPr>
-          <p:cNvPr id="3" name="Imagem 2"/>
-          <p:cNvPicPr>
-            <a:picLocks noChangeAspect="1"/>
-          </p:cNvPicPr>
-          <p:nvPr/>
-        </p:nvPicPr>
-        <p:blipFill rotWithShape="1">
-          <a:blip r:embed="rId3" cstate="print">
-            <a:extLst>
-              <a:ext uri="{28A0092B-C50C-407E-A947-70E740481C1C}">
-                <a14:useLocalDpi xmlns:a14="http://schemas.microsoft.com/office/drawing/2010/main" val="0"/>
-              </a:ext>
-            </a:extLst>
-          </a:blip>
-          <a:srcRect l="16995" t="11394" r="26434" b="1428"/>
-          <a:stretch/>
-        </p:blipFill>
-        <p:spPr>
-          <a:xfrm>
-            <a:off x="4593071" y="3239976"/>
-            <a:ext cx="2482883" cy="2352206"/>
-          </a:xfrm>
-          <a:prstGeom prst="rect">
-            <a:avLst/>
-          </a:prstGeom>
-          <a:effectLst>
-            <a:outerShdw blurRad="50800" dist="38100" dir="2700000" algn="tl" rotWithShape="0">
-              <a:prstClr val="black">
-                <a:alpha val="40000"/>
-              </a:prstClr>
-            </a:outerShdw>
-          </a:effectLst>
-        </p:spPr>
-      </p:pic>
-      <p:sp>
-        <p:nvSpPr>
-          <p:cNvPr id="15" name="CaixaDeTexto 14"/>
-          <p:cNvSpPr txBox="1"/>
-          <p:nvPr/>
-        </p:nvSpPr>
-        <p:spPr>
-          <a:xfrm>
-            <a:off x="5381505" y="2882582"/>
-            <a:ext cx="3838308" cy="276999"/>
-          </a:xfrm>
-          <a:prstGeom prst="rect">
-            <a:avLst/>
-          </a:prstGeom>
-          <a:noFill/>
-        </p:spPr>
-        <p:txBody>
-          <a:bodyPr wrap="square" rtlCol="0">
-            <a:spAutoFit/>
-          </a:bodyPr>
-          <a:lstStyle/>
-          <a:p>
-            <a:r>
-              <a:rPr lang="pt-BR" sz="1200" b="1" dirty="0">
-                <a:latin typeface="Bahnschrift SemiBold" panose="020B0502040204020203" pitchFamily="34" charset="0"/>
-              </a:rPr>
-              <a:t>LOJA</a:t>
-            </a:r>
-          </a:p>
-        </p:txBody>
-      </p:sp>
-      <p:pic>
-        <p:nvPicPr>
-          <p:cNvPr id="8" name="Imagem 7"/>
-          <p:cNvPicPr>
-            <a:picLocks noChangeAspect="1"/>
-          </p:cNvPicPr>
-          <p:nvPr/>
-        </p:nvPicPr>
-        <p:blipFill>
-          <a:blip r:embed="rId4">
-            <a:extLst>
-              <a:ext uri="{28A0092B-C50C-407E-A947-70E740481C1C}">
-                <a14:useLocalDpi xmlns:a14="http://schemas.microsoft.com/office/drawing/2010/main" val="0"/>
-              </a:ext>
-            </a:extLst>
-          </a:blip>
-          <a:stretch>
-            <a:fillRect/>
-          </a:stretch>
-        </p:blipFill>
-        <p:spPr>
-          <a:xfrm>
-            <a:off x="10446519" y="5592182"/>
-            <a:ext cx="8467111" cy="2343063"/>
-          </a:xfrm>
-          <a:prstGeom prst="rect">
-            <a:avLst/>
-          </a:prstGeom>
-        </p:spPr>
-      </p:pic>
-      <p:pic>
-        <p:nvPicPr>
-          <p:cNvPr id="6" name="Imagem 5">
-            <a:extLst>
-              <a:ext uri="{FF2B5EF4-FFF2-40B4-BE49-F238E27FC236}">
-                <a16:creationId xmlns:a16="http://schemas.microsoft.com/office/drawing/2014/main" id="{2D5029BD-C27B-44E0-823C-F119A1E7FA94}"/>
-              </a:ext>
-            </a:extLst>
-          </p:cNvPr>
-          <p:cNvPicPr>
-            <a:picLocks noChangeAspect="1"/>
-          </p:cNvPicPr>
-          <p:nvPr/>
-        </p:nvPicPr>
-        <p:blipFill>
-          <a:blip r:embed="rId5">
-            <a:extLst>
-              <a:ext uri="{28A0092B-C50C-407E-A947-70E740481C1C}">
-                <a14:useLocalDpi xmlns:a14="http://schemas.microsoft.com/office/drawing/2010/main" val="0"/>
-              </a:ext>
-            </a:extLst>
-          </a:blip>
-          <a:stretch>
-            <a:fillRect/>
-          </a:stretch>
-        </p:blipFill>
-        <p:spPr>
-          <a:xfrm>
-            <a:off x="8114836" y="631355"/>
-            <a:ext cx="5088507" cy="4926046"/>
-          </a:xfrm>
-          <a:prstGeom prst="rect">
-            <a:avLst/>
-          </a:prstGeom>
-        </p:spPr>
-      </p:pic>
-      <p:pic>
-        <p:nvPicPr>
-          <p:cNvPr id="9" name="Imagem 8">
-            <a:extLst>
-              <a:ext uri="{FF2B5EF4-FFF2-40B4-BE49-F238E27FC236}">
-                <a16:creationId xmlns:a16="http://schemas.microsoft.com/office/drawing/2014/main" id="{7E941A6F-687A-41BF-8CE0-8190F3D268B8}"/>
-              </a:ext>
-            </a:extLst>
-          </p:cNvPr>
-          <p:cNvPicPr>
-            <a:picLocks noChangeAspect="1"/>
-          </p:cNvPicPr>
-          <p:nvPr/>
-        </p:nvPicPr>
-        <p:blipFill>
-          <a:blip r:embed="rId6">
-            <a:extLst>
-              <a:ext uri="{28A0092B-C50C-407E-A947-70E740481C1C}">
-                <a14:useLocalDpi xmlns:a14="http://schemas.microsoft.com/office/drawing/2010/main" val="0"/>
-              </a:ext>
-            </a:extLst>
-          </a:blip>
-          <a:stretch>
-            <a:fillRect/>
-          </a:stretch>
-        </p:blipFill>
-        <p:spPr>
-          <a:xfrm>
-            <a:off x="14242225" y="715393"/>
-            <a:ext cx="4843124" cy="4395205"/>
-          </a:xfrm>
-          <a:prstGeom prst="rect">
-            <a:avLst/>
-          </a:prstGeom>
-        </p:spPr>
-      </p:pic>
     </p:spTree>
     <p:extLst>
       <p:ext uri="{BB962C8B-B14F-4D97-AF65-F5344CB8AC3E}">
-        <p14:creationId xmlns:p14="http://schemas.microsoft.com/office/powerpoint/2010/main" val="2844365666"/>
+        <p14:creationId xmlns:p14="http://schemas.microsoft.com/office/powerpoint/2010/main" val="3736424935"/>
       </p:ext>
     </p:extLst>
   </p:cSld>
@@ -8683,8 +8483,8 @@
         </p:nvSpPr>
         <p:spPr>
           <a:xfrm>
-            <a:off x="135336" y="1529947"/>
-            <a:ext cx="3929583" cy="2199064"/>
+            <a:off x="135336" y="1160615"/>
+            <a:ext cx="3929583" cy="3060838"/>
           </a:xfrm>
           <a:prstGeom prst="rect">
             <a:avLst/>
@@ -8709,11 +8509,11 @@
             </a:r>
             <a:r>
               <a:rPr lang="pt-BR" sz="1400" i="1" dirty="0"/>
-              <a:t>Logar</a:t>
-            </a:r>
-            <a:r>
-              <a:rPr lang="pt-BR" sz="1400" dirty="0"/>
-              <a:t>.</a:t>
+              <a:t>Jogar </a:t>
+            </a:r>
+            <a:r>
+              <a:rPr lang="pt-BR" sz="1400" dirty="0"/>
+              <a:t>de qualquer jogo.</a:t>
             </a:r>
           </a:p>
           <a:p>
@@ -8727,6 +8527,7 @@
               <a:rPr lang="pt-BR" sz="1400" dirty="0"/>
               <a:t>Aluno </a:t>
             </a:r>
+            <a:endParaRPr lang="pt-BR" sz="1400" dirty="0" smtClean="0"/>
           </a:p>
           <a:p>
             <a:endParaRPr lang="pt-BR" sz="1400" dirty="0"/>
@@ -8746,7 +8547,7 @@
             </a:pPr>
             <a:r>
               <a:rPr lang="pt-BR" sz="1400" dirty="0"/>
-              <a:t>Na tela “Home”, Aluno clica no botão “Como Funciona?”</a:t>
+              <a:t>Na tela de qualquer um dos jogos Aluno clica no ícone do item Pontos</a:t>
             </a:r>
           </a:p>
           <a:p>
@@ -8756,8 +8557,21 @@
             </a:pPr>
             <a:r>
               <a:rPr lang="pt-BR" sz="1400" dirty="0"/>
-              <a:t>Sistema abre a tela “Ajuda”</a:t>
-            </a:r>
+              <a:t>Sistema dobra quantidade de pontos recebidos no jogo atual e desconta item do inventário dele.</a:t>
+            </a:r>
+          </a:p>
+          <a:p>
+            <a:pPr marL="342900" lvl="0" indent="-342900">
+              <a:buFont typeface="+mj-lt"/>
+              <a:buAutoNum type="arabicPeriod"/>
+            </a:pPr>
+            <a:r>
+              <a:rPr lang="pt-BR" sz="1400" dirty="0"/>
+              <a:t>Caso de uso finalizado.</a:t>
+            </a:r>
+          </a:p>
+          <a:p>
+            <a:endParaRPr lang="pt-BR" sz="1400" dirty="0"/>
           </a:p>
           <a:p>
             <a:endParaRPr lang="pt-BR" sz="1890" dirty="0"/>
@@ -8773,7 +8587,7 @@
         <p:spPr>
           <a:xfrm>
             <a:off x="301300" y="349475"/>
-            <a:ext cx="3838308" cy="830997"/>
+            <a:ext cx="3838308" cy="461665"/>
           </a:xfrm>
           <a:prstGeom prst="rect">
             <a:avLst/>
@@ -8787,11 +8601,14 @@
           <a:lstStyle/>
           <a:p>
             <a:r>
-              <a:rPr lang="pt-BR" sz="2400" b="1" dirty="0">
-                <a:latin typeface="Bahnschrift SemiBold" panose="020B0502040204020203" pitchFamily="34" charset="0"/>
-              </a:rPr>
-              <a:t>ACESSAR COMO FUNCIONA</a:t>
-            </a:r>
+              <a:rPr lang="pt-BR" sz="2400" b="1" dirty="0" smtClean="0">
+                <a:latin typeface="Bahnschrift SemiBold" panose="020B0502040204020203" pitchFamily="34" charset="0"/>
+              </a:rPr>
+              <a:t>USAR ITEM - PONTOS</a:t>
+            </a:r>
+            <a:endParaRPr lang="pt-BR" sz="2400" b="1" dirty="0">
+              <a:latin typeface="Bahnschrift SemiBold" panose="020B0502040204020203" pitchFamily="34" charset="0"/>
+            </a:endParaRPr>
           </a:p>
         </p:txBody>
       </p:sp>
@@ -8912,7 +8729,7 @@
         </p:nvSpPr>
         <p:spPr>
           <a:xfrm>
-            <a:off x="15922087" y="6142090"/>
+            <a:off x="15922087" y="5570893"/>
             <a:ext cx="3838308" cy="276999"/>
           </a:xfrm>
           <a:prstGeom prst="rect">
@@ -8943,7 +8760,7 @@
         </p:nvSpPr>
         <p:spPr>
           <a:xfrm>
-            <a:off x="5381505" y="403612"/>
+            <a:off x="5292138" y="405616"/>
             <a:ext cx="3838308" cy="276999"/>
           </a:xfrm>
           <a:prstGeom prst="rect">
@@ -8958,17 +8775,20 @@
           <a:lstStyle/>
           <a:p>
             <a:r>
-              <a:rPr lang="pt-BR" sz="1200" b="1" dirty="0">
-                <a:latin typeface="Bahnschrift SemiBold" panose="020B0502040204020203" pitchFamily="34" charset="0"/>
-              </a:rPr>
-              <a:t>AJUDA</a:t>
-            </a:r>
+              <a:rPr lang="pt-BR" sz="1200" b="1" dirty="0" smtClean="0">
+                <a:latin typeface="Bahnschrift SemiBold" panose="020B0502040204020203" pitchFamily="34" charset="0"/>
+              </a:rPr>
+              <a:t>JOGO DA MEMÓRIA</a:t>
+            </a:r>
+            <a:endParaRPr lang="pt-BR" sz="1200" b="1" dirty="0">
+              <a:latin typeface="Bahnschrift SemiBold" panose="020B0502040204020203" pitchFamily="34" charset="0"/>
+            </a:endParaRPr>
           </a:p>
         </p:txBody>
       </p:sp>
       <p:pic>
         <p:nvPicPr>
-          <p:cNvPr id="4" name="Imagem 3"/>
+          <p:cNvPr id="3" name="Imagem 2"/>
           <p:cNvPicPr>
             <a:picLocks noChangeAspect="1"/>
           </p:cNvPicPr>
@@ -8988,8 +8808,8 @@
         </p:blipFill>
         <p:spPr>
           <a:xfrm>
-            <a:off x="4484014" y="680611"/>
-            <a:ext cx="3413645" cy="2071058"/>
+            <a:off x="4477393" y="680611"/>
+            <a:ext cx="3431659" cy="2093568"/>
           </a:xfrm>
           <a:prstGeom prst="rect">
             <a:avLst/>
@@ -9003,111 +8823,10 @@
           </a:effectLst>
         </p:spPr>
       </p:pic>
-      <p:pic>
-        <p:nvPicPr>
-          <p:cNvPr id="6" name="Imagem 5"/>
-          <p:cNvPicPr>
-            <a:picLocks noChangeAspect="1"/>
-          </p:cNvPicPr>
-          <p:nvPr/>
-        </p:nvPicPr>
-        <p:blipFill rotWithShape="1">
-          <a:blip r:embed="rId3">
-            <a:extLst>
-              <a:ext uri="{28A0092B-C50C-407E-A947-70E740481C1C}">
-                <a14:useLocalDpi xmlns:a14="http://schemas.microsoft.com/office/drawing/2010/main" val="0"/>
-              </a:ext>
-            </a:extLst>
-          </a:blip>
-          <a:srcRect l="6938" t="31900" r="28254" b="45035"/>
-          <a:stretch/>
-        </p:blipFill>
-        <p:spPr>
-          <a:xfrm>
-            <a:off x="14977872" y="6419089"/>
-            <a:ext cx="4462272" cy="1201959"/>
-          </a:xfrm>
-          <a:prstGeom prst="rect">
-            <a:avLst/>
-          </a:prstGeom>
-        </p:spPr>
-      </p:pic>
-      <p:pic>
-        <p:nvPicPr>
-          <p:cNvPr id="7" name="Imagem 6">
-            <a:extLst>
-              <a:ext uri="{FF2B5EF4-FFF2-40B4-BE49-F238E27FC236}">
-                <a16:creationId xmlns:a16="http://schemas.microsoft.com/office/drawing/2014/main" id="{A624A659-8F1A-447A-9FC5-24BF39FBA8A5}"/>
-              </a:ext>
-            </a:extLst>
-          </p:cNvPr>
-          <p:cNvPicPr>
-            <a:picLocks noChangeAspect="1"/>
-          </p:cNvPicPr>
-          <p:nvPr/>
-        </p:nvPicPr>
-        <p:blipFill>
-          <a:blip r:embed="rId4">
-            <a:extLst>
-              <a:ext uri="{28A0092B-C50C-407E-A947-70E740481C1C}">
-                <a14:useLocalDpi xmlns:a14="http://schemas.microsoft.com/office/drawing/2010/main" val="0"/>
-              </a:ext>
-            </a:extLst>
-          </a:blip>
-          <a:stretch>
-            <a:fillRect/>
-          </a:stretch>
-        </p:blipFill>
-        <p:spPr>
-          <a:xfrm>
-            <a:off x="8227319" y="680611"/>
-            <a:ext cx="5734225" cy="3279408"/>
-          </a:xfrm>
-          <a:prstGeom prst="rect">
-            <a:avLst/>
-          </a:prstGeom>
-        </p:spPr>
-      </p:pic>
-      <p:pic>
-        <p:nvPicPr>
-          <p:cNvPr id="9" name="Imagem 8">
-            <a:extLst>
-              <a:ext uri="{FF2B5EF4-FFF2-40B4-BE49-F238E27FC236}">
-                <a16:creationId xmlns:a16="http://schemas.microsoft.com/office/drawing/2014/main" id="{ED4D3564-9C64-4D6F-99F0-1FAAD2EA4C0B}"/>
-              </a:ext>
-            </a:extLst>
-          </p:cNvPr>
-          <p:cNvPicPr>
-            <a:picLocks noChangeAspect="1"/>
-          </p:cNvPicPr>
-          <p:nvPr/>
-        </p:nvPicPr>
-        <p:blipFill>
-          <a:blip r:embed="rId5">
-            <a:extLst>
-              <a:ext uri="{28A0092B-C50C-407E-A947-70E740481C1C}">
-                <a14:useLocalDpi xmlns:a14="http://schemas.microsoft.com/office/drawing/2010/main" val="0"/>
-              </a:ext>
-            </a:extLst>
-          </a:blip>
-          <a:stretch>
-            <a:fillRect/>
-          </a:stretch>
-        </p:blipFill>
-        <p:spPr>
-          <a:xfrm>
-            <a:off x="14291205" y="680611"/>
-            <a:ext cx="5212932" cy="3279408"/>
-          </a:xfrm>
-          <a:prstGeom prst="rect">
-            <a:avLst/>
-          </a:prstGeom>
-        </p:spPr>
-      </p:pic>
     </p:spTree>
     <p:extLst>
       <p:ext uri="{BB962C8B-B14F-4D97-AF65-F5344CB8AC3E}">
-        <p14:creationId xmlns:p14="http://schemas.microsoft.com/office/powerpoint/2010/main" val="272299884"/>
+        <p14:creationId xmlns:p14="http://schemas.microsoft.com/office/powerpoint/2010/main" val="1354373352"/>
       </p:ext>
     </p:extLst>
   </p:cSld>
@@ -9810,7 +9529,7 @@
           <p:cNvPr id="10" name="Imagem 9">
             <a:extLst>
               <a:ext uri="{FF2B5EF4-FFF2-40B4-BE49-F238E27FC236}">
-                <a16:creationId xmlns:a16="http://schemas.microsoft.com/office/drawing/2014/main" id="{661CF106-30F7-4709-B0CF-3E334DAD90ED}"/>
+                <a16:creationId xmlns:a16="http://schemas.microsoft.com/office/drawing/2014/main" xmlns="" id="{661CF106-30F7-4709-B0CF-3E334DAD90ED}"/>
               </a:ext>
             </a:extLst>
           </p:cNvPr>
@@ -9845,6 +9564,1644 @@
     <p:extLst>
       <p:ext uri="{BB962C8B-B14F-4D97-AF65-F5344CB8AC3E}">
         <p14:creationId xmlns:p14="http://schemas.microsoft.com/office/powerpoint/2010/main" val="4129169581"/>
+      </p:ext>
+    </p:extLst>
+  </p:cSld>
+  <p:clrMapOvr>
+    <a:masterClrMapping/>
+  </p:clrMapOvr>
+</p:sld>
+</file>
+
+<file path=ppt/slides/slide20.xml><?xml version="1.0" encoding="utf-8"?>
+<p:sld xmlns:a="http://schemas.openxmlformats.org/drawingml/2006/main" xmlns:r="http://schemas.openxmlformats.org/officeDocument/2006/relationships" xmlns:p="http://schemas.openxmlformats.org/presentationml/2006/main">
+  <p:cSld>
+    <p:spTree>
+      <p:nvGrpSpPr>
+        <p:cNvPr id="1" name=""/>
+        <p:cNvGrpSpPr/>
+        <p:nvPr/>
+      </p:nvGrpSpPr>
+      <p:grpSpPr>
+        <a:xfrm>
+          <a:off x="0" y="0"/>
+          <a:ext cx="0" cy="0"/>
+          <a:chOff x="0" y="0"/>
+          <a:chExt cx="0" cy="0"/>
+        </a:xfrm>
+      </p:grpSpPr>
+      <p:sp>
+        <p:nvSpPr>
+          <p:cNvPr id="83" name="Retângulo 82"/>
+          <p:cNvSpPr/>
+          <p:nvPr/>
+        </p:nvSpPr>
+        <p:spPr>
+          <a:xfrm>
+            <a:off x="0" y="0"/>
+            <a:ext cx="4200256" cy="7920038"/>
+          </a:xfrm>
+          <a:prstGeom prst="rect">
+            <a:avLst/>
+          </a:prstGeom>
+          <a:solidFill>
+            <a:srgbClr val="FDEBC7"/>
+          </a:solidFill>
+          <a:ln>
+            <a:noFill/>
+          </a:ln>
+          <a:effectLst/>
+        </p:spPr>
+        <p:style>
+          <a:lnRef idx="2">
+            <a:schemeClr val="accent1">
+              <a:shade val="50000"/>
+            </a:schemeClr>
+          </a:lnRef>
+          <a:fillRef idx="1">
+            <a:schemeClr val="accent1"/>
+          </a:fillRef>
+          <a:effectRef idx="0">
+            <a:schemeClr val="accent1"/>
+          </a:effectRef>
+          <a:fontRef idx="minor">
+            <a:schemeClr val="lt1"/>
+          </a:fontRef>
+        </p:style>
+        <p:txBody>
+          <a:bodyPr rtlCol="0" anchor="ctr"/>
+          <a:lstStyle/>
+          <a:p>
+            <a:pPr algn="ctr"/>
+            <a:endParaRPr lang="pt-BR"/>
+          </a:p>
+        </p:txBody>
+      </p:sp>
+      <p:sp>
+        <p:nvSpPr>
+          <p:cNvPr id="5" name="CaixaDeTexto 4"/>
+          <p:cNvSpPr txBox="1"/>
+          <p:nvPr/>
+        </p:nvSpPr>
+        <p:spPr>
+          <a:xfrm>
+            <a:off x="171426" y="1160615"/>
+            <a:ext cx="3929583" cy="4384277"/>
+          </a:xfrm>
+          <a:prstGeom prst="rect">
+            <a:avLst/>
+          </a:prstGeom>
+          <a:noFill/>
+        </p:spPr>
+        <p:txBody>
+          <a:bodyPr wrap="square" rtlCol="0">
+            <a:spAutoFit/>
+          </a:bodyPr>
+          <a:lstStyle/>
+          <a:p>
+            <a:r>
+              <a:rPr lang="pt-BR" sz="1600" b="1" dirty="0">
+                <a:latin typeface="Bahnschrift SemiBold" panose="020B0502040204020203" pitchFamily="34" charset="0"/>
+              </a:rPr>
+              <a:t>Pré-requisito: </a:t>
+            </a:r>
+            <a:r>
+              <a:rPr lang="pt-BR" sz="1400" dirty="0"/>
+              <a:t>Ter executado o caso de uso </a:t>
+            </a:r>
+            <a:r>
+              <a:rPr lang="pt-BR" sz="1400" i="1" dirty="0"/>
+              <a:t>Jogar </a:t>
+            </a:r>
+            <a:r>
+              <a:rPr lang="pt-BR" sz="1400" i="1" dirty="0" err="1"/>
+              <a:t>Quiz</a:t>
+            </a:r>
+            <a:r>
+              <a:rPr lang="pt-BR" sz="1400" dirty="0"/>
+              <a:t>.</a:t>
+            </a:r>
+          </a:p>
+          <a:p>
+            <a:r>
+              <a:rPr lang="pt-BR" sz="1600" b="1" dirty="0">
+                <a:latin typeface="Bahnschrift SemiBold" panose="020B0502040204020203" pitchFamily="34" charset="0"/>
+              </a:rPr>
+              <a:t>Atores: </a:t>
+            </a:r>
+            <a:r>
+              <a:rPr lang="pt-BR" sz="1400" dirty="0"/>
+              <a:t>Aluno </a:t>
+            </a:r>
+            <a:endParaRPr lang="pt-BR" sz="1400" dirty="0" smtClean="0"/>
+          </a:p>
+          <a:p>
+            <a:endParaRPr lang="pt-BR" sz="1400" dirty="0"/>
+          </a:p>
+          <a:p>
+            <a:r>
+              <a:rPr lang="pt-BR" sz="1600" b="1" dirty="0">
+                <a:latin typeface="Bahnschrift SemiBold" panose="020B0502040204020203" pitchFamily="34" charset="0"/>
+              </a:rPr>
+              <a:t>Fluxo principal</a:t>
+            </a:r>
+          </a:p>
+          <a:p>
+            <a:pPr marL="342900" lvl="0" indent="-342900">
+              <a:buFont typeface="+mj-lt"/>
+              <a:buAutoNum type="arabicPeriod"/>
+            </a:pPr>
+            <a:r>
+              <a:rPr lang="pt-BR" sz="1400" dirty="0"/>
+              <a:t>Na tela do </a:t>
+            </a:r>
+            <a:r>
+              <a:rPr lang="pt-BR" sz="1400" dirty="0" err="1"/>
+              <a:t>Quiz</a:t>
+            </a:r>
+            <a:r>
+              <a:rPr lang="pt-BR" sz="1400" dirty="0"/>
+              <a:t> Aluno clica no ícone do item Resposta</a:t>
+            </a:r>
+          </a:p>
+          <a:p>
+            <a:pPr marL="342900" lvl="0" indent="-342900">
+              <a:buFont typeface="+mj-lt"/>
+              <a:buAutoNum type="arabicPeriod"/>
+            </a:pPr>
+            <a:r>
+              <a:rPr lang="pt-BR" sz="1400" dirty="0"/>
+              <a:t>Sistema exibe resposta correta, avança para próxima pergunta e desconta item do inventário dele.</a:t>
+            </a:r>
+          </a:p>
+          <a:p>
+            <a:pPr marL="342900" lvl="0" indent="-342900">
+              <a:buFont typeface="+mj-lt"/>
+              <a:buAutoNum type="arabicPeriod"/>
+            </a:pPr>
+            <a:r>
+              <a:rPr lang="pt-BR" sz="1400" dirty="0"/>
+              <a:t>Caso de uso finalizado</a:t>
+            </a:r>
+            <a:r>
+              <a:rPr lang="pt-BR" sz="1400" dirty="0" smtClean="0"/>
+              <a:t>.</a:t>
+            </a:r>
+          </a:p>
+          <a:p>
+            <a:pPr lvl="0"/>
+            <a:endParaRPr lang="pt-BR" sz="1400" dirty="0"/>
+          </a:p>
+          <a:p>
+            <a:r>
+              <a:rPr lang="pt-BR" sz="1600" b="1" dirty="0">
+                <a:latin typeface="Bahnschrift SemiBold" panose="020B0502040204020203" pitchFamily="34" charset="0"/>
+              </a:rPr>
+              <a:t>Fluxo alternativo 1</a:t>
+            </a:r>
+          </a:p>
+          <a:p>
+            <a:pPr marL="342900" lvl="0" indent="-342900">
+              <a:buFont typeface="+mj-lt"/>
+              <a:buAutoNum type="arabicPeriod"/>
+            </a:pPr>
+            <a:r>
+              <a:rPr lang="pt-BR" sz="1400" dirty="0"/>
+              <a:t>A partir do passo 2 o sistema detectou que não tem próxima pergunta</a:t>
+            </a:r>
+          </a:p>
+          <a:p>
+            <a:pPr marL="342900" lvl="0" indent="-342900">
+              <a:buFont typeface="+mj-lt"/>
+              <a:buAutoNum type="arabicPeriod"/>
+            </a:pPr>
+            <a:r>
+              <a:rPr lang="pt-BR" sz="1400" dirty="0"/>
+              <a:t>Sistema exibe tela do próximo jogo</a:t>
+            </a:r>
+          </a:p>
+          <a:p>
+            <a:pPr marL="342900" lvl="0" indent="-342900">
+              <a:buFont typeface="+mj-lt"/>
+              <a:buAutoNum type="arabicPeriod"/>
+            </a:pPr>
+            <a:r>
+              <a:rPr lang="pt-BR" sz="1400" dirty="0"/>
+              <a:t>Retorna ao passo 3 do fluxo principal.</a:t>
+            </a:r>
+          </a:p>
+          <a:p>
+            <a:endParaRPr lang="pt-BR" sz="1400" dirty="0"/>
+          </a:p>
+          <a:p>
+            <a:endParaRPr lang="pt-BR" sz="1890" dirty="0"/>
+          </a:p>
+        </p:txBody>
+      </p:sp>
+      <p:sp>
+        <p:nvSpPr>
+          <p:cNvPr id="2" name="CaixaDeTexto 1"/>
+          <p:cNvSpPr txBox="1"/>
+          <p:nvPr/>
+        </p:nvSpPr>
+        <p:spPr>
+          <a:xfrm>
+            <a:off x="301300" y="349475"/>
+            <a:ext cx="3838308" cy="461665"/>
+          </a:xfrm>
+          <a:prstGeom prst="rect">
+            <a:avLst/>
+          </a:prstGeom>
+          <a:noFill/>
+        </p:spPr>
+        <p:txBody>
+          <a:bodyPr wrap="square" rtlCol="0">
+            <a:spAutoFit/>
+          </a:bodyPr>
+          <a:lstStyle/>
+          <a:p>
+            <a:r>
+              <a:rPr lang="pt-BR" sz="2400" b="1" dirty="0" smtClean="0">
+                <a:latin typeface="Bahnschrift SemiBold" panose="020B0502040204020203" pitchFamily="34" charset="0"/>
+              </a:rPr>
+              <a:t>USAR ITEM - RESPOSTA</a:t>
+            </a:r>
+            <a:endParaRPr lang="pt-BR" sz="2400" b="1" dirty="0">
+              <a:latin typeface="Bahnschrift SemiBold" panose="020B0502040204020203" pitchFamily="34" charset="0"/>
+            </a:endParaRPr>
+          </a:p>
+        </p:txBody>
+      </p:sp>
+      <p:sp>
+        <p:nvSpPr>
+          <p:cNvPr id="85" name="Retângulo 84"/>
+          <p:cNvSpPr/>
+          <p:nvPr/>
+        </p:nvSpPr>
+        <p:spPr>
+          <a:xfrm>
+            <a:off x="4206976" y="0"/>
+            <a:ext cx="82647" cy="7920038"/>
+          </a:xfrm>
+          <a:prstGeom prst="rect">
+            <a:avLst/>
+          </a:prstGeom>
+          <a:solidFill>
+            <a:srgbClr val="82B457"/>
+          </a:solidFill>
+          <a:ln>
+            <a:noFill/>
+          </a:ln>
+          <a:effectLst/>
+        </p:spPr>
+        <p:style>
+          <a:lnRef idx="2">
+            <a:schemeClr val="accent1">
+              <a:shade val="50000"/>
+            </a:schemeClr>
+          </a:lnRef>
+          <a:fillRef idx="1">
+            <a:schemeClr val="accent1"/>
+          </a:fillRef>
+          <a:effectRef idx="0">
+            <a:schemeClr val="accent1"/>
+          </a:effectRef>
+          <a:fontRef idx="minor">
+            <a:schemeClr val="lt1"/>
+          </a:fontRef>
+        </p:style>
+        <p:txBody>
+          <a:bodyPr rtlCol="0" anchor="ctr"/>
+          <a:lstStyle/>
+          <a:p>
+            <a:pPr algn="ctr"/>
+            <a:endParaRPr lang="pt-BR"/>
+          </a:p>
+        </p:txBody>
+      </p:sp>
+      <p:sp>
+        <p:nvSpPr>
+          <p:cNvPr id="84" name="CaixaDeTexto 83"/>
+          <p:cNvSpPr txBox="1"/>
+          <p:nvPr/>
+        </p:nvSpPr>
+        <p:spPr>
+          <a:xfrm>
+            <a:off x="10311695" y="349499"/>
+            <a:ext cx="3838308" cy="276999"/>
+          </a:xfrm>
+          <a:prstGeom prst="rect">
+            <a:avLst/>
+          </a:prstGeom>
+          <a:noFill/>
+        </p:spPr>
+        <p:txBody>
+          <a:bodyPr wrap="square" rtlCol="0">
+            <a:spAutoFit/>
+          </a:bodyPr>
+          <a:lstStyle/>
+          <a:p>
+            <a:r>
+              <a:rPr lang="pt-BR" sz="1200" b="1" dirty="0">
+                <a:latin typeface="Bahnschrift SemiBold" panose="020B0502040204020203" pitchFamily="34" charset="0"/>
+              </a:rPr>
+              <a:t>DIAGRAMA DE SEQUÊNCIA</a:t>
+            </a:r>
+          </a:p>
+        </p:txBody>
+      </p:sp>
+      <p:sp>
+        <p:nvSpPr>
+          <p:cNvPr id="87" name="CaixaDeTexto 86"/>
+          <p:cNvSpPr txBox="1"/>
+          <p:nvPr/>
+        </p:nvSpPr>
+        <p:spPr>
+          <a:xfrm>
+            <a:off x="15922087" y="403613"/>
+            <a:ext cx="3838308" cy="276999"/>
+          </a:xfrm>
+          <a:prstGeom prst="rect">
+            <a:avLst/>
+          </a:prstGeom>
+          <a:noFill/>
+        </p:spPr>
+        <p:txBody>
+          <a:bodyPr wrap="square" rtlCol="0">
+            <a:spAutoFit/>
+          </a:bodyPr>
+          <a:lstStyle/>
+          <a:p>
+            <a:r>
+              <a:rPr lang="pt-BR" sz="1200" b="1" dirty="0">
+                <a:latin typeface="Bahnschrift SemiBold" panose="020B0502040204020203" pitchFamily="34" charset="0"/>
+              </a:rPr>
+              <a:t>DIAGRAMA DE CLASSE</a:t>
+            </a:r>
+          </a:p>
+        </p:txBody>
+      </p:sp>
+      <p:sp>
+        <p:nvSpPr>
+          <p:cNvPr id="17" name="CaixaDeTexto 16"/>
+          <p:cNvSpPr txBox="1"/>
+          <p:nvPr/>
+        </p:nvSpPr>
+        <p:spPr>
+          <a:xfrm>
+            <a:off x="15922087" y="5570893"/>
+            <a:ext cx="3838308" cy="276999"/>
+          </a:xfrm>
+          <a:prstGeom prst="rect">
+            <a:avLst/>
+          </a:prstGeom>
+          <a:noFill/>
+        </p:spPr>
+        <p:txBody>
+          <a:bodyPr wrap="square" rtlCol="0">
+            <a:spAutoFit/>
+          </a:bodyPr>
+          <a:lstStyle/>
+          <a:p>
+            <a:r>
+              <a:rPr lang="pt-BR" sz="1200" b="1" dirty="0">
+                <a:latin typeface="Bahnschrift SemiBold" panose="020B0502040204020203" pitchFamily="34" charset="0"/>
+              </a:rPr>
+              <a:t>DIAGRAMA DE ROBUSTEZ</a:t>
+            </a:r>
+          </a:p>
+        </p:txBody>
+      </p:sp>
+      <p:sp>
+        <p:nvSpPr>
+          <p:cNvPr id="14" name="CaixaDeTexto 13"/>
+          <p:cNvSpPr txBox="1"/>
+          <p:nvPr/>
+        </p:nvSpPr>
+        <p:spPr>
+          <a:xfrm>
+            <a:off x="5292138" y="405616"/>
+            <a:ext cx="3838308" cy="276999"/>
+          </a:xfrm>
+          <a:prstGeom prst="rect">
+            <a:avLst/>
+          </a:prstGeom>
+          <a:noFill/>
+        </p:spPr>
+        <p:txBody>
+          <a:bodyPr wrap="square" rtlCol="0">
+            <a:spAutoFit/>
+          </a:bodyPr>
+          <a:lstStyle/>
+          <a:p>
+            <a:r>
+              <a:rPr lang="pt-BR" sz="1200" b="1" dirty="0" smtClean="0">
+                <a:latin typeface="Bahnschrift SemiBold" panose="020B0502040204020203" pitchFamily="34" charset="0"/>
+              </a:rPr>
+              <a:t>JOGO QUIZ</a:t>
+            </a:r>
+            <a:endParaRPr lang="pt-BR" sz="1200" b="1" dirty="0">
+              <a:latin typeface="Bahnschrift SemiBold" panose="020B0502040204020203" pitchFamily="34" charset="0"/>
+            </a:endParaRPr>
+          </a:p>
+        </p:txBody>
+      </p:sp>
+      <p:pic>
+        <p:nvPicPr>
+          <p:cNvPr id="4" name="Imagem 3"/>
+          <p:cNvPicPr>
+            <a:picLocks noChangeAspect="1"/>
+          </p:cNvPicPr>
+          <p:nvPr/>
+        </p:nvPicPr>
+        <p:blipFill>
+          <a:blip r:embed="rId2" cstate="print">
+            <a:extLst>
+              <a:ext uri="{28A0092B-C50C-407E-A947-70E740481C1C}">
+                <a14:useLocalDpi xmlns:a14="http://schemas.microsoft.com/office/drawing/2010/main" val="0"/>
+              </a:ext>
+            </a:extLst>
+          </a:blip>
+          <a:stretch>
+            <a:fillRect/>
+          </a:stretch>
+        </p:blipFill>
+        <p:spPr>
+          <a:xfrm>
+            <a:off x="4501556" y="811140"/>
+            <a:ext cx="3866321" cy="2358744"/>
+          </a:xfrm>
+          <a:prstGeom prst="rect">
+            <a:avLst/>
+          </a:prstGeom>
+          <a:effectLst>
+            <a:outerShdw blurRad="50800" dist="38100" dir="2700000" algn="tl" rotWithShape="0">
+              <a:prstClr val="black">
+                <a:alpha val="40000"/>
+              </a:prstClr>
+            </a:outerShdw>
+          </a:effectLst>
+        </p:spPr>
+      </p:pic>
+    </p:spTree>
+    <p:extLst>
+      <p:ext uri="{BB962C8B-B14F-4D97-AF65-F5344CB8AC3E}">
+        <p14:creationId xmlns:p14="http://schemas.microsoft.com/office/powerpoint/2010/main" val="3972697398"/>
+      </p:ext>
+    </p:extLst>
+  </p:cSld>
+  <p:clrMapOvr>
+    <a:masterClrMapping/>
+  </p:clrMapOvr>
+</p:sld>
+</file>
+
+<file path=ppt/slides/slide21.xml><?xml version="1.0" encoding="utf-8"?>
+<p:sld xmlns:a="http://schemas.openxmlformats.org/drawingml/2006/main" xmlns:r="http://schemas.openxmlformats.org/officeDocument/2006/relationships" xmlns:p="http://schemas.openxmlformats.org/presentationml/2006/main">
+  <p:cSld>
+    <p:spTree>
+      <p:nvGrpSpPr>
+        <p:cNvPr id="1" name=""/>
+        <p:cNvGrpSpPr/>
+        <p:nvPr/>
+      </p:nvGrpSpPr>
+      <p:grpSpPr>
+        <a:xfrm>
+          <a:off x="0" y="0"/>
+          <a:ext cx="0" cy="0"/>
+          <a:chOff x="0" y="0"/>
+          <a:chExt cx="0" cy="0"/>
+        </a:xfrm>
+      </p:grpSpPr>
+      <p:sp>
+        <p:nvSpPr>
+          <p:cNvPr id="83" name="Retângulo 82"/>
+          <p:cNvSpPr/>
+          <p:nvPr/>
+        </p:nvSpPr>
+        <p:spPr>
+          <a:xfrm>
+            <a:off x="0" y="0"/>
+            <a:ext cx="4200256" cy="7920038"/>
+          </a:xfrm>
+          <a:prstGeom prst="rect">
+            <a:avLst/>
+          </a:prstGeom>
+          <a:solidFill>
+            <a:srgbClr val="FDEBC7"/>
+          </a:solidFill>
+          <a:ln>
+            <a:noFill/>
+          </a:ln>
+          <a:effectLst/>
+        </p:spPr>
+        <p:style>
+          <a:lnRef idx="2">
+            <a:schemeClr val="accent1">
+              <a:shade val="50000"/>
+            </a:schemeClr>
+          </a:lnRef>
+          <a:fillRef idx="1">
+            <a:schemeClr val="accent1"/>
+          </a:fillRef>
+          <a:effectRef idx="0">
+            <a:schemeClr val="accent1"/>
+          </a:effectRef>
+          <a:fontRef idx="minor">
+            <a:schemeClr val="lt1"/>
+          </a:fontRef>
+        </p:style>
+        <p:txBody>
+          <a:bodyPr rtlCol="0" anchor="ctr"/>
+          <a:lstStyle/>
+          <a:p>
+            <a:pPr algn="ctr"/>
+            <a:endParaRPr lang="pt-BR"/>
+          </a:p>
+        </p:txBody>
+      </p:sp>
+      <p:sp>
+        <p:nvSpPr>
+          <p:cNvPr id="5" name="CaixaDeTexto 4"/>
+          <p:cNvSpPr txBox="1"/>
+          <p:nvPr/>
+        </p:nvSpPr>
+        <p:spPr>
+          <a:xfrm>
+            <a:off x="135336" y="1529947"/>
+            <a:ext cx="3929583" cy="5461495"/>
+          </a:xfrm>
+          <a:prstGeom prst="rect">
+            <a:avLst/>
+          </a:prstGeom>
+          <a:noFill/>
+        </p:spPr>
+        <p:txBody>
+          <a:bodyPr wrap="square" rtlCol="0">
+            <a:spAutoFit/>
+          </a:bodyPr>
+          <a:lstStyle/>
+          <a:p>
+            <a:r>
+              <a:rPr lang="pt-BR" sz="1600" b="1" dirty="0">
+                <a:latin typeface="Bahnschrift SemiBold" panose="020B0502040204020203" pitchFamily="34" charset="0"/>
+              </a:rPr>
+              <a:t>Pré-requisito: </a:t>
+            </a:r>
+            <a:r>
+              <a:rPr lang="pt-BR" sz="1400" dirty="0"/>
+              <a:t>Ter executado o caso de uso </a:t>
+            </a:r>
+            <a:r>
+              <a:rPr lang="pt-BR" sz="1400" i="1" dirty="0"/>
+              <a:t>Logar</a:t>
+            </a:r>
+            <a:r>
+              <a:rPr lang="pt-BR" sz="1400" dirty="0"/>
+              <a:t>.</a:t>
+            </a:r>
+          </a:p>
+          <a:p>
+            <a:r>
+              <a:rPr lang="pt-BR" sz="1600" b="1" dirty="0">
+                <a:latin typeface="Bahnschrift SemiBold" panose="020B0502040204020203" pitchFamily="34" charset="0"/>
+              </a:rPr>
+              <a:t>Atores: </a:t>
+            </a:r>
+            <a:r>
+              <a:rPr lang="pt-BR" sz="1400" dirty="0"/>
+              <a:t>Professor </a:t>
+            </a:r>
+          </a:p>
+          <a:p>
+            <a:endParaRPr lang="pt-BR" sz="1400" dirty="0"/>
+          </a:p>
+          <a:p>
+            <a:r>
+              <a:rPr lang="pt-BR" sz="1600" b="1" dirty="0">
+                <a:latin typeface="Bahnschrift SemiBold" panose="020B0502040204020203" pitchFamily="34" charset="0"/>
+              </a:rPr>
+              <a:t>Fluxo principal</a:t>
+            </a:r>
+          </a:p>
+          <a:p>
+            <a:pPr marL="342900" lvl="0" indent="-342900">
+              <a:buFont typeface="+mj-lt"/>
+              <a:buAutoNum type="arabicPeriod"/>
+            </a:pPr>
+            <a:r>
+              <a:rPr lang="pt-BR" sz="1400" dirty="0"/>
+              <a:t>Na tela “Home”, Professor clica no botão “Adicionar pergunta”</a:t>
+            </a:r>
+          </a:p>
+          <a:p>
+            <a:pPr marL="342900" lvl="0" indent="-342900">
+              <a:buFont typeface="+mj-lt"/>
+              <a:buAutoNum type="arabicPeriod"/>
+            </a:pPr>
+            <a:r>
+              <a:rPr lang="pt-BR" sz="1400" dirty="0"/>
+              <a:t>Sistema exibe janela “Cadastro de pergunta”</a:t>
+            </a:r>
+          </a:p>
+          <a:p>
+            <a:pPr marL="342900" lvl="0" indent="-342900">
+              <a:buFont typeface="+mj-lt"/>
+              <a:buAutoNum type="arabicPeriod"/>
+            </a:pPr>
+            <a:r>
+              <a:rPr lang="pt-BR" sz="1400" dirty="0"/>
+              <a:t>Professor preenche os campos: “Pergunta”, “Alternativa 1”, “Alternativa 2” e “Alternativa 3”. Após isso, clica no botão “Salvar”. </a:t>
+            </a:r>
+          </a:p>
+          <a:p>
+            <a:pPr marL="342900" lvl="0" indent="-342900">
+              <a:buFont typeface="+mj-lt"/>
+              <a:buAutoNum type="arabicPeriod"/>
+            </a:pPr>
+            <a:r>
+              <a:rPr lang="pt-BR" sz="1400" dirty="0"/>
+              <a:t>Sistema valida cadastro de pergunta. Salva pergunta e exibe mensagem de Sucesso.</a:t>
+            </a:r>
+          </a:p>
+          <a:p>
+            <a:pPr marL="342900" lvl="0" indent="-342900">
+              <a:buFont typeface="+mj-lt"/>
+              <a:buAutoNum type="arabicPeriod"/>
+            </a:pPr>
+            <a:r>
+              <a:rPr lang="pt-BR" sz="1400" dirty="0"/>
+              <a:t>Caso de uso finalizado</a:t>
+            </a:r>
+          </a:p>
+          <a:p>
+            <a:pPr lvl="0"/>
+            <a:endParaRPr lang="pt-BR" sz="1400" dirty="0"/>
+          </a:p>
+          <a:p>
+            <a:r>
+              <a:rPr lang="pt-BR" sz="1600" b="1" dirty="0">
+                <a:latin typeface="Bahnschrift SemiBold" panose="020B0502040204020203" pitchFamily="34" charset="0"/>
+              </a:rPr>
+              <a:t>Fluxo alternativo 1</a:t>
+            </a:r>
+          </a:p>
+          <a:p>
+            <a:pPr marL="342900" lvl="0" indent="-342900">
+              <a:buFont typeface="+mj-lt"/>
+              <a:buAutoNum type="arabicPeriod"/>
+            </a:pPr>
+            <a:r>
+              <a:rPr lang="pt-BR" sz="1400" dirty="0"/>
+              <a:t>A partir do passo 4 o sistema detectou erro (dados inválidos ou campos em branco) em “Pergunta”, “Alternativa 1”, “Alternativa 2” ou “Alternativa 3”.</a:t>
+            </a:r>
+          </a:p>
+          <a:p>
+            <a:pPr marL="342900" lvl="0" indent="-342900">
+              <a:buFont typeface="+mj-lt"/>
+              <a:buAutoNum type="arabicPeriod"/>
+            </a:pPr>
+            <a:r>
+              <a:rPr lang="pt-BR" sz="1400" dirty="0"/>
+              <a:t>Sistema exibe mensagem de erro.</a:t>
+            </a:r>
+          </a:p>
+          <a:p>
+            <a:pPr marL="342900" lvl="0" indent="-342900">
+              <a:buFont typeface="+mj-lt"/>
+              <a:buAutoNum type="arabicPeriod"/>
+            </a:pPr>
+            <a:r>
+              <a:rPr lang="pt-BR" sz="1400" dirty="0"/>
+              <a:t>Retorna ao passo 6 do fluxo principal.</a:t>
+            </a:r>
+          </a:p>
+          <a:p>
+            <a:endParaRPr lang="pt-BR" sz="1400" dirty="0"/>
+          </a:p>
+          <a:p>
+            <a:endParaRPr lang="pt-BR" sz="1890" dirty="0"/>
+          </a:p>
+        </p:txBody>
+      </p:sp>
+      <p:sp>
+        <p:nvSpPr>
+          <p:cNvPr id="2" name="CaixaDeTexto 1"/>
+          <p:cNvSpPr txBox="1"/>
+          <p:nvPr/>
+        </p:nvSpPr>
+        <p:spPr>
+          <a:xfrm>
+            <a:off x="301300" y="349475"/>
+            <a:ext cx="3838308" cy="830997"/>
+          </a:xfrm>
+          <a:prstGeom prst="rect">
+            <a:avLst/>
+          </a:prstGeom>
+          <a:noFill/>
+        </p:spPr>
+        <p:txBody>
+          <a:bodyPr wrap="square" rtlCol="0">
+            <a:spAutoFit/>
+          </a:bodyPr>
+          <a:lstStyle/>
+          <a:p>
+            <a:r>
+              <a:rPr lang="pt-BR" sz="2400" b="1" dirty="0">
+                <a:latin typeface="Bahnschrift SemiBold" panose="020B0502040204020203" pitchFamily="34" charset="0"/>
+              </a:rPr>
+              <a:t>CADASTRA PERGUNTA PARA O QUIZ</a:t>
+            </a:r>
+          </a:p>
+        </p:txBody>
+      </p:sp>
+      <p:sp>
+        <p:nvSpPr>
+          <p:cNvPr id="85" name="Retângulo 84"/>
+          <p:cNvSpPr/>
+          <p:nvPr/>
+        </p:nvSpPr>
+        <p:spPr>
+          <a:xfrm>
+            <a:off x="4206976" y="0"/>
+            <a:ext cx="82647" cy="7920038"/>
+          </a:xfrm>
+          <a:prstGeom prst="rect">
+            <a:avLst/>
+          </a:prstGeom>
+          <a:solidFill>
+            <a:srgbClr val="82B457"/>
+          </a:solidFill>
+          <a:ln>
+            <a:noFill/>
+          </a:ln>
+          <a:effectLst/>
+        </p:spPr>
+        <p:style>
+          <a:lnRef idx="2">
+            <a:schemeClr val="accent1">
+              <a:shade val="50000"/>
+            </a:schemeClr>
+          </a:lnRef>
+          <a:fillRef idx="1">
+            <a:schemeClr val="accent1"/>
+          </a:fillRef>
+          <a:effectRef idx="0">
+            <a:schemeClr val="accent1"/>
+          </a:effectRef>
+          <a:fontRef idx="minor">
+            <a:schemeClr val="lt1"/>
+          </a:fontRef>
+        </p:style>
+        <p:txBody>
+          <a:bodyPr rtlCol="0" anchor="ctr"/>
+          <a:lstStyle/>
+          <a:p>
+            <a:pPr algn="ctr"/>
+            <a:endParaRPr lang="pt-BR"/>
+          </a:p>
+        </p:txBody>
+      </p:sp>
+      <p:sp>
+        <p:nvSpPr>
+          <p:cNvPr id="84" name="CaixaDeTexto 83"/>
+          <p:cNvSpPr txBox="1"/>
+          <p:nvPr/>
+        </p:nvSpPr>
+        <p:spPr>
+          <a:xfrm>
+            <a:off x="10311695" y="349499"/>
+            <a:ext cx="3838308" cy="276999"/>
+          </a:xfrm>
+          <a:prstGeom prst="rect">
+            <a:avLst/>
+          </a:prstGeom>
+          <a:noFill/>
+        </p:spPr>
+        <p:txBody>
+          <a:bodyPr wrap="square" rtlCol="0">
+            <a:spAutoFit/>
+          </a:bodyPr>
+          <a:lstStyle/>
+          <a:p>
+            <a:r>
+              <a:rPr lang="pt-BR" sz="1200" b="1" dirty="0">
+                <a:latin typeface="Bahnschrift SemiBold" panose="020B0502040204020203" pitchFamily="34" charset="0"/>
+              </a:rPr>
+              <a:t>DIAGRAMA DE SEQUÊNCIA</a:t>
+            </a:r>
+          </a:p>
+        </p:txBody>
+      </p:sp>
+      <p:sp>
+        <p:nvSpPr>
+          <p:cNvPr id="87" name="CaixaDeTexto 86"/>
+          <p:cNvSpPr txBox="1"/>
+          <p:nvPr/>
+        </p:nvSpPr>
+        <p:spPr>
+          <a:xfrm>
+            <a:off x="15922087" y="403613"/>
+            <a:ext cx="3838308" cy="276999"/>
+          </a:xfrm>
+          <a:prstGeom prst="rect">
+            <a:avLst/>
+          </a:prstGeom>
+          <a:noFill/>
+        </p:spPr>
+        <p:txBody>
+          <a:bodyPr wrap="square" rtlCol="0">
+            <a:spAutoFit/>
+          </a:bodyPr>
+          <a:lstStyle/>
+          <a:p>
+            <a:r>
+              <a:rPr lang="pt-BR" sz="1200" b="1" dirty="0">
+                <a:latin typeface="Bahnschrift SemiBold" panose="020B0502040204020203" pitchFamily="34" charset="0"/>
+              </a:rPr>
+              <a:t>DIAGRAMA DE CLASSE</a:t>
+            </a:r>
+          </a:p>
+        </p:txBody>
+      </p:sp>
+      <p:sp>
+        <p:nvSpPr>
+          <p:cNvPr id="17" name="CaixaDeTexto 16"/>
+          <p:cNvSpPr txBox="1"/>
+          <p:nvPr/>
+        </p:nvSpPr>
+        <p:spPr>
+          <a:xfrm>
+            <a:off x="13686368" y="5280402"/>
+            <a:ext cx="3838308" cy="276999"/>
+          </a:xfrm>
+          <a:prstGeom prst="rect">
+            <a:avLst/>
+          </a:prstGeom>
+          <a:noFill/>
+        </p:spPr>
+        <p:txBody>
+          <a:bodyPr wrap="square" rtlCol="0">
+            <a:spAutoFit/>
+          </a:bodyPr>
+          <a:lstStyle/>
+          <a:p>
+            <a:r>
+              <a:rPr lang="pt-BR" sz="1200" b="1" dirty="0">
+                <a:latin typeface="Bahnschrift SemiBold" panose="020B0502040204020203" pitchFamily="34" charset="0"/>
+              </a:rPr>
+              <a:t>DIAGRAMA DE ROBUSTEZ</a:t>
+            </a:r>
+          </a:p>
+        </p:txBody>
+      </p:sp>
+      <p:sp>
+        <p:nvSpPr>
+          <p:cNvPr id="14" name="CaixaDeTexto 13"/>
+          <p:cNvSpPr txBox="1"/>
+          <p:nvPr/>
+        </p:nvSpPr>
+        <p:spPr>
+          <a:xfrm>
+            <a:off x="5381505" y="403612"/>
+            <a:ext cx="3838308" cy="276999"/>
+          </a:xfrm>
+          <a:prstGeom prst="rect">
+            <a:avLst/>
+          </a:prstGeom>
+          <a:noFill/>
+        </p:spPr>
+        <p:txBody>
+          <a:bodyPr wrap="square" rtlCol="0">
+            <a:spAutoFit/>
+          </a:bodyPr>
+          <a:lstStyle/>
+          <a:p>
+            <a:r>
+              <a:rPr lang="pt-BR" sz="1200" b="1" dirty="0">
+                <a:latin typeface="Bahnschrift SemiBold" panose="020B0502040204020203" pitchFamily="34" charset="0"/>
+              </a:rPr>
+              <a:t>LOJA</a:t>
+            </a:r>
+          </a:p>
+        </p:txBody>
+      </p:sp>
+      <p:pic>
+        <p:nvPicPr>
+          <p:cNvPr id="12" name="Imagem 11"/>
+          <p:cNvPicPr>
+            <a:picLocks noChangeAspect="1"/>
+          </p:cNvPicPr>
+          <p:nvPr/>
+        </p:nvPicPr>
+        <p:blipFill>
+          <a:blip r:embed="rId2" cstate="print">
+            <a:extLst>
+              <a:ext uri="{28A0092B-C50C-407E-A947-70E740481C1C}">
+                <a14:useLocalDpi xmlns:a14="http://schemas.microsoft.com/office/drawing/2010/main" val="0"/>
+              </a:ext>
+            </a:extLst>
+          </a:blip>
+          <a:stretch>
+            <a:fillRect/>
+          </a:stretch>
+        </p:blipFill>
+        <p:spPr>
+          <a:xfrm>
+            <a:off x="4495407" y="680611"/>
+            <a:ext cx="3413645" cy="2063472"/>
+          </a:xfrm>
+          <a:prstGeom prst="rect">
+            <a:avLst/>
+          </a:prstGeom>
+          <a:effectLst>
+            <a:outerShdw blurRad="50800" dist="38100" dir="2700000" algn="tl" rotWithShape="0">
+              <a:prstClr val="black">
+                <a:alpha val="40000"/>
+              </a:prstClr>
+            </a:outerShdw>
+          </a:effectLst>
+        </p:spPr>
+      </p:pic>
+      <p:pic>
+        <p:nvPicPr>
+          <p:cNvPr id="3" name="Imagem 2"/>
+          <p:cNvPicPr>
+            <a:picLocks noChangeAspect="1"/>
+          </p:cNvPicPr>
+          <p:nvPr/>
+        </p:nvPicPr>
+        <p:blipFill rotWithShape="1">
+          <a:blip r:embed="rId3" cstate="print">
+            <a:extLst>
+              <a:ext uri="{28A0092B-C50C-407E-A947-70E740481C1C}">
+                <a14:useLocalDpi xmlns:a14="http://schemas.microsoft.com/office/drawing/2010/main" val="0"/>
+              </a:ext>
+            </a:extLst>
+          </a:blip>
+          <a:srcRect l="16995" t="11394" r="26434" b="1428"/>
+          <a:stretch/>
+        </p:blipFill>
+        <p:spPr>
+          <a:xfrm>
+            <a:off x="4593071" y="3239976"/>
+            <a:ext cx="2482883" cy="2352206"/>
+          </a:xfrm>
+          <a:prstGeom prst="rect">
+            <a:avLst/>
+          </a:prstGeom>
+          <a:effectLst>
+            <a:outerShdw blurRad="50800" dist="38100" dir="2700000" algn="tl" rotWithShape="0">
+              <a:prstClr val="black">
+                <a:alpha val="40000"/>
+              </a:prstClr>
+            </a:outerShdw>
+          </a:effectLst>
+        </p:spPr>
+      </p:pic>
+      <p:sp>
+        <p:nvSpPr>
+          <p:cNvPr id="15" name="CaixaDeTexto 14"/>
+          <p:cNvSpPr txBox="1"/>
+          <p:nvPr/>
+        </p:nvSpPr>
+        <p:spPr>
+          <a:xfrm>
+            <a:off x="5381505" y="2882582"/>
+            <a:ext cx="3838308" cy="276999"/>
+          </a:xfrm>
+          <a:prstGeom prst="rect">
+            <a:avLst/>
+          </a:prstGeom>
+          <a:noFill/>
+        </p:spPr>
+        <p:txBody>
+          <a:bodyPr wrap="square" rtlCol="0">
+            <a:spAutoFit/>
+          </a:bodyPr>
+          <a:lstStyle/>
+          <a:p>
+            <a:r>
+              <a:rPr lang="pt-BR" sz="1200" b="1" dirty="0">
+                <a:latin typeface="Bahnschrift SemiBold" panose="020B0502040204020203" pitchFamily="34" charset="0"/>
+              </a:rPr>
+              <a:t>LOJA</a:t>
+            </a:r>
+          </a:p>
+        </p:txBody>
+      </p:sp>
+      <p:pic>
+        <p:nvPicPr>
+          <p:cNvPr id="8" name="Imagem 7"/>
+          <p:cNvPicPr>
+            <a:picLocks noChangeAspect="1"/>
+          </p:cNvPicPr>
+          <p:nvPr/>
+        </p:nvPicPr>
+        <p:blipFill>
+          <a:blip r:embed="rId4">
+            <a:extLst>
+              <a:ext uri="{28A0092B-C50C-407E-A947-70E740481C1C}">
+                <a14:useLocalDpi xmlns:a14="http://schemas.microsoft.com/office/drawing/2010/main" val="0"/>
+              </a:ext>
+            </a:extLst>
+          </a:blip>
+          <a:stretch>
+            <a:fillRect/>
+          </a:stretch>
+        </p:blipFill>
+        <p:spPr>
+          <a:xfrm>
+            <a:off x="10446519" y="5592182"/>
+            <a:ext cx="8467111" cy="2343063"/>
+          </a:xfrm>
+          <a:prstGeom prst="rect">
+            <a:avLst/>
+          </a:prstGeom>
+        </p:spPr>
+      </p:pic>
+      <p:pic>
+        <p:nvPicPr>
+          <p:cNvPr id="6" name="Imagem 5">
+            <a:extLst>
+              <a:ext uri="{FF2B5EF4-FFF2-40B4-BE49-F238E27FC236}">
+                <a16:creationId xmlns:a16="http://schemas.microsoft.com/office/drawing/2014/main" xmlns="" id="{2D5029BD-C27B-44E0-823C-F119A1E7FA94}"/>
+              </a:ext>
+            </a:extLst>
+          </p:cNvPr>
+          <p:cNvPicPr>
+            <a:picLocks noChangeAspect="1"/>
+          </p:cNvPicPr>
+          <p:nvPr/>
+        </p:nvPicPr>
+        <p:blipFill>
+          <a:blip r:embed="rId5">
+            <a:extLst>
+              <a:ext uri="{28A0092B-C50C-407E-A947-70E740481C1C}">
+                <a14:useLocalDpi xmlns:a14="http://schemas.microsoft.com/office/drawing/2010/main" val="0"/>
+              </a:ext>
+            </a:extLst>
+          </a:blip>
+          <a:stretch>
+            <a:fillRect/>
+          </a:stretch>
+        </p:blipFill>
+        <p:spPr>
+          <a:xfrm>
+            <a:off x="8114836" y="631355"/>
+            <a:ext cx="5088507" cy="4926046"/>
+          </a:xfrm>
+          <a:prstGeom prst="rect">
+            <a:avLst/>
+          </a:prstGeom>
+        </p:spPr>
+      </p:pic>
+      <p:pic>
+        <p:nvPicPr>
+          <p:cNvPr id="9" name="Imagem 8">
+            <a:extLst>
+              <a:ext uri="{FF2B5EF4-FFF2-40B4-BE49-F238E27FC236}">
+                <a16:creationId xmlns:a16="http://schemas.microsoft.com/office/drawing/2014/main" xmlns="" id="{7E941A6F-687A-41BF-8CE0-8190F3D268B8}"/>
+              </a:ext>
+            </a:extLst>
+          </p:cNvPr>
+          <p:cNvPicPr>
+            <a:picLocks noChangeAspect="1"/>
+          </p:cNvPicPr>
+          <p:nvPr/>
+        </p:nvPicPr>
+        <p:blipFill>
+          <a:blip r:embed="rId6">
+            <a:extLst>
+              <a:ext uri="{28A0092B-C50C-407E-A947-70E740481C1C}">
+                <a14:useLocalDpi xmlns:a14="http://schemas.microsoft.com/office/drawing/2010/main" val="0"/>
+              </a:ext>
+            </a:extLst>
+          </a:blip>
+          <a:stretch>
+            <a:fillRect/>
+          </a:stretch>
+        </p:blipFill>
+        <p:spPr>
+          <a:xfrm>
+            <a:off x="14242225" y="715393"/>
+            <a:ext cx="4843124" cy="4395205"/>
+          </a:xfrm>
+          <a:prstGeom prst="rect">
+            <a:avLst/>
+          </a:prstGeom>
+        </p:spPr>
+      </p:pic>
+    </p:spTree>
+    <p:extLst>
+      <p:ext uri="{BB962C8B-B14F-4D97-AF65-F5344CB8AC3E}">
+        <p14:creationId xmlns:p14="http://schemas.microsoft.com/office/powerpoint/2010/main" val="2844365666"/>
+      </p:ext>
+    </p:extLst>
+  </p:cSld>
+  <p:clrMapOvr>
+    <a:masterClrMapping/>
+  </p:clrMapOvr>
+</p:sld>
+</file>
+
+<file path=ppt/slides/slide22.xml><?xml version="1.0" encoding="utf-8"?>
+<p:sld xmlns:a="http://schemas.openxmlformats.org/drawingml/2006/main" xmlns:r="http://schemas.openxmlformats.org/officeDocument/2006/relationships" xmlns:p="http://schemas.openxmlformats.org/presentationml/2006/main">
+  <p:cSld>
+    <p:spTree>
+      <p:nvGrpSpPr>
+        <p:cNvPr id="1" name=""/>
+        <p:cNvGrpSpPr/>
+        <p:nvPr/>
+      </p:nvGrpSpPr>
+      <p:grpSpPr>
+        <a:xfrm>
+          <a:off x="0" y="0"/>
+          <a:ext cx="0" cy="0"/>
+          <a:chOff x="0" y="0"/>
+          <a:chExt cx="0" cy="0"/>
+        </a:xfrm>
+      </p:grpSpPr>
+      <p:sp>
+        <p:nvSpPr>
+          <p:cNvPr id="83" name="Retângulo 82"/>
+          <p:cNvSpPr/>
+          <p:nvPr/>
+        </p:nvSpPr>
+        <p:spPr>
+          <a:xfrm>
+            <a:off x="0" y="0"/>
+            <a:ext cx="4200256" cy="7920038"/>
+          </a:xfrm>
+          <a:prstGeom prst="rect">
+            <a:avLst/>
+          </a:prstGeom>
+          <a:solidFill>
+            <a:srgbClr val="FDEBC7"/>
+          </a:solidFill>
+          <a:ln>
+            <a:noFill/>
+          </a:ln>
+          <a:effectLst/>
+        </p:spPr>
+        <p:style>
+          <a:lnRef idx="2">
+            <a:schemeClr val="accent1">
+              <a:shade val="50000"/>
+            </a:schemeClr>
+          </a:lnRef>
+          <a:fillRef idx="1">
+            <a:schemeClr val="accent1"/>
+          </a:fillRef>
+          <a:effectRef idx="0">
+            <a:schemeClr val="accent1"/>
+          </a:effectRef>
+          <a:fontRef idx="minor">
+            <a:schemeClr val="lt1"/>
+          </a:fontRef>
+        </p:style>
+        <p:txBody>
+          <a:bodyPr rtlCol="0" anchor="ctr"/>
+          <a:lstStyle/>
+          <a:p>
+            <a:pPr algn="ctr"/>
+            <a:endParaRPr lang="pt-BR"/>
+          </a:p>
+        </p:txBody>
+      </p:sp>
+      <p:sp>
+        <p:nvSpPr>
+          <p:cNvPr id="5" name="CaixaDeTexto 4"/>
+          <p:cNvSpPr txBox="1"/>
+          <p:nvPr/>
+        </p:nvSpPr>
+        <p:spPr>
+          <a:xfrm>
+            <a:off x="135336" y="1529947"/>
+            <a:ext cx="3929583" cy="2199064"/>
+          </a:xfrm>
+          <a:prstGeom prst="rect">
+            <a:avLst/>
+          </a:prstGeom>
+          <a:noFill/>
+        </p:spPr>
+        <p:txBody>
+          <a:bodyPr wrap="square" rtlCol="0">
+            <a:spAutoFit/>
+          </a:bodyPr>
+          <a:lstStyle/>
+          <a:p>
+            <a:r>
+              <a:rPr lang="pt-BR" sz="1600" b="1" dirty="0">
+                <a:latin typeface="Bahnschrift SemiBold" panose="020B0502040204020203" pitchFamily="34" charset="0"/>
+              </a:rPr>
+              <a:t>Pré-requisito: </a:t>
+            </a:r>
+            <a:r>
+              <a:rPr lang="pt-BR" sz="1400" dirty="0"/>
+              <a:t>Ter executado o caso de uso </a:t>
+            </a:r>
+            <a:r>
+              <a:rPr lang="pt-BR" sz="1400" i="1" dirty="0"/>
+              <a:t>Logar</a:t>
+            </a:r>
+            <a:r>
+              <a:rPr lang="pt-BR" sz="1400" dirty="0"/>
+              <a:t>.</a:t>
+            </a:r>
+          </a:p>
+          <a:p>
+            <a:r>
+              <a:rPr lang="pt-BR" sz="1600" b="1" dirty="0">
+                <a:latin typeface="Bahnschrift SemiBold" panose="020B0502040204020203" pitchFamily="34" charset="0"/>
+              </a:rPr>
+              <a:t>Atores: </a:t>
+            </a:r>
+            <a:r>
+              <a:rPr lang="pt-BR" sz="1400" dirty="0"/>
+              <a:t>Aluno </a:t>
+            </a:r>
+          </a:p>
+          <a:p>
+            <a:endParaRPr lang="pt-BR" sz="1400" dirty="0"/>
+          </a:p>
+          <a:p>
+            <a:r>
+              <a:rPr lang="pt-BR" sz="1600" b="1" dirty="0">
+                <a:latin typeface="Bahnschrift SemiBold" panose="020B0502040204020203" pitchFamily="34" charset="0"/>
+              </a:rPr>
+              <a:t>Fluxo principal</a:t>
+            </a:r>
+          </a:p>
+          <a:p>
+            <a:pPr marL="342900" lvl="0" indent="-342900">
+              <a:buFont typeface="+mj-lt"/>
+              <a:buAutoNum type="arabicPeriod"/>
+            </a:pPr>
+            <a:r>
+              <a:rPr lang="pt-BR" sz="1400" dirty="0"/>
+              <a:t>Na tela “Home”, Aluno clica no botão “Como Funciona?”</a:t>
+            </a:r>
+          </a:p>
+          <a:p>
+            <a:pPr marL="342900" lvl="0" indent="-342900">
+              <a:buFont typeface="+mj-lt"/>
+              <a:buAutoNum type="arabicPeriod"/>
+            </a:pPr>
+            <a:r>
+              <a:rPr lang="pt-BR" sz="1400" dirty="0"/>
+              <a:t>Sistema abre a tela “Ajuda”</a:t>
+            </a:r>
+          </a:p>
+          <a:p>
+            <a:endParaRPr lang="pt-BR" sz="1890" dirty="0"/>
+          </a:p>
+        </p:txBody>
+      </p:sp>
+      <p:sp>
+        <p:nvSpPr>
+          <p:cNvPr id="2" name="CaixaDeTexto 1"/>
+          <p:cNvSpPr txBox="1"/>
+          <p:nvPr/>
+        </p:nvSpPr>
+        <p:spPr>
+          <a:xfrm>
+            <a:off x="301300" y="349475"/>
+            <a:ext cx="3838308" cy="830997"/>
+          </a:xfrm>
+          <a:prstGeom prst="rect">
+            <a:avLst/>
+          </a:prstGeom>
+          <a:noFill/>
+        </p:spPr>
+        <p:txBody>
+          <a:bodyPr wrap="square" rtlCol="0">
+            <a:spAutoFit/>
+          </a:bodyPr>
+          <a:lstStyle/>
+          <a:p>
+            <a:r>
+              <a:rPr lang="pt-BR" sz="2400" b="1" dirty="0">
+                <a:latin typeface="Bahnschrift SemiBold" panose="020B0502040204020203" pitchFamily="34" charset="0"/>
+              </a:rPr>
+              <a:t>ACESSAR COMO FUNCIONA</a:t>
+            </a:r>
+          </a:p>
+        </p:txBody>
+      </p:sp>
+      <p:sp>
+        <p:nvSpPr>
+          <p:cNvPr id="85" name="Retângulo 84"/>
+          <p:cNvSpPr/>
+          <p:nvPr/>
+        </p:nvSpPr>
+        <p:spPr>
+          <a:xfrm>
+            <a:off x="4206976" y="0"/>
+            <a:ext cx="82647" cy="7920038"/>
+          </a:xfrm>
+          <a:prstGeom prst="rect">
+            <a:avLst/>
+          </a:prstGeom>
+          <a:solidFill>
+            <a:srgbClr val="82B457"/>
+          </a:solidFill>
+          <a:ln>
+            <a:noFill/>
+          </a:ln>
+          <a:effectLst/>
+        </p:spPr>
+        <p:style>
+          <a:lnRef idx="2">
+            <a:schemeClr val="accent1">
+              <a:shade val="50000"/>
+            </a:schemeClr>
+          </a:lnRef>
+          <a:fillRef idx="1">
+            <a:schemeClr val="accent1"/>
+          </a:fillRef>
+          <a:effectRef idx="0">
+            <a:schemeClr val="accent1"/>
+          </a:effectRef>
+          <a:fontRef idx="minor">
+            <a:schemeClr val="lt1"/>
+          </a:fontRef>
+        </p:style>
+        <p:txBody>
+          <a:bodyPr rtlCol="0" anchor="ctr"/>
+          <a:lstStyle/>
+          <a:p>
+            <a:pPr algn="ctr"/>
+            <a:endParaRPr lang="pt-BR"/>
+          </a:p>
+        </p:txBody>
+      </p:sp>
+      <p:sp>
+        <p:nvSpPr>
+          <p:cNvPr id="84" name="CaixaDeTexto 83"/>
+          <p:cNvSpPr txBox="1"/>
+          <p:nvPr/>
+        </p:nvSpPr>
+        <p:spPr>
+          <a:xfrm>
+            <a:off x="10311695" y="349499"/>
+            <a:ext cx="3838308" cy="276999"/>
+          </a:xfrm>
+          <a:prstGeom prst="rect">
+            <a:avLst/>
+          </a:prstGeom>
+          <a:noFill/>
+        </p:spPr>
+        <p:txBody>
+          <a:bodyPr wrap="square" rtlCol="0">
+            <a:spAutoFit/>
+          </a:bodyPr>
+          <a:lstStyle/>
+          <a:p>
+            <a:r>
+              <a:rPr lang="pt-BR" sz="1200" b="1" dirty="0">
+                <a:latin typeface="Bahnschrift SemiBold" panose="020B0502040204020203" pitchFamily="34" charset="0"/>
+              </a:rPr>
+              <a:t>DIAGRAMA DE SEQUÊNCIA</a:t>
+            </a:r>
+          </a:p>
+        </p:txBody>
+      </p:sp>
+      <p:sp>
+        <p:nvSpPr>
+          <p:cNvPr id="87" name="CaixaDeTexto 86"/>
+          <p:cNvSpPr txBox="1"/>
+          <p:nvPr/>
+        </p:nvSpPr>
+        <p:spPr>
+          <a:xfrm>
+            <a:off x="15922087" y="403613"/>
+            <a:ext cx="3838308" cy="276999"/>
+          </a:xfrm>
+          <a:prstGeom prst="rect">
+            <a:avLst/>
+          </a:prstGeom>
+          <a:noFill/>
+        </p:spPr>
+        <p:txBody>
+          <a:bodyPr wrap="square" rtlCol="0">
+            <a:spAutoFit/>
+          </a:bodyPr>
+          <a:lstStyle/>
+          <a:p>
+            <a:r>
+              <a:rPr lang="pt-BR" sz="1200" b="1" dirty="0">
+                <a:latin typeface="Bahnschrift SemiBold" panose="020B0502040204020203" pitchFamily="34" charset="0"/>
+              </a:rPr>
+              <a:t>DIAGRAMA DE CLASSE</a:t>
+            </a:r>
+          </a:p>
+        </p:txBody>
+      </p:sp>
+      <p:sp>
+        <p:nvSpPr>
+          <p:cNvPr id="17" name="CaixaDeTexto 16"/>
+          <p:cNvSpPr txBox="1"/>
+          <p:nvPr/>
+        </p:nvSpPr>
+        <p:spPr>
+          <a:xfrm>
+            <a:off x="15922087" y="6142090"/>
+            <a:ext cx="3838308" cy="276999"/>
+          </a:xfrm>
+          <a:prstGeom prst="rect">
+            <a:avLst/>
+          </a:prstGeom>
+          <a:noFill/>
+        </p:spPr>
+        <p:txBody>
+          <a:bodyPr wrap="square" rtlCol="0">
+            <a:spAutoFit/>
+          </a:bodyPr>
+          <a:lstStyle/>
+          <a:p>
+            <a:r>
+              <a:rPr lang="pt-BR" sz="1200" b="1" dirty="0">
+                <a:latin typeface="Bahnschrift SemiBold" panose="020B0502040204020203" pitchFamily="34" charset="0"/>
+              </a:rPr>
+              <a:t>DIAGRAMA DE ROBUSTEZ</a:t>
+            </a:r>
+          </a:p>
+        </p:txBody>
+      </p:sp>
+      <p:sp>
+        <p:nvSpPr>
+          <p:cNvPr id="14" name="CaixaDeTexto 13"/>
+          <p:cNvSpPr txBox="1"/>
+          <p:nvPr/>
+        </p:nvSpPr>
+        <p:spPr>
+          <a:xfrm>
+            <a:off x="5381505" y="403612"/>
+            <a:ext cx="3838308" cy="276999"/>
+          </a:xfrm>
+          <a:prstGeom prst="rect">
+            <a:avLst/>
+          </a:prstGeom>
+          <a:noFill/>
+        </p:spPr>
+        <p:txBody>
+          <a:bodyPr wrap="square" rtlCol="0">
+            <a:spAutoFit/>
+          </a:bodyPr>
+          <a:lstStyle/>
+          <a:p>
+            <a:r>
+              <a:rPr lang="pt-BR" sz="1200" b="1" dirty="0">
+                <a:latin typeface="Bahnschrift SemiBold" panose="020B0502040204020203" pitchFamily="34" charset="0"/>
+              </a:rPr>
+              <a:t>AJUDA</a:t>
+            </a:r>
+          </a:p>
+        </p:txBody>
+      </p:sp>
+      <p:pic>
+        <p:nvPicPr>
+          <p:cNvPr id="4" name="Imagem 3"/>
+          <p:cNvPicPr>
+            <a:picLocks noChangeAspect="1"/>
+          </p:cNvPicPr>
+          <p:nvPr/>
+        </p:nvPicPr>
+        <p:blipFill>
+          <a:blip r:embed="rId2" cstate="print">
+            <a:extLst>
+              <a:ext uri="{28A0092B-C50C-407E-A947-70E740481C1C}">
+                <a14:useLocalDpi xmlns:a14="http://schemas.microsoft.com/office/drawing/2010/main" val="0"/>
+              </a:ext>
+            </a:extLst>
+          </a:blip>
+          <a:stretch>
+            <a:fillRect/>
+          </a:stretch>
+        </p:blipFill>
+        <p:spPr>
+          <a:xfrm>
+            <a:off x="4484014" y="680611"/>
+            <a:ext cx="3413645" cy="2071058"/>
+          </a:xfrm>
+          <a:prstGeom prst="rect">
+            <a:avLst/>
+          </a:prstGeom>
+          <a:effectLst>
+            <a:outerShdw blurRad="50800" dist="38100" dir="2700000" algn="tl" rotWithShape="0">
+              <a:prstClr val="black">
+                <a:alpha val="40000"/>
+              </a:prstClr>
+            </a:outerShdw>
+          </a:effectLst>
+        </p:spPr>
+      </p:pic>
+      <p:pic>
+        <p:nvPicPr>
+          <p:cNvPr id="6" name="Imagem 5"/>
+          <p:cNvPicPr>
+            <a:picLocks noChangeAspect="1"/>
+          </p:cNvPicPr>
+          <p:nvPr/>
+        </p:nvPicPr>
+        <p:blipFill rotWithShape="1">
+          <a:blip r:embed="rId3">
+            <a:extLst>
+              <a:ext uri="{28A0092B-C50C-407E-A947-70E740481C1C}">
+                <a14:useLocalDpi xmlns:a14="http://schemas.microsoft.com/office/drawing/2010/main" val="0"/>
+              </a:ext>
+            </a:extLst>
+          </a:blip>
+          <a:srcRect l="6938" t="31900" r="28254" b="45035"/>
+          <a:stretch/>
+        </p:blipFill>
+        <p:spPr>
+          <a:xfrm>
+            <a:off x="14977872" y="6419089"/>
+            <a:ext cx="4462272" cy="1201959"/>
+          </a:xfrm>
+          <a:prstGeom prst="rect">
+            <a:avLst/>
+          </a:prstGeom>
+        </p:spPr>
+      </p:pic>
+      <p:pic>
+        <p:nvPicPr>
+          <p:cNvPr id="7" name="Imagem 6">
+            <a:extLst>
+              <a:ext uri="{FF2B5EF4-FFF2-40B4-BE49-F238E27FC236}">
+                <a16:creationId xmlns:a16="http://schemas.microsoft.com/office/drawing/2014/main" xmlns="" id="{A624A659-8F1A-447A-9FC5-24BF39FBA8A5}"/>
+              </a:ext>
+            </a:extLst>
+          </p:cNvPr>
+          <p:cNvPicPr>
+            <a:picLocks noChangeAspect="1"/>
+          </p:cNvPicPr>
+          <p:nvPr/>
+        </p:nvPicPr>
+        <p:blipFill>
+          <a:blip r:embed="rId4">
+            <a:extLst>
+              <a:ext uri="{28A0092B-C50C-407E-A947-70E740481C1C}">
+                <a14:useLocalDpi xmlns:a14="http://schemas.microsoft.com/office/drawing/2010/main" val="0"/>
+              </a:ext>
+            </a:extLst>
+          </a:blip>
+          <a:stretch>
+            <a:fillRect/>
+          </a:stretch>
+        </p:blipFill>
+        <p:spPr>
+          <a:xfrm>
+            <a:off x="8227319" y="680611"/>
+            <a:ext cx="5734225" cy="3279408"/>
+          </a:xfrm>
+          <a:prstGeom prst="rect">
+            <a:avLst/>
+          </a:prstGeom>
+        </p:spPr>
+      </p:pic>
+      <p:pic>
+        <p:nvPicPr>
+          <p:cNvPr id="9" name="Imagem 8">
+            <a:extLst>
+              <a:ext uri="{FF2B5EF4-FFF2-40B4-BE49-F238E27FC236}">
+                <a16:creationId xmlns:a16="http://schemas.microsoft.com/office/drawing/2014/main" xmlns="" id="{ED4D3564-9C64-4D6F-99F0-1FAAD2EA4C0B}"/>
+              </a:ext>
+            </a:extLst>
+          </p:cNvPr>
+          <p:cNvPicPr>
+            <a:picLocks noChangeAspect="1"/>
+          </p:cNvPicPr>
+          <p:nvPr/>
+        </p:nvPicPr>
+        <p:blipFill>
+          <a:blip r:embed="rId5">
+            <a:extLst>
+              <a:ext uri="{28A0092B-C50C-407E-A947-70E740481C1C}">
+                <a14:useLocalDpi xmlns:a14="http://schemas.microsoft.com/office/drawing/2010/main" val="0"/>
+              </a:ext>
+            </a:extLst>
+          </a:blip>
+          <a:stretch>
+            <a:fillRect/>
+          </a:stretch>
+        </p:blipFill>
+        <p:spPr>
+          <a:xfrm>
+            <a:off x="14291205" y="680611"/>
+            <a:ext cx="5212932" cy="3279408"/>
+          </a:xfrm>
+          <a:prstGeom prst="rect">
+            <a:avLst/>
+          </a:prstGeom>
+        </p:spPr>
+      </p:pic>
+    </p:spTree>
+    <p:extLst>
+      <p:ext uri="{BB962C8B-B14F-4D97-AF65-F5344CB8AC3E}">
+        <p14:creationId xmlns:p14="http://schemas.microsoft.com/office/powerpoint/2010/main" val="272299884"/>
       </p:ext>
     </p:extLst>
   </p:cSld>
@@ -10414,7 +11771,7 @@
           <p:cNvPr id="10" name="Imagem 9">
             <a:extLst>
               <a:ext uri="{FF2B5EF4-FFF2-40B4-BE49-F238E27FC236}">
-                <a16:creationId xmlns:a16="http://schemas.microsoft.com/office/drawing/2014/main" id="{0EB307E1-0424-4BE3-B15F-8F906E1A1C41}"/>
+                <a16:creationId xmlns:a16="http://schemas.microsoft.com/office/drawing/2014/main" xmlns="" id="{0EB307E1-0424-4BE3-B15F-8F906E1A1C41}"/>
               </a:ext>
             </a:extLst>
           </p:cNvPr>
@@ -10450,7 +11807,7 @@
           <p:cNvPr id="12" name="Imagem 11">
             <a:extLst>
               <a:ext uri="{FF2B5EF4-FFF2-40B4-BE49-F238E27FC236}">
-                <a16:creationId xmlns:a16="http://schemas.microsoft.com/office/drawing/2014/main" id="{5AE2A67E-34AD-4A13-92E8-44B4ECDEC49D}"/>
+                <a16:creationId xmlns:a16="http://schemas.microsoft.com/office/drawing/2014/main" xmlns="" id="{5AE2A67E-34AD-4A13-92E8-44B4ECDEC49D}"/>
               </a:ext>
             </a:extLst>
           </p:cNvPr>
@@ -11142,7 +12499,7 @@
           <p:cNvPr id="6" name="Imagem 5">
             <a:extLst>
               <a:ext uri="{FF2B5EF4-FFF2-40B4-BE49-F238E27FC236}">
-                <a16:creationId xmlns:a16="http://schemas.microsoft.com/office/drawing/2014/main" id="{D6CDA069-FFE4-4347-B6D5-DE8915636EEC}"/>
+                <a16:creationId xmlns:a16="http://schemas.microsoft.com/office/drawing/2014/main" xmlns="" id="{D6CDA069-FFE4-4347-B6D5-DE8915636EEC}"/>
               </a:ext>
             </a:extLst>
           </p:cNvPr>
@@ -13648,7 +15005,7 @@
           <p:cNvPr id="7" name="Imagem 6">
             <a:extLst>
               <a:ext uri="{FF2B5EF4-FFF2-40B4-BE49-F238E27FC236}">
-                <a16:creationId xmlns:a16="http://schemas.microsoft.com/office/drawing/2014/main" id="{9DD4ACBE-0D51-4B7A-BD82-8E0E655CD655}"/>
+                <a16:creationId xmlns:a16="http://schemas.microsoft.com/office/drawing/2014/main" xmlns="" id="{9DD4ACBE-0D51-4B7A-BD82-8E0E655CD655}"/>
               </a:ext>
             </a:extLst>
           </p:cNvPr>
@@ -13684,7 +15041,7 @@
           <p:cNvPr id="9" name="Imagem 8">
             <a:extLst>
               <a:ext uri="{FF2B5EF4-FFF2-40B4-BE49-F238E27FC236}">
-                <a16:creationId xmlns:a16="http://schemas.microsoft.com/office/drawing/2014/main" id="{1FBC9049-5D70-4643-A3DF-0D0E271B5F4F}"/>
+                <a16:creationId xmlns:a16="http://schemas.microsoft.com/office/drawing/2014/main" xmlns="" id="{1FBC9049-5D70-4643-A3DF-0D0E271B5F4F}"/>
               </a:ext>
             </a:extLst>
           </p:cNvPr>
@@ -14165,7 +15522,7 @@
           <p:cNvPr id="7" name="Imagem 6">
             <a:extLst>
               <a:ext uri="{FF2B5EF4-FFF2-40B4-BE49-F238E27FC236}">
-                <a16:creationId xmlns:a16="http://schemas.microsoft.com/office/drawing/2014/main" id="{5306184D-CB29-4DA0-8B79-3639DECBC483}"/>
+                <a16:creationId xmlns:a16="http://schemas.microsoft.com/office/drawing/2014/main" xmlns="" id="{5306184D-CB29-4DA0-8B79-3639DECBC483}"/>
               </a:ext>
             </a:extLst>
           </p:cNvPr>
@@ -14201,7 +15558,7 @@
           <p:cNvPr id="11" name="Imagem 10">
             <a:extLst>
               <a:ext uri="{FF2B5EF4-FFF2-40B4-BE49-F238E27FC236}">
-                <a16:creationId xmlns:a16="http://schemas.microsoft.com/office/drawing/2014/main" id="{E770F56D-9D44-4985-A4D4-230EB0BB41FB}"/>
+                <a16:creationId xmlns:a16="http://schemas.microsoft.com/office/drawing/2014/main" xmlns="" id="{E770F56D-9D44-4985-A4D4-230EB0BB41FB}"/>
               </a:ext>
             </a:extLst>
           </p:cNvPr>

</xml_diff>